<commit_message>
docs: Add explanation of U-net
</commit_message>
<xml_diff>
--- a/CVmodel.pptx
+++ b/CVmodel.pptx
@@ -10,6 +10,10 @@
     <p:sldId id="260" r:id="rId4"/>
     <p:sldId id="261" r:id="rId5"/>
     <p:sldId id="263" r:id="rId6"/>
+    <p:sldId id="264" r:id="rId7"/>
+    <p:sldId id="266" r:id="rId8"/>
+    <p:sldId id="265" r:id="rId9"/>
+    <p:sldId id="267" r:id="rId10"/>
   </p:sldIdLst>
   <p:sldSz cx="12192000" cy="6858000"/>
   <p:notesSz cx="6858000" cy="9144000"/>
@@ -342,7 +346,7 @@
           <a:p>
             <a:fld id="{0660F544-F31F-477B-B3B3-D51790F8BF21}" type="datetimeFigureOut">
               <a:rPr lang="ko-KR" altLang="en-US" smtClean="0"/>
-              <a:t>2021. 8. 6.</a:t>
+              <a:t>2021. 8. 9.</a:t>
             </a:fld>
             <a:endParaRPr lang="ko-KR" altLang="en-US"/>
           </a:p>
@@ -550,7 +554,7 @@
           <a:p>
             <a:fld id="{0660F544-F31F-477B-B3B3-D51790F8BF21}" type="datetimeFigureOut">
               <a:rPr lang="ko-KR" altLang="en-US" smtClean="0"/>
-              <a:t>2021. 8. 6.</a:t>
+              <a:t>2021. 8. 9.</a:t>
             </a:fld>
             <a:endParaRPr lang="ko-KR" altLang="en-US"/>
           </a:p>
@@ -806,7 +810,7 @@
           <a:p>
             <a:fld id="{0660F544-F31F-477B-B3B3-D51790F8BF21}" type="datetimeFigureOut">
               <a:rPr lang="ko-KR" altLang="en-US" smtClean="0"/>
-              <a:t>2021. 8. 6.</a:t>
+              <a:t>2021. 8. 9.</a:t>
             </a:fld>
             <a:endParaRPr lang="ko-KR" altLang="en-US"/>
           </a:p>
@@ -980,7 +984,7 @@
           <a:p>
             <a:fld id="{0660F544-F31F-477B-B3B3-D51790F8BF21}" type="datetimeFigureOut">
               <a:rPr lang="ko-KR" altLang="en-US" smtClean="0"/>
-              <a:t>2021. 8. 6.</a:t>
+              <a:t>2021. 8. 9.</a:t>
             </a:fld>
             <a:endParaRPr lang="ko-KR" altLang="en-US"/>
           </a:p>
@@ -1323,7 +1327,7 @@
           <a:p>
             <a:fld id="{0660F544-F31F-477B-B3B3-D51790F8BF21}" type="datetimeFigureOut">
               <a:rPr lang="ko-KR" altLang="en-US" smtClean="0"/>
-              <a:t>2021. 8. 6.</a:t>
+              <a:t>2021. 8. 9.</a:t>
             </a:fld>
             <a:endParaRPr lang="ko-KR" altLang="en-US"/>
           </a:p>
@@ -1598,7 +1602,7 @@
           <a:p>
             <a:fld id="{0660F544-F31F-477B-B3B3-D51790F8BF21}" type="datetimeFigureOut">
               <a:rPr lang="ko-KR" altLang="en-US" smtClean="0"/>
-              <a:t>2021. 8. 6.</a:t>
+              <a:t>2021. 8. 9.</a:t>
             </a:fld>
             <a:endParaRPr lang="ko-KR" altLang="en-US"/>
           </a:p>
@@ -1977,7 +1981,7 @@
           <a:p>
             <a:fld id="{0660F544-F31F-477B-B3B3-D51790F8BF21}" type="datetimeFigureOut">
               <a:rPr lang="ko-KR" altLang="en-US" smtClean="0"/>
-              <a:t>2021. 8. 6.</a:t>
+              <a:t>2021. 8. 9.</a:t>
             </a:fld>
             <a:endParaRPr lang="ko-KR" altLang="en-US"/>
           </a:p>
@@ -2095,7 +2099,7 @@
           <a:p>
             <a:fld id="{0660F544-F31F-477B-B3B3-D51790F8BF21}" type="datetimeFigureOut">
               <a:rPr lang="ko-KR" altLang="en-US" smtClean="0"/>
-              <a:t>2021. 8. 6.</a:t>
+              <a:t>2021. 8. 9.</a:t>
             </a:fld>
             <a:endParaRPr lang="ko-KR" altLang="en-US"/>
           </a:p>
@@ -2266,7 +2270,7 @@
           <a:p>
             <a:fld id="{0660F544-F31F-477B-B3B3-D51790F8BF21}" type="datetimeFigureOut">
               <a:rPr lang="ko-KR" altLang="en-US" smtClean="0"/>
-              <a:t>2021. 8. 6.</a:t>
+              <a:t>2021. 8. 9.</a:t>
             </a:fld>
             <a:endParaRPr lang="ko-KR" altLang="en-US"/>
           </a:p>
@@ -2620,7 +2624,7 @@
           <a:p>
             <a:fld id="{0660F544-F31F-477B-B3B3-D51790F8BF21}" type="datetimeFigureOut">
               <a:rPr lang="ko-KR" altLang="en-US" smtClean="0"/>
-              <a:t>2021. 8. 6.</a:t>
+              <a:t>2021. 8. 9.</a:t>
             </a:fld>
             <a:endParaRPr lang="ko-KR" altLang="en-US"/>
           </a:p>
@@ -3002,7 +3006,7 @@
           <a:p>
             <a:fld id="{0660F544-F31F-477B-B3B3-D51790F8BF21}" type="datetimeFigureOut">
               <a:rPr lang="ko-KR" altLang="en-US" smtClean="0"/>
-              <a:t>2021. 8. 6.</a:t>
+              <a:t>2021. 8. 9.</a:t>
             </a:fld>
             <a:endParaRPr lang="ko-KR" altLang="en-US"/>
           </a:p>
@@ -3289,7 +3293,7 @@
           <a:p>
             <a:fld id="{0660F544-F31F-477B-B3B3-D51790F8BF21}" type="datetimeFigureOut">
               <a:rPr lang="ko-KR" altLang="en-US" smtClean="0"/>
-              <a:t>2021. 8. 6.</a:t>
+              <a:t>2021. 8. 9.</a:t>
             </a:fld>
             <a:endParaRPr lang="ko-KR" altLang="en-US"/>
           </a:p>
@@ -5482,6 +5486,1013 @@
 </p:sld>
 </file>
 
+<file path=ppt/slides/slide6.xml><?xml version="1.0" encoding="utf-8"?>
+<p:sld xmlns:a="http://schemas.openxmlformats.org/drawingml/2006/main" xmlns:r="http://schemas.openxmlformats.org/officeDocument/2006/relationships" xmlns:p="http://schemas.openxmlformats.org/presentationml/2006/main">
+  <p:cSld>
+    <p:spTree>
+      <p:nvGrpSpPr>
+        <p:cNvPr id="1" name=""/>
+        <p:cNvGrpSpPr/>
+        <p:nvPr/>
+      </p:nvGrpSpPr>
+      <p:grpSpPr>
+        <a:xfrm>
+          <a:off x="0" y="0"/>
+          <a:ext cx="0" cy="0"/>
+          <a:chOff x="0" y="0"/>
+          <a:chExt cx="0" cy="0"/>
+        </a:xfrm>
+      </p:grpSpPr>
+      <p:sp>
+        <p:nvSpPr>
+          <p:cNvPr id="4" name="TextBox 3">
+            <a:extLst>
+              <a:ext uri="{FF2B5EF4-FFF2-40B4-BE49-F238E27FC236}">
+                <a16:creationId xmlns:a16="http://schemas.microsoft.com/office/drawing/2014/main" id="{C843F9AF-F496-4F52-B425-94A4B9EE37E3}"/>
+              </a:ext>
+            </a:extLst>
+          </p:cNvPr>
+          <p:cNvSpPr txBox="1"/>
+          <p:nvPr/>
+        </p:nvSpPr>
+        <p:spPr>
+          <a:xfrm>
+            <a:off x="1182314" y="723439"/>
+            <a:ext cx="10084775" cy="4672048"/>
+          </a:xfrm>
+          <a:prstGeom prst="rect">
+            <a:avLst/>
+          </a:prstGeom>
+          <a:noFill/>
+        </p:spPr>
+        <p:txBody>
+          <a:bodyPr wrap="square" rtlCol="0">
+            <a:spAutoFit/>
+          </a:bodyPr>
+          <a:lstStyle/>
+          <a:p>
+            <a:pPr>
+              <a:lnSpc>
+                <a:spcPct val="150000"/>
+              </a:lnSpc>
+            </a:pPr>
+            <a:r>
+              <a:rPr kumimoji="1" lang="en-US" altLang="ko-KR" sz="4000" dirty="0">
+                <a:latin typeface="나눔고딕" panose="020D0604000000000000" pitchFamily="50" charset="-127"/>
+                <a:ea typeface="나눔고딕" panose="020D0604000000000000" pitchFamily="50" charset="-127"/>
+              </a:rPr>
+              <a:t>U-Net</a:t>
+            </a:r>
+          </a:p>
+          <a:p>
+            <a:pPr>
+              <a:lnSpc>
+                <a:spcPct val="150000"/>
+              </a:lnSpc>
+            </a:pPr>
+            <a:endParaRPr lang="en-US" altLang="ko-KR" dirty="0">
+              <a:latin typeface="나눔고딕" panose="020D0604000000000000" pitchFamily="50" charset="-127"/>
+              <a:ea typeface="나눔고딕" panose="020D0604000000000000" pitchFamily="50" charset="-127"/>
+            </a:endParaRPr>
+          </a:p>
+          <a:p>
+            <a:pPr marL="285750" indent="-285750">
+              <a:lnSpc>
+                <a:spcPct val="200000"/>
+              </a:lnSpc>
+              <a:buFont typeface="Arial" panose="020B0604020202020204" pitchFamily="34" charset="0"/>
+              <a:buChar char="•"/>
+            </a:pPr>
+            <a:r>
+              <a:rPr lang="en-US" altLang="ko-KR" dirty="0">
+                <a:latin typeface="나눔고딕" panose="020D0604000000000000" pitchFamily="50" charset="-127"/>
+                <a:ea typeface="나눔고딕" panose="020D0604000000000000" pitchFamily="50" charset="-127"/>
+              </a:rPr>
+              <a:t>Encoder(Contracting path)-Decoder(Expanding path) </a:t>
+            </a:r>
+            <a:r>
+              <a:rPr lang="ko-KR" altLang="en-US" dirty="0">
+                <a:latin typeface="나눔고딕" panose="020D0604000000000000" pitchFamily="50" charset="-127"/>
+                <a:ea typeface="나눔고딕" panose="020D0604000000000000" pitchFamily="50" charset="-127"/>
+              </a:rPr>
+              <a:t>구조</a:t>
+            </a:r>
+            <a:endParaRPr lang="en-US" altLang="ko-KR" dirty="0">
+              <a:latin typeface="나눔고딕" panose="020D0604000000000000" pitchFamily="50" charset="-127"/>
+              <a:ea typeface="나눔고딕" panose="020D0604000000000000" pitchFamily="50" charset="-127"/>
+            </a:endParaRPr>
+          </a:p>
+          <a:p>
+            <a:pPr marL="285750" indent="-285750">
+              <a:lnSpc>
+                <a:spcPct val="200000"/>
+              </a:lnSpc>
+              <a:buFont typeface="Arial" panose="020B0604020202020204" pitchFamily="34" charset="0"/>
+              <a:buChar char="•"/>
+            </a:pPr>
+            <a:r>
+              <a:rPr lang="en-US" altLang="ko-KR" dirty="0">
+                <a:latin typeface="나눔고딕" panose="020D0604000000000000" pitchFamily="50" charset="-127"/>
+                <a:ea typeface="나눔고딕" panose="020D0604000000000000" pitchFamily="50" charset="-127"/>
+              </a:rPr>
+              <a:t>Contracting path : Convolutional layer</a:t>
+            </a:r>
+          </a:p>
+          <a:p>
+            <a:pPr marL="285750" indent="-285750">
+              <a:lnSpc>
+                <a:spcPct val="200000"/>
+              </a:lnSpc>
+              <a:buFont typeface="Arial" panose="020B0604020202020204" pitchFamily="34" charset="0"/>
+              <a:buChar char="•"/>
+            </a:pPr>
+            <a:r>
+              <a:rPr lang="en-US" altLang="ko-KR" dirty="0">
+                <a:latin typeface="나눔고딕" panose="020D0604000000000000" pitchFamily="50" charset="-127"/>
+                <a:ea typeface="나눔고딕" panose="020D0604000000000000" pitchFamily="50" charset="-127"/>
+              </a:rPr>
+              <a:t>Expanding path : Up-sampling(Transposed Convolution), Skip</a:t>
+            </a:r>
+            <a:r>
+              <a:rPr lang="ko-KR" altLang="en-US" dirty="0">
+                <a:latin typeface="나눔고딕" panose="020D0604000000000000" pitchFamily="50" charset="-127"/>
+                <a:ea typeface="나눔고딕" panose="020D0604000000000000" pitchFamily="50" charset="-127"/>
+              </a:rPr>
+              <a:t> </a:t>
+            </a:r>
+            <a:r>
+              <a:rPr lang="en-US" altLang="ko-KR" dirty="0">
+                <a:latin typeface="나눔고딕" panose="020D0604000000000000" pitchFamily="50" charset="-127"/>
+                <a:ea typeface="나눔고딕" panose="020D0604000000000000" pitchFamily="50" charset="-127"/>
+              </a:rPr>
+              <a:t>connection</a:t>
+            </a:r>
+          </a:p>
+          <a:p>
+            <a:pPr marL="285750" indent="-285750">
+              <a:lnSpc>
+                <a:spcPct val="200000"/>
+              </a:lnSpc>
+              <a:buFont typeface="Arial" panose="020B0604020202020204" pitchFamily="34" charset="0"/>
+              <a:buChar char="•"/>
+            </a:pPr>
+            <a:r>
+              <a:rPr lang="ko-KR" altLang="en-US" dirty="0">
+                <a:latin typeface="나눔고딕" panose="020D0604000000000000" pitchFamily="50" charset="-127"/>
+                <a:ea typeface="나눔고딕" panose="020D0604000000000000" pitchFamily="50" charset="-127"/>
+              </a:rPr>
+              <a:t>다양한 학습 방법 사용</a:t>
+            </a:r>
+            <a:endParaRPr lang="en-US" altLang="ko-KR" dirty="0">
+              <a:latin typeface="나눔고딕" panose="020D0604000000000000" pitchFamily="50" charset="-127"/>
+              <a:ea typeface="나눔고딕" panose="020D0604000000000000" pitchFamily="50" charset="-127"/>
+            </a:endParaRPr>
+          </a:p>
+          <a:p>
+            <a:pPr marL="285750" indent="-285750">
+              <a:lnSpc>
+                <a:spcPct val="200000"/>
+              </a:lnSpc>
+              <a:buFont typeface="Arial" panose="020B0604020202020204" pitchFamily="34" charset="0"/>
+              <a:buChar char="•"/>
+            </a:pPr>
+            <a:r>
+              <a:rPr lang="en-US" altLang="ko-KR" dirty="0">
+                <a:latin typeface="나눔고딕" panose="020D0604000000000000" pitchFamily="50" charset="-127"/>
+                <a:ea typeface="나눔고딕" panose="020D0604000000000000" pitchFamily="50" charset="-127"/>
+              </a:rPr>
+              <a:t>Patch</a:t>
+            </a:r>
+            <a:r>
+              <a:rPr lang="ko-KR" altLang="en-US" dirty="0">
+                <a:latin typeface="나눔고딕" panose="020D0604000000000000" pitchFamily="50" charset="-127"/>
+                <a:ea typeface="나눔고딕" panose="020D0604000000000000" pitchFamily="50" charset="-127"/>
+              </a:rPr>
+              <a:t> 선택 시 </a:t>
+            </a:r>
+            <a:r>
+              <a:rPr lang="en-US" altLang="ko-KR" dirty="0">
+                <a:latin typeface="나눔고딕" panose="020D0604000000000000" pitchFamily="50" charset="-127"/>
+                <a:ea typeface="나눔고딕" panose="020D0604000000000000" pitchFamily="50" charset="-127"/>
+              </a:rPr>
+              <a:t>Overlap </a:t>
+            </a:r>
+            <a:r>
+              <a:rPr lang="ko-KR" altLang="en-US" dirty="0">
+                <a:latin typeface="나눔고딕" panose="020D0604000000000000" pitchFamily="50" charset="-127"/>
+                <a:ea typeface="나눔고딕" panose="020D0604000000000000" pitchFamily="50" charset="-127"/>
+              </a:rPr>
+              <a:t>비율이 적어 속도 상승</a:t>
+            </a:r>
+            <a:endParaRPr lang="en-US" altLang="ko-KR" dirty="0">
+              <a:latin typeface="나눔고딕" panose="020D0604000000000000" pitchFamily="50" charset="-127"/>
+              <a:ea typeface="나눔고딕" panose="020D0604000000000000" pitchFamily="50" charset="-127"/>
+            </a:endParaRPr>
+          </a:p>
+          <a:p>
+            <a:pPr marL="285750" indent="-285750">
+              <a:lnSpc>
+                <a:spcPct val="200000"/>
+              </a:lnSpc>
+              <a:buFont typeface="Arial" panose="020B0604020202020204" pitchFamily="34" charset="0"/>
+              <a:buChar char="•"/>
+            </a:pPr>
+            <a:r>
+              <a:rPr lang="en-US" altLang="ko-KR" dirty="0">
+                <a:latin typeface="나눔고딕" panose="020D0604000000000000" pitchFamily="50" charset="-127"/>
+                <a:ea typeface="나눔고딕" panose="020D0604000000000000" pitchFamily="50" charset="-127"/>
+              </a:rPr>
+              <a:t>Patch size</a:t>
+            </a:r>
+            <a:r>
+              <a:rPr lang="ko-KR" altLang="en-US" dirty="0">
+                <a:latin typeface="나눔고딕" panose="020D0604000000000000" pitchFamily="50" charset="-127"/>
+                <a:ea typeface="나눔고딕" panose="020D0604000000000000" pitchFamily="50" charset="-127"/>
+              </a:rPr>
+              <a:t>에 따른 </a:t>
+            </a:r>
+            <a:r>
+              <a:rPr lang="en-US" altLang="ko-KR" dirty="0">
+                <a:latin typeface="나눔고딕" panose="020D0604000000000000" pitchFamily="50" charset="-127"/>
+                <a:ea typeface="나눔고딕" panose="020D0604000000000000" pitchFamily="50" charset="-127"/>
+              </a:rPr>
+              <a:t>context</a:t>
+            </a:r>
+            <a:r>
+              <a:rPr lang="ko-KR" altLang="en-US" dirty="0">
+                <a:latin typeface="나눔고딕" panose="020D0604000000000000" pitchFamily="50" charset="-127"/>
+                <a:ea typeface="나눔고딕" panose="020D0604000000000000" pitchFamily="50" charset="-127"/>
+              </a:rPr>
+              <a:t> 추출과 </a:t>
+            </a:r>
+            <a:r>
+              <a:rPr lang="en-US" altLang="ko-KR" dirty="0">
+                <a:latin typeface="나눔고딕" panose="020D0604000000000000" pitchFamily="50" charset="-127"/>
+                <a:ea typeface="나눔고딕" panose="020D0604000000000000" pitchFamily="50" charset="-127"/>
+              </a:rPr>
+              <a:t>Localization</a:t>
+            </a:r>
+            <a:r>
+              <a:rPr lang="ko-KR" altLang="en-US" dirty="0">
+                <a:latin typeface="나눔고딕" panose="020D0604000000000000" pitchFamily="50" charset="-127"/>
+                <a:ea typeface="나눔고딕" panose="020D0604000000000000" pitchFamily="50" charset="-127"/>
+              </a:rPr>
+              <a:t>간의 </a:t>
+            </a:r>
+            <a:r>
+              <a:rPr lang="en-US" altLang="ko-KR" dirty="0">
+                <a:latin typeface="나눔고딕" panose="020D0604000000000000" pitchFamily="50" charset="-127"/>
+                <a:ea typeface="나눔고딕" panose="020D0604000000000000" pitchFamily="50" charset="-127"/>
+              </a:rPr>
+              <a:t>trade-off </a:t>
+            </a:r>
+            <a:r>
+              <a:rPr lang="ko-KR" altLang="en-US" dirty="0">
+                <a:latin typeface="나눔고딕" panose="020D0604000000000000" pitchFamily="50" charset="-127"/>
+                <a:ea typeface="나눔고딕" panose="020D0604000000000000" pitchFamily="50" charset="-127"/>
+              </a:rPr>
+              <a:t>개선</a:t>
+            </a:r>
+            <a:endParaRPr lang="en-US" altLang="ko-KR" dirty="0">
+              <a:latin typeface="나눔고딕" panose="020D0604000000000000" pitchFamily="50" charset="-127"/>
+              <a:ea typeface="나눔고딕" panose="020D0604000000000000" pitchFamily="50" charset="-127"/>
+            </a:endParaRPr>
+          </a:p>
+        </p:txBody>
+      </p:sp>
+    </p:spTree>
+    <p:extLst>
+      <p:ext uri="{BB962C8B-B14F-4D97-AF65-F5344CB8AC3E}">
+        <p14:creationId xmlns:p14="http://schemas.microsoft.com/office/powerpoint/2010/main" val="3871123548"/>
+      </p:ext>
+    </p:extLst>
+  </p:cSld>
+  <p:clrMapOvr>
+    <a:masterClrMapping/>
+  </p:clrMapOvr>
+</p:sld>
+</file>
+
+<file path=ppt/slides/slide7.xml><?xml version="1.0" encoding="utf-8"?>
+<p:sld xmlns:a="http://schemas.openxmlformats.org/drawingml/2006/main" xmlns:r="http://schemas.openxmlformats.org/officeDocument/2006/relationships" xmlns:p="http://schemas.openxmlformats.org/presentationml/2006/main">
+  <p:cSld>
+    <p:spTree>
+      <p:nvGrpSpPr>
+        <p:cNvPr id="1" name=""/>
+        <p:cNvGrpSpPr/>
+        <p:nvPr/>
+      </p:nvGrpSpPr>
+      <p:grpSpPr>
+        <a:xfrm>
+          <a:off x="0" y="0"/>
+          <a:ext cx="0" cy="0"/>
+          <a:chOff x="0" y="0"/>
+          <a:chExt cx="0" cy="0"/>
+        </a:xfrm>
+      </p:grpSpPr>
+      <p:pic>
+        <p:nvPicPr>
+          <p:cNvPr id="4" name="그림 3">
+            <a:extLst>
+              <a:ext uri="{FF2B5EF4-FFF2-40B4-BE49-F238E27FC236}">
+                <a16:creationId xmlns:a16="http://schemas.microsoft.com/office/drawing/2014/main" id="{5F5EFB0D-A412-0E47-8D8D-1D745546A84B}"/>
+              </a:ext>
+            </a:extLst>
+          </p:cNvPr>
+          <p:cNvPicPr>
+            <a:picLocks noChangeAspect="1"/>
+          </p:cNvPicPr>
+          <p:nvPr/>
+        </p:nvPicPr>
+        <p:blipFill>
+          <a:blip r:embed="rId2"/>
+          <a:stretch>
+            <a:fillRect/>
+          </a:stretch>
+        </p:blipFill>
+        <p:spPr>
+          <a:xfrm>
+            <a:off x="1564831" y="299914"/>
+            <a:ext cx="9230497" cy="5887167"/>
+          </a:xfrm>
+          <a:prstGeom prst="rect">
+            <a:avLst/>
+          </a:prstGeom>
+        </p:spPr>
+      </p:pic>
+      <p:sp>
+        <p:nvSpPr>
+          <p:cNvPr id="5" name="직사각형 4">
+            <a:extLst>
+              <a:ext uri="{FF2B5EF4-FFF2-40B4-BE49-F238E27FC236}">
+                <a16:creationId xmlns:a16="http://schemas.microsoft.com/office/drawing/2014/main" id="{48290FA5-5D11-AA4B-AF21-9C40036DA97D}"/>
+              </a:ext>
+            </a:extLst>
+          </p:cNvPr>
+          <p:cNvSpPr/>
+          <p:nvPr/>
+        </p:nvSpPr>
+        <p:spPr>
+          <a:xfrm>
+            <a:off x="683172" y="1397876"/>
+            <a:ext cx="881659" cy="767255"/>
+          </a:xfrm>
+          <a:prstGeom prst="rect">
+            <a:avLst/>
+          </a:prstGeom>
+          <a:solidFill>
+            <a:schemeClr val="bg1"/>
+          </a:solidFill>
+          <a:ln>
+            <a:noFill/>
+          </a:ln>
+        </p:spPr>
+        <p:style>
+          <a:lnRef idx="2">
+            <a:schemeClr val="accent1">
+              <a:shade val="50000"/>
+            </a:schemeClr>
+          </a:lnRef>
+          <a:fillRef idx="1">
+            <a:schemeClr val="accent1"/>
+          </a:fillRef>
+          <a:effectRef idx="0">
+            <a:schemeClr val="accent1"/>
+          </a:effectRef>
+          <a:fontRef idx="minor">
+            <a:schemeClr val="lt1"/>
+          </a:fontRef>
+        </p:style>
+        <p:txBody>
+          <a:bodyPr rtlCol="0" anchor="ctr"/>
+          <a:lstStyle/>
+          <a:p>
+            <a:pPr algn="ctr"/>
+            <a:endParaRPr kumimoji="1" lang="ko-KR" altLang="en-US"/>
+          </a:p>
+        </p:txBody>
+      </p:sp>
+      <p:sp>
+        <p:nvSpPr>
+          <p:cNvPr id="6" name="직사각형 5">
+            <a:extLst>
+              <a:ext uri="{FF2B5EF4-FFF2-40B4-BE49-F238E27FC236}">
+                <a16:creationId xmlns:a16="http://schemas.microsoft.com/office/drawing/2014/main" id="{EAF724DE-FFB3-D648-9E51-C8F271705A58}"/>
+              </a:ext>
+            </a:extLst>
+          </p:cNvPr>
+          <p:cNvSpPr/>
+          <p:nvPr/>
+        </p:nvSpPr>
+        <p:spPr>
+          <a:xfrm>
+            <a:off x="10627169" y="1397875"/>
+            <a:ext cx="881659" cy="767255"/>
+          </a:xfrm>
+          <a:prstGeom prst="rect">
+            <a:avLst/>
+          </a:prstGeom>
+          <a:solidFill>
+            <a:schemeClr val="bg1"/>
+          </a:solidFill>
+          <a:ln>
+            <a:noFill/>
+          </a:ln>
+        </p:spPr>
+        <p:style>
+          <a:lnRef idx="2">
+            <a:schemeClr val="accent1">
+              <a:shade val="50000"/>
+            </a:schemeClr>
+          </a:lnRef>
+          <a:fillRef idx="1">
+            <a:schemeClr val="accent1"/>
+          </a:fillRef>
+          <a:effectRef idx="0">
+            <a:schemeClr val="accent1"/>
+          </a:effectRef>
+          <a:fontRef idx="minor">
+            <a:schemeClr val="lt1"/>
+          </a:fontRef>
+        </p:style>
+        <p:txBody>
+          <a:bodyPr rtlCol="0" anchor="ctr"/>
+          <a:lstStyle/>
+          <a:p>
+            <a:pPr algn="ctr"/>
+            <a:endParaRPr kumimoji="1" lang="ko-KR" altLang="en-US"/>
+          </a:p>
+        </p:txBody>
+      </p:sp>
+      <p:sp>
+        <p:nvSpPr>
+          <p:cNvPr id="7" name="TextBox 6">
+            <a:extLst>
+              <a:ext uri="{FF2B5EF4-FFF2-40B4-BE49-F238E27FC236}">
+                <a16:creationId xmlns:a16="http://schemas.microsoft.com/office/drawing/2014/main" id="{429F1867-0B00-5F4A-8FC2-CC423A174B89}"/>
+              </a:ext>
+            </a:extLst>
+          </p:cNvPr>
+          <p:cNvSpPr txBox="1"/>
+          <p:nvPr/>
+        </p:nvSpPr>
+        <p:spPr>
+          <a:xfrm>
+            <a:off x="4887310" y="1135118"/>
+            <a:ext cx="1671145" cy="369332"/>
+          </a:xfrm>
+          <a:prstGeom prst="rect">
+            <a:avLst/>
+          </a:prstGeom>
+          <a:noFill/>
+        </p:spPr>
+        <p:txBody>
+          <a:bodyPr wrap="square" rtlCol="0">
+            <a:spAutoFit/>
+          </a:bodyPr>
+          <a:lstStyle/>
+          <a:p>
+            <a:r>
+              <a:rPr kumimoji="1" lang="en-US" altLang="ko-KR" dirty="0"/>
+              <a:t>Skip connection</a:t>
+            </a:r>
+            <a:endParaRPr kumimoji="1" lang="ko-KR" altLang="en-US" dirty="0"/>
+          </a:p>
+        </p:txBody>
+      </p:sp>
+    </p:spTree>
+    <p:extLst>
+      <p:ext uri="{BB962C8B-B14F-4D97-AF65-F5344CB8AC3E}">
+        <p14:creationId xmlns:p14="http://schemas.microsoft.com/office/powerpoint/2010/main" val="3104848873"/>
+      </p:ext>
+    </p:extLst>
+  </p:cSld>
+  <p:clrMapOvr>
+    <a:masterClrMapping/>
+  </p:clrMapOvr>
+</p:sld>
+</file>
+
+<file path=ppt/slides/slide8.xml><?xml version="1.0" encoding="utf-8"?>
+<p:sld xmlns:a="http://schemas.openxmlformats.org/drawingml/2006/main" xmlns:r="http://schemas.openxmlformats.org/officeDocument/2006/relationships" xmlns:p="http://schemas.openxmlformats.org/presentationml/2006/main">
+  <p:cSld>
+    <p:spTree>
+      <p:nvGrpSpPr>
+        <p:cNvPr id="1" name=""/>
+        <p:cNvGrpSpPr/>
+        <p:nvPr/>
+      </p:nvGrpSpPr>
+      <p:grpSpPr>
+        <a:xfrm>
+          <a:off x="0" y="0"/>
+          <a:ext cx="0" cy="0"/>
+          <a:chOff x="0" y="0"/>
+          <a:chExt cx="0" cy="0"/>
+        </a:xfrm>
+      </p:grpSpPr>
+      <p:sp>
+        <p:nvSpPr>
+          <p:cNvPr id="4" name="TextBox 3">
+            <a:extLst>
+              <a:ext uri="{FF2B5EF4-FFF2-40B4-BE49-F238E27FC236}">
+                <a16:creationId xmlns:a16="http://schemas.microsoft.com/office/drawing/2014/main" id="{C843F9AF-F496-4F52-B425-94A4B9EE37E3}"/>
+              </a:ext>
+            </a:extLst>
+          </p:cNvPr>
+          <p:cNvSpPr txBox="1"/>
+          <p:nvPr/>
+        </p:nvSpPr>
+        <p:spPr>
+          <a:xfrm>
+            <a:off x="1182314" y="723439"/>
+            <a:ext cx="10084775" cy="4568174"/>
+          </a:xfrm>
+          <a:prstGeom prst="rect">
+            <a:avLst/>
+          </a:prstGeom>
+          <a:noFill/>
+        </p:spPr>
+        <p:txBody>
+          <a:bodyPr wrap="square" rtlCol="0">
+            <a:spAutoFit/>
+          </a:bodyPr>
+          <a:lstStyle/>
+          <a:p>
+            <a:pPr>
+              <a:lnSpc>
+                <a:spcPct val="150000"/>
+              </a:lnSpc>
+            </a:pPr>
+            <a:r>
+              <a:rPr kumimoji="1" lang="en-US" altLang="ko-KR" sz="4000" dirty="0">
+                <a:latin typeface="나눔고딕" panose="020D0604000000000000" pitchFamily="50" charset="-127"/>
+                <a:ea typeface="나눔고딕" panose="020D0604000000000000" pitchFamily="50" charset="-127"/>
+              </a:rPr>
+              <a:t>U-Net</a:t>
+            </a:r>
+          </a:p>
+          <a:p>
+            <a:pPr>
+              <a:lnSpc>
+                <a:spcPct val="150000"/>
+              </a:lnSpc>
+            </a:pPr>
+            <a:endParaRPr lang="en-US" altLang="ko-KR" dirty="0">
+              <a:latin typeface="나눔고딕" panose="020D0604000000000000" pitchFamily="50" charset="-127"/>
+              <a:ea typeface="나눔고딕" panose="020D0604000000000000" pitchFamily="50" charset="-127"/>
+            </a:endParaRPr>
+          </a:p>
+          <a:p>
+            <a:pPr marL="285750" indent="-285750">
+              <a:lnSpc>
+                <a:spcPct val="200000"/>
+              </a:lnSpc>
+              <a:buFont typeface="Arial" panose="020B0604020202020204" pitchFamily="34" charset="0"/>
+              <a:buChar char="•"/>
+            </a:pPr>
+            <a:r>
+              <a:rPr lang="en-US" altLang="ko-KR" dirty="0">
+                <a:latin typeface="나눔고딕" panose="020D0604000000000000" pitchFamily="50" charset="-127"/>
+                <a:ea typeface="나눔고딕" panose="020D0604000000000000" pitchFamily="50" charset="-127"/>
+              </a:rPr>
+              <a:t>Overlap-tile strategy : </a:t>
+            </a:r>
+            <a:r>
+              <a:rPr lang="ko-KR" altLang="en-US" dirty="0">
+                <a:latin typeface="나눔고딕" panose="020D0604000000000000" pitchFamily="50" charset="-127"/>
+                <a:ea typeface="나눔고딕" panose="020D0604000000000000" pitchFamily="50" charset="-127"/>
+              </a:rPr>
+              <a:t>이미지 크기가 큰 경우 이미지를 잘라야 하고 </a:t>
+            </a:r>
+            <a:r>
+              <a:rPr lang="en-US" altLang="ko-KR" dirty="0">
+                <a:latin typeface="나눔고딕" panose="020D0604000000000000" pitchFamily="50" charset="-127"/>
+                <a:ea typeface="나눔고딕" panose="020D0604000000000000" pitchFamily="50" charset="-127"/>
+              </a:rPr>
+              <a:t>Input</a:t>
+            </a:r>
+            <a:r>
+              <a:rPr lang="ko-KR" altLang="en-US" dirty="0">
+                <a:latin typeface="나눔고딕" panose="020D0604000000000000" pitchFamily="50" charset="-127"/>
+                <a:ea typeface="나눔고딕" panose="020D0604000000000000" pitchFamily="50" charset="-127"/>
+              </a:rPr>
+              <a:t>보다 </a:t>
+            </a:r>
+            <a:r>
+              <a:rPr lang="en-US" altLang="ko-KR" dirty="0">
+                <a:latin typeface="나눔고딕" panose="020D0604000000000000" pitchFamily="50" charset="-127"/>
+                <a:ea typeface="나눔고딕" panose="020D0604000000000000" pitchFamily="50" charset="-127"/>
+              </a:rPr>
+              <a:t>Output</a:t>
+            </a:r>
+            <a:r>
+              <a:rPr lang="ko-KR" altLang="en-US" dirty="0">
+                <a:latin typeface="나눔고딕" panose="020D0604000000000000" pitchFamily="50" charset="-127"/>
+                <a:ea typeface="나눔고딕" panose="020D0604000000000000" pitchFamily="50" charset="-127"/>
+              </a:rPr>
+              <a:t>이 이미지 크기가 더 작으므로 겹치는 부분이 존재하도록 이미지를 잘라야 함</a:t>
+            </a:r>
+            <a:endParaRPr lang="en-US" altLang="ko-KR" dirty="0">
+              <a:latin typeface="나눔고딕" panose="020D0604000000000000" pitchFamily="50" charset="-127"/>
+              <a:ea typeface="나눔고딕" panose="020D0604000000000000" pitchFamily="50" charset="-127"/>
+            </a:endParaRPr>
+          </a:p>
+          <a:p>
+            <a:pPr marL="285750" indent="-285750">
+              <a:lnSpc>
+                <a:spcPct val="200000"/>
+              </a:lnSpc>
+              <a:buFont typeface="Arial" panose="020B0604020202020204" pitchFamily="34" charset="0"/>
+              <a:buChar char="•"/>
+            </a:pPr>
+            <a:r>
+              <a:rPr lang="en-US" altLang="ko-KR" dirty="0">
+                <a:latin typeface="나눔고딕" panose="020D0604000000000000" pitchFamily="50" charset="-127"/>
+                <a:ea typeface="나눔고딕" panose="020D0604000000000000" pitchFamily="50" charset="-127"/>
+              </a:rPr>
+              <a:t>Mirroring Extrapolate : Padding</a:t>
+            </a:r>
+            <a:r>
+              <a:rPr lang="ko-KR" altLang="en-US" dirty="0">
+                <a:latin typeface="나눔고딕" panose="020D0604000000000000" pitchFamily="50" charset="-127"/>
+                <a:ea typeface="나눔고딕" panose="020D0604000000000000" pitchFamily="50" charset="-127"/>
+              </a:rPr>
+              <a:t>을 이미지 경계에 대해 좌우 반전한 </a:t>
+            </a:r>
+            <a:r>
+              <a:rPr lang="en-US" altLang="ko-KR" dirty="0">
+                <a:latin typeface="나눔고딕" panose="020D0604000000000000" pitchFamily="50" charset="-127"/>
+                <a:ea typeface="나눔고딕" panose="020D0604000000000000" pitchFamily="50" charset="-127"/>
+              </a:rPr>
+              <a:t>Mirror </a:t>
+            </a:r>
+            <a:r>
+              <a:rPr lang="ko-KR" altLang="en-US" dirty="0">
+                <a:latin typeface="나눔고딕" panose="020D0604000000000000" pitchFamily="50" charset="-127"/>
+                <a:ea typeface="나눔고딕" panose="020D0604000000000000" pitchFamily="50" charset="-127"/>
+              </a:rPr>
+              <a:t>이미지로 사용</a:t>
+            </a:r>
+            <a:r>
+              <a:rPr lang="en-US" altLang="ko-KR" dirty="0">
+                <a:latin typeface="나눔고딕" panose="020D0604000000000000" pitchFamily="50" charset="-127"/>
+                <a:ea typeface="나눔고딕" panose="020D0604000000000000" pitchFamily="50" charset="-127"/>
+              </a:rPr>
+              <a:t>.</a:t>
+            </a:r>
+          </a:p>
+          <a:p>
+            <a:pPr marL="285750" indent="-285750">
+              <a:lnSpc>
+                <a:spcPct val="200000"/>
+              </a:lnSpc>
+              <a:buFont typeface="Arial" panose="020B0604020202020204" pitchFamily="34" charset="0"/>
+              <a:buChar char="•"/>
+            </a:pPr>
+            <a:r>
+              <a:rPr lang="en-US" altLang="ko-KR" dirty="0">
+                <a:latin typeface="나눔고딕" panose="020D0604000000000000" pitchFamily="50" charset="-127"/>
+                <a:ea typeface="나눔고딕" panose="020D0604000000000000" pitchFamily="50" charset="-127"/>
+              </a:rPr>
+              <a:t>Weighted Loss : </a:t>
+            </a:r>
+            <a:r>
+              <a:rPr lang="ko-KR" altLang="en-US" dirty="0">
+                <a:latin typeface="나눔고딕" panose="020D0604000000000000" pitchFamily="50" charset="-127"/>
+                <a:ea typeface="나눔고딕" panose="020D0604000000000000" pitchFamily="50" charset="-127"/>
+              </a:rPr>
+              <a:t>사전에 </a:t>
+            </a:r>
+            <a:r>
+              <a:rPr lang="en-US" altLang="ko-KR" dirty="0">
+                <a:latin typeface="나눔고딕" panose="020D0604000000000000" pitchFamily="50" charset="-127"/>
+                <a:ea typeface="나눔고딕" panose="020D0604000000000000" pitchFamily="50" charset="-127"/>
+              </a:rPr>
+              <a:t>Ground-Truth</a:t>
+            </a:r>
+            <a:r>
+              <a:rPr lang="ko-KR" altLang="en-US" dirty="0">
+                <a:latin typeface="나눔고딕" panose="020D0604000000000000" pitchFamily="50" charset="-127"/>
+                <a:ea typeface="나눔고딕" panose="020D0604000000000000" pitchFamily="50" charset="-127"/>
+              </a:rPr>
+              <a:t>에 대한 </a:t>
+            </a:r>
+            <a:r>
+              <a:rPr lang="en-US" altLang="ko-KR" dirty="0">
+                <a:latin typeface="나눔고딕" panose="020D0604000000000000" pitchFamily="50" charset="-127"/>
+                <a:ea typeface="나눔고딕" panose="020D0604000000000000" pitchFamily="50" charset="-127"/>
+              </a:rPr>
+              <a:t>Weight map</a:t>
+            </a:r>
+            <a:r>
+              <a:rPr lang="ko-KR" altLang="en-US" dirty="0">
+                <a:latin typeface="나눔고딕" panose="020D0604000000000000" pitchFamily="50" charset="-127"/>
+                <a:ea typeface="나눔고딕" panose="020D0604000000000000" pitchFamily="50" charset="-127"/>
+              </a:rPr>
+              <a:t>을 구해 학습에 반영함</a:t>
+            </a:r>
+            <a:r>
+              <a:rPr lang="en-US" altLang="ko-KR" dirty="0">
+                <a:latin typeface="나눔고딕" panose="020D0604000000000000" pitchFamily="50" charset="-127"/>
+                <a:ea typeface="나눔고딕" panose="020D0604000000000000" pitchFamily="50" charset="-127"/>
+              </a:rPr>
+              <a:t>.</a:t>
+            </a:r>
+          </a:p>
+          <a:p>
+            <a:pPr marL="285750" indent="-285750">
+              <a:lnSpc>
+                <a:spcPct val="200000"/>
+              </a:lnSpc>
+              <a:buFont typeface="Arial" panose="020B0604020202020204" pitchFamily="34" charset="0"/>
+              <a:buChar char="•"/>
+            </a:pPr>
+            <a:r>
+              <a:rPr lang="en-US" altLang="ko-KR" dirty="0">
+                <a:latin typeface="나눔고딕" panose="020D0604000000000000" pitchFamily="50" charset="-127"/>
+                <a:ea typeface="나눔고딕" panose="020D0604000000000000" pitchFamily="50" charset="-127"/>
+              </a:rPr>
+              <a:t>Data Augmentation : Elastic deformation(Affine transform + probabilistic spin)</a:t>
+            </a:r>
+          </a:p>
+          <a:p>
+            <a:pPr marL="285750" indent="-285750">
+              <a:lnSpc>
+                <a:spcPct val="150000"/>
+              </a:lnSpc>
+              <a:buFont typeface="Arial" panose="020B0604020202020204" pitchFamily="34" charset="0"/>
+              <a:buChar char="•"/>
+            </a:pPr>
+            <a:endParaRPr lang="ko-KR" altLang="en-US" dirty="0">
+              <a:latin typeface="나눔고딕" panose="020D0604000000000000" pitchFamily="50" charset="-127"/>
+              <a:ea typeface="나눔고딕" panose="020D0604000000000000" pitchFamily="50" charset="-127"/>
+            </a:endParaRPr>
+          </a:p>
+        </p:txBody>
+      </p:sp>
+    </p:spTree>
+    <p:extLst>
+      <p:ext uri="{BB962C8B-B14F-4D97-AF65-F5344CB8AC3E}">
+        <p14:creationId xmlns:p14="http://schemas.microsoft.com/office/powerpoint/2010/main" val="1062268102"/>
+      </p:ext>
+    </p:extLst>
+  </p:cSld>
+  <p:clrMapOvr>
+    <a:masterClrMapping/>
+  </p:clrMapOvr>
+</p:sld>
+</file>
+
+<file path=ppt/slides/slide9.xml><?xml version="1.0" encoding="utf-8"?>
+<p:sld xmlns:a="http://schemas.openxmlformats.org/drawingml/2006/main" xmlns:r="http://schemas.openxmlformats.org/officeDocument/2006/relationships" xmlns:p="http://schemas.openxmlformats.org/presentationml/2006/main">
+  <p:cSld>
+    <p:spTree>
+      <p:nvGrpSpPr>
+        <p:cNvPr id="1" name=""/>
+        <p:cNvGrpSpPr/>
+        <p:nvPr/>
+      </p:nvGrpSpPr>
+      <p:grpSpPr>
+        <a:xfrm>
+          <a:off x="0" y="0"/>
+          <a:ext cx="0" cy="0"/>
+          <a:chOff x="0" y="0"/>
+          <a:chExt cx="0" cy="0"/>
+        </a:xfrm>
+      </p:grpSpPr>
+      <p:pic>
+        <p:nvPicPr>
+          <p:cNvPr id="6" name="그림 5">
+            <a:extLst>
+              <a:ext uri="{FF2B5EF4-FFF2-40B4-BE49-F238E27FC236}">
+                <a16:creationId xmlns:a16="http://schemas.microsoft.com/office/drawing/2014/main" id="{3BA61D0A-3CE9-DA49-AFBB-30F540B9F0C9}"/>
+              </a:ext>
+            </a:extLst>
+          </p:cNvPr>
+          <p:cNvPicPr>
+            <a:picLocks noChangeAspect="1"/>
+          </p:cNvPicPr>
+          <p:nvPr/>
+        </p:nvPicPr>
+        <p:blipFill>
+          <a:blip r:embed="rId2"/>
+          <a:stretch>
+            <a:fillRect/>
+          </a:stretch>
+        </p:blipFill>
+        <p:spPr>
+          <a:xfrm>
+            <a:off x="2874600" y="667800"/>
+            <a:ext cx="6442800" cy="2761200"/>
+          </a:xfrm>
+          <a:prstGeom prst="rect">
+            <a:avLst/>
+          </a:prstGeom>
+        </p:spPr>
+      </p:pic>
+      <p:pic>
+        <p:nvPicPr>
+          <p:cNvPr id="7" name="그림 6">
+            <a:extLst>
+              <a:ext uri="{FF2B5EF4-FFF2-40B4-BE49-F238E27FC236}">
+                <a16:creationId xmlns:a16="http://schemas.microsoft.com/office/drawing/2014/main" id="{5DD2E870-7EEA-EB49-9DF9-C7C7F7254F0B}"/>
+              </a:ext>
+            </a:extLst>
+          </p:cNvPr>
+          <p:cNvPicPr>
+            <a:picLocks noChangeAspect="1"/>
+          </p:cNvPicPr>
+          <p:nvPr/>
+        </p:nvPicPr>
+        <p:blipFill>
+          <a:blip r:embed="rId3"/>
+          <a:stretch>
+            <a:fillRect/>
+          </a:stretch>
+        </p:blipFill>
+        <p:spPr>
+          <a:xfrm>
+            <a:off x="1264477" y="3616687"/>
+            <a:ext cx="9663046" cy="2336400"/>
+          </a:xfrm>
+          <a:prstGeom prst="rect">
+            <a:avLst/>
+          </a:prstGeom>
+        </p:spPr>
+      </p:pic>
+      <p:sp>
+        <p:nvSpPr>
+          <p:cNvPr id="8" name="직사각형 7">
+            <a:extLst>
+              <a:ext uri="{FF2B5EF4-FFF2-40B4-BE49-F238E27FC236}">
+                <a16:creationId xmlns:a16="http://schemas.microsoft.com/office/drawing/2014/main" id="{580F3960-3C5F-154E-9C4A-82438A0F293C}"/>
+              </a:ext>
+            </a:extLst>
+          </p:cNvPr>
+          <p:cNvSpPr/>
+          <p:nvPr/>
+        </p:nvSpPr>
+        <p:spPr>
+          <a:xfrm>
+            <a:off x="788277" y="1281145"/>
+            <a:ext cx="2086324" cy="767255"/>
+          </a:xfrm>
+          <a:prstGeom prst="rect">
+            <a:avLst/>
+          </a:prstGeom>
+          <a:solidFill>
+            <a:schemeClr val="bg1"/>
+          </a:solidFill>
+          <a:ln>
+            <a:noFill/>
+          </a:ln>
+        </p:spPr>
+        <p:style>
+          <a:lnRef idx="2">
+            <a:schemeClr val="accent1">
+              <a:shade val="50000"/>
+            </a:schemeClr>
+          </a:lnRef>
+          <a:fillRef idx="1">
+            <a:schemeClr val="accent1"/>
+          </a:fillRef>
+          <a:effectRef idx="0">
+            <a:schemeClr val="accent1"/>
+          </a:effectRef>
+          <a:fontRef idx="minor">
+            <a:schemeClr val="lt1"/>
+          </a:fontRef>
+        </p:style>
+        <p:txBody>
+          <a:bodyPr rtlCol="0" anchor="ctr"/>
+          <a:lstStyle/>
+          <a:p>
+            <a:pPr algn="ctr"/>
+            <a:endParaRPr kumimoji="1" lang="ko-KR" altLang="en-US"/>
+          </a:p>
+        </p:txBody>
+      </p:sp>
+      <p:sp>
+        <p:nvSpPr>
+          <p:cNvPr id="9" name="직사각형 8">
+            <a:extLst>
+              <a:ext uri="{FF2B5EF4-FFF2-40B4-BE49-F238E27FC236}">
+                <a16:creationId xmlns:a16="http://schemas.microsoft.com/office/drawing/2014/main" id="{2FBABB01-CF88-3E4C-8263-D5DAEA271F0A}"/>
+              </a:ext>
+            </a:extLst>
+          </p:cNvPr>
+          <p:cNvSpPr/>
+          <p:nvPr/>
+        </p:nvSpPr>
+        <p:spPr>
+          <a:xfrm>
+            <a:off x="9317399" y="1412524"/>
+            <a:ext cx="2086324" cy="767255"/>
+          </a:xfrm>
+          <a:prstGeom prst="rect">
+            <a:avLst/>
+          </a:prstGeom>
+          <a:solidFill>
+            <a:schemeClr val="bg1"/>
+          </a:solidFill>
+          <a:ln>
+            <a:noFill/>
+          </a:ln>
+        </p:spPr>
+        <p:style>
+          <a:lnRef idx="2">
+            <a:schemeClr val="accent1">
+              <a:shade val="50000"/>
+            </a:schemeClr>
+          </a:lnRef>
+          <a:fillRef idx="1">
+            <a:schemeClr val="accent1"/>
+          </a:fillRef>
+          <a:effectRef idx="0">
+            <a:schemeClr val="accent1"/>
+          </a:effectRef>
+          <a:fontRef idx="minor">
+            <a:schemeClr val="lt1"/>
+          </a:fontRef>
+        </p:style>
+        <p:txBody>
+          <a:bodyPr rtlCol="0" anchor="ctr"/>
+          <a:lstStyle/>
+          <a:p>
+            <a:pPr algn="ctr"/>
+            <a:endParaRPr kumimoji="1" lang="ko-KR" altLang="en-US"/>
+          </a:p>
+        </p:txBody>
+      </p:sp>
+      <p:sp>
+        <p:nvSpPr>
+          <p:cNvPr id="10" name="TextBox 9">
+            <a:extLst>
+              <a:ext uri="{FF2B5EF4-FFF2-40B4-BE49-F238E27FC236}">
+                <a16:creationId xmlns:a16="http://schemas.microsoft.com/office/drawing/2014/main" id="{22C39DB8-F451-7142-A015-C6FBF174C4D8}"/>
+              </a:ext>
+            </a:extLst>
+          </p:cNvPr>
+          <p:cNvSpPr txBox="1"/>
+          <p:nvPr/>
+        </p:nvSpPr>
+        <p:spPr>
+          <a:xfrm>
+            <a:off x="9165021" y="294699"/>
+            <a:ext cx="2764221" cy="369332"/>
+          </a:xfrm>
+          <a:prstGeom prst="rect">
+            <a:avLst/>
+          </a:prstGeom>
+          <a:noFill/>
+        </p:spPr>
+        <p:txBody>
+          <a:bodyPr wrap="square" rtlCol="0">
+            <a:spAutoFit/>
+          </a:bodyPr>
+          <a:lstStyle/>
+          <a:p>
+            <a:r>
+              <a:rPr kumimoji="1" lang="ko-KR" altLang="en-US" dirty="0"/>
+              <a:t>출처 </a:t>
+            </a:r>
+            <a:r>
+              <a:rPr kumimoji="1" lang="en-US" altLang="ko-KR" dirty="0"/>
+              <a:t>:</a:t>
+            </a:r>
+            <a:r>
+              <a:rPr kumimoji="1" lang="ko-KR" altLang="en-US" dirty="0"/>
+              <a:t> </a:t>
+            </a:r>
+            <a:r>
+              <a:rPr kumimoji="1" lang="en" altLang="ko-KR" dirty="0"/>
+              <a:t>https://</a:t>
+            </a:r>
+            <a:r>
+              <a:rPr kumimoji="1" lang="en" altLang="ko-KR" dirty="0" err="1"/>
+              <a:t>url.kr</a:t>
+            </a:r>
+            <a:r>
+              <a:rPr kumimoji="1" lang="en" altLang="ko-KR" dirty="0"/>
+              <a:t>/76jl8x</a:t>
+            </a:r>
+            <a:endParaRPr kumimoji="1" lang="ko-KR" altLang="en-US" dirty="0"/>
+          </a:p>
+        </p:txBody>
+      </p:sp>
+    </p:spTree>
+    <p:extLst>
+      <p:ext uri="{BB962C8B-B14F-4D97-AF65-F5344CB8AC3E}">
+        <p14:creationId xmlns:p14="http://schemas.microsoft.com/office/powerpoint/2010/main" val="549916421"/>
+      </p:ext>
+    </p:extLst>
+  </p:cSld>
+  <p:clrMapOvr>
+    <a:masterClrMapping/>
+  </p:clrMapOvr>
+</p:sld>
+</file>
+
 <file path=ppt/theme/theme1.xml><?xml version="1.0" encoding="utf-8"?>
 <a:theme xmlns:a="http://schemas.openxmlformats.org/drawingml/2006/main" name="추억">
   <a:themeElements>

</xml_diff>

<commit_message>
docs: Add explanation of StructureFlow
</commit_message>
<xml_diff>
--- a/CVmodel.pptx
+++ b/CVmodel.pptx
@@ -4,6 +4,9 @@
   <p:sldMasterIdLst>
     <p:sldMasterId id="2147483677" r:id="rId1"/>
   </p:sldMasterIdLst>
+  <p:notesMasterIdLst>
+    <p:notesMasterId r:id="rId18"/>
+  </p:notesMasterIdLst>
   <p:sldIdLst>
     <p:sldId id="257" r:id="rId2"/>
     <p:sldId id="259" r:id="rId3"/>
@@ -14,6 +17,13 @@
     <p:sldId id="266" r:id="rId8"/>
     <p:sldId id="265" r:id="rId9"/>
     <p:sldId id="267" r:id="rId10"/>
+    <p:sldId id="268" r:id="rId11"/>
+    <p:sldId id="270" r:id="rId12"/>
+    <p:sldId id="272" r:id="rId13"/>
+    <p:sldId id="273" r:id="rId14"/>
+    <p:sldId id="271" r:id="rId15"/>
+    <p:sldId id="275" r:id="rId16"/>
+    <p:sldId id="276" r:id="rId17"/>
   </p:sldIdLst>
   <p:sldSz cx="12192000" cy="6858000"/>
   <p:notesSz cx="6858000" cy="9144000"/>
@@ -120,6 +130,775 @@
 </p:presentation>
 </file>
 
+<file path=ppt/notesMasters/notesMaster1.xml><?xml version="1.0" encoding="utf-8"?>
+<p:notesMaster xmlns:a="http://schemas.openxmlformats.org/drawingml/2006/main" xmlns:r="http://schemas.openxmlformats.org/officeDocument/2006/relationships" xmlns:p="http://schemas.openxmlformats.org/presentationml/2006/main">
+  <p:cSld>
+    <p:bg>
+      <p:bgRef idx="1001">
+        <a:schemeClr val="bg1"/>
+      </p:bgRef>
+    </p:bg>
+    <p:spTree>
+      <p:nvGrpSpPr>
+        <p:cNvPr id="1" name=""/>
+        <p:cNvGrpSpPr/>
+        <p:nvPr/>
+      </p:nvGrpSpPr>
+      <p:grpSpPr>
+        <a:xfrm>
+          <a:off x="0" y="0"/>
+          <a:ext cx="0" cy="0"/>
+          <a:chOff x="0" y="0"/>
+          <a:chExt cx="0" cy="0"/>
+        </a:xfrm>
+      </p:grpSpPr>
+      <p:sp>
+        <p:nvSpPr>
+          <p:cNvPr id="2" name="머리글 개체 틀 1"/>
+          <p:cNvSpPr>
+            <a:spLocks noGrp="1"/>
+          </p:cNvSpPr>
+          <p:nvPr>
+            <p:ph type="hdr" sz="quarter"/>
+          </p:nvPr>
+        </p:nvSpPr>
+        <p:spPr>
+          <a:xfrm>
+            <a:off x="0" y="0"/>
+            <a:ext cx="2971800" cy="458788"/>
+          </a:xfrm>
+          <a:prstGeom prst="rect">
+            <a:avLst/>
+          </a:prstGeom>
+        </p:spPr>
+        <p:txBody>
+          <a:bodyPr vert="horz" lIns="91440" tIns="45720" rIns="91440" bIns="45720" rtlCol="0"/>
+          <a:lstStyle>
+            <a:lvl1pPr algn="l">
+              <a:defRPr sz="1200"/>
+            </a:lvl1pPr>
+          </a:lstStyle>
+          <a:p>
+            <a:endParaRPr kumimoji="1" lang="ko-KR" altLang="en-US"/>
+          </a:p>
+        </p:txBody>
+      </p:sp>
+      <p:sp>
+        <p:nvSpPr>
+          <p:cNvPr id="3" name="날짜 개체 틀 2"/>
+          <p:cNvSpPr>
+            <a:spLocks noGrp="1"/>
+          </p:cNvSpPr>
+          <p:nvPr>
+            <p:ph type="dt" idx="1"/>
+          </p:nvPr>
+        </p:nvSpPr>
+        <p:spPr>
+          <a:xfrm>
+            <a:off x="3884613" y="0"/>
+            <a:ext cx="2971800" cy="458788"/>
+          </a:xfrm>
+          <a:prstGeom prst="rect">
+            <a:avLst/>
+          </a:prstGeom>
+        </p:spPr>
+        <p:txBody>
+          <a:bodyPr vert="horz" lIns="91440" tIns="45720" rIns="91440" bIns="45720" rtlCol="0"/>
+          <a:lstStyle>
+            <a:lvl1pPr algn="r">
+              <a:defRPr sz="1200"/>
+            </a:lvl1pPr>
+          </a:lstStyle>
+          <a:p>
+            <a:fld id="{3BE30DE1-5F41-9B44-B060-2050BC7A91A1}" type="datetimeFigureOut">
+              <a:rPr kumimoji="1" lang="ko-KR" altLang="en-US" smtClean="0"/>
+              <a:t>2021. 8. 11.</a:t>
+            </a:fld>
+            <a:endParaRPr kumimoji="1" lang="ko-KR" altLang="en-US"/>
+          </a:p>
+        </p:txBody>
+      </p:sp>
+      <p:sp>
+        <p:nvSpPr>
+          <p:cNvPr id="4" name="슬라이드 이미지 개체 틀 3"/>
+          <p:cNvSpPr>
+            <a:spLocks noGrp="1" noRot="1" noChangeAspect="1"/>
+          </p:cNvSpPr>
+          <p:nvPr>
+            <p:ph type="sldImg" idx="2"/>
+          </p:nvPr>
+        </p:nvSpPr>
+        <p:spPr>
+          <a:xfrm>
+            <a:off x="685800" y="1143000"/>
+            <a:ext cx="5486400" cy="3086100"/>
+          </a:xfrm>
+          <a:prstGeom prst="rect">
+            <a:avLst/>
+          </a:prstGeom>
+          <a:noFill/>
+          <a:ln w="12700">
+            <a:solidFill>
+              <a:prstClr val="black"/>
+            </a:solidFill>
+          </a:ln>
+        </p:spPr>
+        <p:txBody>
+          <a:bodyPr vert="horz" lIns="91440" tIns="45720" rIns="91440" bIns="45720" rtlCol="0" anchor="ctr"/>
+          <a:lstStyle/>
+          <a:p>
+            <a:endParaRPr lang="ko-KR" altLang="en-US"/>
+          </a:p>
+        </p:txBody>
+      </p:sp>
+      <p:sp>
+        <p:nvSpPr>
+          <p:cNvPr id="5" name="슬라이드 노트 개체 틀 4"/>
+          <p:cNvSpPr>
+            <a:spLocks noGrp="1"/>
+          </p:cNvSpPr>
+          <p:nvPr>
+            <p:ph type="body" sz="quarter" idx="3"/>
+          </p:nvPr>
+        </p:nvSpPr>
+        <p:spPr>
+          <a:xfrm>
+            <a:off x="685800" y="4400550"/>
+            <a:ext cx="5486400" cy="3600450"/>
+          </a:xfrm>
+          <a:prstGeom prst="rect">
+            <a:avLst/>
+          </a:prstGeom>
+        </p:spPr>
+        <p:txBody>
+          <a:bodyPr vert="horz" lIns="91440" tIns="45720" rIns="91440" bIns="45720" rtlCol="0"/>
+          <a:lstStyle/>
+          <a:p>
+            <a:pPr lvl="0"/>
+            <a:r>
+              <a:rPr kumimoji="1" lang="ko-KR" altLang="en-US"/>
+              <a:t>마스터 텍스트 스타일을 편집하려면 클릭</a:t>
+            </a:r>
+          </a:p>
+          <a:p>
+            <a:pPr lvl="1"/>
+            <a:r>
+              <a:rPr kumimoji="1" lang="ko-KR" altLang="en-US"/>
+              <a:t>두 번째 수준</a:t>
+            </a:r>
+          </a:p>
+          <a:p>
+            <a:pPr lvl="2"/>
+            <a:r>
+              <a:rPr kumimoji="1" lang="ko-KR" altLang="en-US"/>
+              <a:t>세 번째 수준</a:t>
+            </a:r>
+          </a:p>
+          <a:p>
+            <a:pPr lvl="3"/>
+            <a:r>
+              <a:rPr kumimoji="1" lang="ko-KR" altLang="en-US"/>
+              <a:t>네 번째 수준</a:t>
+            </a:r>
+          </a:p>
+          <a:p>
+            <a:pPr lvl="4"/>
+            <a:r>
+              <a:rPr kumimoji="1" lang="ko-KR" altLang="en-US"/>
+              <a:t>다섯 번째 수준</a:t>
+            </a:r>
+          </a:p>
+        </p:txBody>
+      </p:sp>
+      <p:sp>
+        <p:nvSpPr>
+          <p:cNvPr id="6" name="바닥글 개체 틀 5"/>
+          <p:cNvSpPr>
+            <a:spLocks noGrp="1"/>
+          </p:cNvSpPr>
+          <p:nvPr>
+            <p:ph type="ftr" sz="quarter" idx="4"/>
+          </p:nvPr>
+        </p:nvSpPr>
+        <p:spPr>
+          <a:xfrm>
+            <a:off x="0" y="8685213"/>
+            <a:ext cx="2971800" cy="458787"/>
+          </a:xfrm>
+          <a:prstGeom prst="rect">
+            <a:avLst/>
+          </a:prstGeom>
+        </p:spPr>
+        <p:txBody>
+          <a:bodyPr vert="horz" lIns="91440" tIns="45720" rIns="91440" bIns="45720" rtlCol="0" anchor="b"/>
+          <a:lstStyle>
+            <a:lvl1pPr algn="l">
+              <a:defRPr sz="1200"/>
+            </a:lvl1pPr>
+          </a:lstStyle>
+          <a:p>
+            <a:endParaRPr kumimoji="1" lang="ko-KR" altLang="en-US"/>
+          </a:p>
+        </p:txBody>
+      </p:sp>
+      <p:sp>
+        <p:nvSpPr>
+          <p:cNvPr id="7" name="슬라이드 번호 개체 틀 6"/>
+          <p:cNvSpPr>
+            <a:spLocks noGrp="1"/>
+          </p:cNvSpPr>
+          <p:nvPr>
+            <p:ph type="sldNum" sz="quarter" idx="5"/>
+          </p:nvPr>
+        </p:nvSpPr>
+        <p:spPr>
+          <a:xfrm>
+            <a:off x="3884613" y="8685213"/>
+            <a:ext cx="2971800" cy="458787"/>
+          </a:xfrm>
+          <a:prstGeom prst="rect">
+            <a:avLst/>
+          </a:prstGeom>
+        </p:spPr>
+        <p:txBody>
+          <a:bodyPr vert="horz" lIns="91440" tIns="45720" rIns="91440" bIns="45720" rtlCol="0" anchor="b"/>
+          <a:lstStyle>
+            <a:lvl1pPr algn="r">
+              <a:defRPr sz="1200"/>
+            </a:lvl1pPr>
+          </a:lstStyle>
+          <a:p>
+            <a:fld id="{B1EDE771-7B49-934A-8C1C-4C3B3320E55C}" type="slidenum">
+              <a:rPr kumimoji="1" lang="ko-KR" altLang="en-US" smtClean="0"/>
+              <a:t>‹#›</a:t>
+            </a:fld>
+            <a:endParaRPr kumimoji="1" lang="ko-KR" altLang="en-US"/>
+          </a:p>
+        </p:txBody>
+      </p:sp>
+    </p:spTree>
+    <p:extLst>
+      <p:ext uri="{BB962C8B-B14F-4D97-AF65-F5344CB8AC3E}">
+        <p14:creationId xmlns:p14="http://schemas.microsoft.com/office/powerpoint/2010/main" val="2535910603"/>
+      </p:ext>
+    </p:extLst>
+  </p:cSld>
+  <p:clrMap bg1="lt1" tx1="dk1" bg2="lt2" tx2="dk2" accent1="accent1" accent2="accent2" accent3="accent3" accent4="accent4" accent5="accent5" accent6="accent6" hlink="hlink" folHlink="folHlink"/>
+  <p:notesStyle>
+    <a:lvl1pPr marL="0" algn="l" defTabSz="914400" rtl="0" eaLnBrk="1" latinLnBrk="1" hangingPunct="1">
+      <a:defRPr sz="1200" kern="1200">
+        <a:solidFill>
+          <a:schemeClr val="tx1"/>
+        </a:solidFill>
+        <a:latin typeface="+mn-lt"/>
+        <a:ea typeface="+mn-ea"/>
+        <a:cs typeface="+mn-cs"/>
+      </a:defRPr>
+    </a:lvl1pPr>
+    <a:lvl2pPr marL="457200" algn="l" defTabSz="914400" rtl="0" eaLnBrk="1" latinLnBrk="1" hangingPunct="1">
+      <a:defRPr sz="1200" kern="1200">
+        <a:solidFill>
+          <a:schemeClr val="tx1"/>
+        </a:solidFill>
+        <a:latin typeface="+mn-lt"/>
+        <a:ea typeface="+mn-ea"/>
+        <a:cs typeface="+mn-cs"/>
+      </a:defRPr>
+    </a:lvl2pPr>
+    <a:lvl3pPr marL="914400" algn="l" defTabSz="914400" rtl="0" eaLnBrk="1" latinLnBrk="1" hangingPunct="1">
+      <a:defRPr sz="1200" kern="1200">
+        <a:solidFill>
+          <a:schemeClr val="tx1"/>
+        </a:solidFill>
+        <a:latin typeface="+mn-lt"/>
+        <a:ea typeface="+mn-ea"/>
+        <a:cs typeface="+mn-cs"/>
+      </a:defRPr>
+    </a:lvl3pPr>
+    <a:lvl4pPr marL="1371600" algn="l" defTabSz="914400" rtl="0" eaLnBrk="1" latinLnBrk="1" hangingPunct="1">
+      <a:defRPr sz="1200" kern="1200">
+        <a:solidFill>
+          <a:schemeClr val="tx1"/>
+        </a:solidFill>
+        <a:latin typeface="+mn-lt"/>
+        <a:ea typeface="+mn-ea"/>
+        <a:cs typeface="+mn-cs"/>
+      </a:defRPr>
+    </a:lvl4pPr>
+    <a:lvl5pPr marL="1828800" algn="l" defTabSz="914400" rtl="0" eaLnBrk="1" latinLnBrk="1" hangingPunct="1">
+      <a:defRPr sz="1200" kern="1200">
+        <a:solidFill>
+          <a:schemeClr val="tx1"/>
+        </a:solidFill>
+        <a:latin typeface="+mn-lt"/>
+        <a:ea typeface="+mn-ea"/>
+        <a:cs typeface="+mn-cs"/>
+      </a:defRPr>
+    </a:lvl5pPr>
+    <a:lvl6pPr marL="2286000" algn="l" defTabSz="914400" rtl="0" eaLnBrk="1" latinLnBrk="1" hangingPunct="1">
+      <a:defRPr sz="1200" kern="1200">
+        <a:solidFill>
+          <a:schemeClr val="tx1"/>
+        </a:solidFill>
+        <a:latin typeface="+mn-lt"/>
+        <a:ea typeface="+mn-ea"/>
+        <a:cs typeface="+mn-cs"/>
+      </a:defRPr>
+    </a:lvl6pPr>
+    <a:lvl7pPr marL="2743200" algn="l" defTabSz="914400" rtl="0" eaLnBrk="1" latinLnBrk="1" hangingPunct="1">
+      <a:defRPr sz="1200" kern="1200">
+        <a:solidFill>
+          <a:schemeClr val="tx1"/>
+        </a:solidFill>
+        <a:latin typeface="+mn-lt"/>
+        <a:ea typeface="+mn-ea"/>
+        <a:cs typeface="+mn-cs"/>
+      </a:defRPr>
+    </a:lvl7pPr>
+    <a:lvl8pPr marL="3200400" algn="l" defTabSz="914400" rtl="0" eaLnBrk="1" latinLnBrk="1" hangingPunct="1">
+      <a:defRPr sz="1200" kern="1200">
+        <a:solidFill>
+          <a:schemeClr val="tx1"/>
+        </a:solidFill>
+        <a:latin typeface="+mn-lt"/>
+        <a:ea typeface="+mn-ea"/>
+        <a:cs typeface="+mn-cs"/>
+      </a:defRPr>
+    </a:lvl8pPr>
+    <a:lvl9pPr marL="3657600" algn="l" defTabSz="914400" rtl="0" eaLnBrk="1" latinLnBrk="1" hangingPunct="1">
+      <a:defRPr sz="1200" kern="1200">
+        <a:solidFill>
+          <a:schemeClr val="tx1"/>
+        </a:solidFill>
+        <a:latin typeface="+mn-lt"/>
+        <a:ea typeface="+mn-ea"/>
+        <a:cs typeface="+mn-cs"/>
+      </a:defRPr>
+    </a:lvl9pPr>
+  </p:notesStyle>
+</p:notesMaster>
+</file>
+
+<file path=ppt/notesSlides/notesSlide1.xml><?xml version="1.0" encoding="utf-8"?>
+<p:notes xmlns:a="http://schemas.openxmlformats.org/drawingml/2006/main" xmlns:r="http://schemas.openxmlformats.org/officeDocument/2006/relationships" xmlns:p="http://schemas.openxmlformats.org/presentationml/2006/main">
+  <p:cSld>
+    <p:spTree>
+      <p:nvGrpSpPr>
+        <p:cNvPr id="1" name=""/>
+        <p:cNvGrpSpPr/>
+        <p:nvPr/>
+      </p:nvGrpSpPr>
+      <p:grpSpPr>
+        <a:xfrm>
+          <a:off x="0" y="0"/>
+          <a:ext cx="0" cy="0"/>
+          <a:chOff x="0" y="0"/>
+          <a:chExt cx="0" cy="0"/>
+        </a:xfrm>
+      </p:grpSpPr>
+      <p:sp>
+        <p:nvSpPr>
+          <p:cNvPr id="2" name="슬라이드 이미지 개체 틀 1"/>
+          <p:cNvSpPr>
+            <a:spLocks noGrp="1" noRot="1" noChangeAspect="1"/>
+          </p:cNvSpPr>
+          <p:nvPr>
+            <p:ph type="sldImg"/>
+          </p:nvPr>
+        </p:nvSpPr>
+        <p:spPr/>
+      </p:sp>
+      <p:sp>
+        <p:nvSpPr>
+          <p:cNvPr id="3" name="슬라이드 노트 개체 틀 2"/>
+          <p:cNvSpPr>
+            <a:spLocks noGrp="1"/>
+          </p:cNvSpPr>
+          <p:nvPr>
+            <p:ph type="body" idx="1"/>
+          </p:nvPr>
+        </p:nvSpPr>
+        <p:spPr/>
+        <p:txBody>
+          <a:bodyPr/>
+          <a:lstStyle/>
+          <a:p>
+            <a:endParaRPr kumimoji="1" lang="ko-KR" altLang="en-US"/>
+          </a:p>
+        </p:txBody>
+      </p:sp>
+      <p:sp>
+        <p:nvSpPr>
+          <p:cNvPr id="4" name="슬라이드 번호 개체 틀 3"/>
+          <p:cNvSpPr>
+            <a:spLocks noGrp="1"/>
+          </p:cNvSpPr>
+          <p:nvPr>
+            <p:ph type="sldNum" sz="quarter" idx="5"/>
+          </p:nvPr>
+        </p:nvSpPr>
+        <p:spPr/>
+        <p:txBody>
+          <a:bodyPr/>
+          <a:lstStyle/>
+          <a:p>
+            <a:fld id="{B1EDE771-7B49-934A-8C1C-4C3B3320E55C}" type="slidenum">
+              <a:rPr kumimoji="1" lang="ko-KR" altLang="en-US" smtClean="0"/>
+              <a:t>1</a:t>
+            </a:fld>
+            <a:endParaRPr kumimoji="1" lang="ko-KR" altLang="en-US"/>
+          </a:p>
+        </p:txBody>
+      </p:sp>
+    </p:spTree>
+    <p:extLst>
+      <p:ext uri="{BB962C8B-B14F-4D97-AF65-F5344CB8AC3E}">
+        <p14:creationId xmlns:p14="http://schemas.microsoft.com/office/powerpoint/2010/main" val="635294064"/>
+      </p:ext>
+    </p:extLst>
+  </p:cSld>
+  <p:clrMapOvr>
+    <a:masterClrMapping/>
+  </p:clrMapOvr>
+</p:notes>
+</file>
+
+<file path=ppt/notesSlides/notesSlide2.xml><?xml version="1.0" encoding="utf-8"?>
+<p:notes xmlns:a="http://schemas.openxmlformats.org/drawingml/2006/main" xmlns:r="http://schemas.openxmlformats.org/officeDocument/2006/relationships" xmlns:p="http://schemas.openxmlformats.org/presentationml/2006/main">
+  <p:cSld>
+    <p:spTree>
+      <p:nvGrpSpPr>
+        <p:cNvPr id="1" name=""/>
+        <p:cNvGrpSpPr/>
+        <p:nvPr/>
+      </p:nvGrpSpPr>
+      <p:grpSpPr>
+        <a:xfrm>
+          <a:off x="0" y="0"/>
+          <a:ext cx="0" cy="0"/>
+          <a:chOff x="0" y="0"/>
+          <a:chExt cx="0" cy="0"/>
+        </a:xfrm>
+      </p:grpSpPr>
+      <p:sp>
+        <p:nvSpPr>
+          <p:cNvPr id="2" name="슬라이드 이미지 개체 틀 1"/>
+          <p:cNvSpPr>
+            <a:spLocks noGrp="1" noRot="1" noChangeAspect="1"/>
+          </p:cNvSpPr>
+          <p:nvPr>
+            <p:ph type="sldImg"/>
+          </p:nvPr>
+        </p:nvSpPr>
+        <p:spPr/>
+      </p:sp>
+      <p:sp>
+        <p:nvSpPr>
+          <p:cNvPr id="3" name="슬라이드 노트 개체 틀 2"/>
+          <p:cNvSpPr>
+            <a:spLocks noGrp="1"/>
+          </p:cNvSpPr>
+          <p:nvPr>
+            <p:ph type="body" idx="1"/>
+          </p:nvPr>
+        </p:nvSpPr>
+        <p:spPr/>
+        <p:txBody>
+          <a:bodyPr/>
+          <a:lstStyle/>
+          <a:p>
+            <a:endParaRPr kumimoji="1" lang="ko-KR" altLang="en-US"/>
+          </a:p>
+        </p:txBody>
+      </p:sp>
+      <p:sp>
+        <p:nvSpPr>
+          <p:cNvPr id="4" name="슬라이드 번호 개체 틀 3"/>
+          <p:cNvSpPr>
+            <a:spLocks noGrp="1"/>
+          </p:cNvSpPr>
+          <p:nvPr>
+            <p:ph type="sldNum" sz="quarter" idx="5"/>
+          </p:nvPr>
+        </p:nvSpPr>
+        <p:spPr/>
+        <p:txBody>
+          <a:bodyPr/>
+          <a:lstStyle/>
+          <a:p>
+            <a:fld id="{B1EDE771-7B49-934A-8C1C-4C3B3320E55C}" type="slidenum">
+              <a:rPr kumimoji="1" lang="ko-KR" altLang="en-US" smtClean="0"/>
+              <a:t>2</a:t>
+            </a:fld>
+            <a:endParaRPr kumimoji="1" lang="ko-KR" altLang="en-US"/>
+          </a:p>
+        </p:txBody>
+      </p:sp>
+    </p:spTree>
+    <p:extLst>
+      <p:ext uri="{BB962C8B-B14F-4D97-AF65-F5344CB8AC3E}">
+        <p14:creationId xmlns:p14="http://schemas.microsoft.com/office/powerpoint/2010/main" val="767661913"/>
+      </p:ext>
+    </p:extLst>
+  </p:cSld>
+  <p:clrMapOvr>
+    <a:masterClrMapping/>
+  </p:clrMapOvr>
+</p:notes>
+</file>
+
+<file path=ppt/notesSlides/notesSlide3.xml><?xml version="1.0" encoding="utf-8"?>
+<p:notes xmlns:a="http://schemas.openxmlformats.org/drawingml/2006/main" xmlns:r="http://schemas.openxmlformats.org/officeDocument/2006/relationships" xmlns:p="http://schemas.openxmlformats.org/presentationml/2006/main">
+  <p:cSld>
+    <p:spTree>
+      <p:nvGrpSpPr>
+        <p:cNvPr id="1" name=""/>
+        <p:cNvGrpSpPr/>
+        <p:nvPr/>
+      </p:nvGrpSpPr>
+      <p:grpSpPr>
+        <a:xfrm>
+          <a:off x="0" y="0"/>
+          <a:ext cx="0" cy="0"/>
+          <a:chOff x="0" y="0"/>
+          <a:chExt cx="0" cy="0"/>
+        </a:xfrm>
+      </p:grpSpPr>
+      <p:sp>
+        <p:nvSpPr>
+          <p:cNvPr id="2" name="슬라이드 이미지 개체 틀 1"/>
+          <p:cNvSpPr>
+            <a:spLocks noGrp="1" noRot="1" noChangeAspect="1"/>
+          </p:cNvSpPr>
+          <p:nvPr>
+            <p:ph type="sldImg"/>
+          </p:nvPr>
+        </p:nvSpPr>
+        <p:spPr/>
+      </p:sp>
+      <p:sp>
+        <p:nvSpPr>
+          <p:cNvPr id="3" name="슬라이드 노트 개체 틀 2"/>
+          <p:cNvSpPr>
+            <a:spLocks noGrp="1"/>
+          </p:cNvSpPr>
+          <p:nvPr>
+            <p:ph type="body" idx="1"/>
+          </p:nvPr>
+        </p:nvSpPr>
+        <p:spPr/>
+        <p:txBody>
+          <a:bodyPr/>
+          <a:lstStyle/>
+          <a:p>
+            <a:endParaRPr kumimoji="1" lang="ko-KR" altLang="en-US"/>
+          </a:p>
+        </p:txBody>
+      </p:sp>
+      <p:sp>
+        <p:nvSpPr>
+          <p:cNvPr id="4" name="슬라이드 번호 개체 틀 3"/>
+          <p:cNvSpPr>
+            <a:spLocks noGrp="1"/>
+          </p:cNvSpPr>
+          <p:nvPr>
+            <p:ph type="sldNum" sz="quarter" idx="5"/>
+          </p:nvPr>
+        </p:nvSpPr>
+        <p:spPr/>
+        <p:txBody>
+          <a:bodyPr/>
+          <a:lstStyle/>
+          <a:p>
+            <a:fld id="{B1EDE771-7B49-934A-8C1C-4C3B3320E55C}" type="slidenum">
+              <a:rPr kumimoji="1" lang="ko-KR" altLang="en-US" smtClean="0"/>
+              <a:t>8</a:t>
+            </a:fld>
+            <a:endParaRPr kumimoji="1" lang="ko-KR" altLang="en-US"/>
+          </a:p>
+        </p:txBody>
+      </p:sp>
+    </p:spTree>
+    <p:extLst>
+      <p:ext uri="{BB962C8B-B14F-4D97-AF65-F5344CB8AC3E}">
+        <p14:creationId xmlns:p14="http://schemas.microsoft.com/office/powerpoint/2010/main" val="4137924455"/>
+      </p:ext>
+    </p:extLst>
+  </p:cSld>
+  <p:clrMapOvr>
+    <a:masterClrMapping/>
+  </p:clrMapOvr>
+</p:notes>
+</file>
+
+<file path=ppt/notesSlides/notesSlide4.xml><?xml version="1.0" encoding="utf-8"?>
+<p:notes xmlns:a="http://schemas.openxmlformats.org/drawingml/2006/main" xmlns:r="http://schemas.openxmlformats.org/officeDocument/2006/relationships" xmlns:p="http://schemas.openxmlformats.org/presentationml/2006/main">
+  <p:cSld>
+    <p:spTree>
+      <p:nvGrpSpPr>
+        <p:cNvPr id="1" name=""/>
+        <p:cNvGrpSpPr/>
+        <p:nvPr/>
+      </p:nvGrpSpPr>
+      <p:grpSpPr>
+        <a:xfrm>
+          <a:off x="0" y="0"/>
+          <a:ext cx="0" cy="0"/>
+          <a:chOff x="0" y="0"/>
+          <a:chExt cx="0" cy="0"/>
+        </a:xfrm>
+      </p:grpSpPr>
+      <p:sp>
+        <p:nvSpPr>
+          <p:cNvPr id="2" name="슬라이드 이미지 개체 틀 1"/>
+          <p:cNvSpPr>
+            <a:spLocks noGrp="1" noRot="1" noChangeAspect="1"/>
+          </p:cNvSpPr>
+          <p:nvPr>
+            <p:ph type="sldImg"/>
+          </p:nvPr>
+        </p:nvSpPr>
+        <p:spPr/>
+      </p:sp>
+      <p:sp>
+        <p:nvSpPr>
+          <p:cNvPr id="3" name="슬라이드 노트 개체 틀 2"/>
+          <p:cNvSpPr>
+            <a:spLocks noGrp="1"/>
+          </p:cNvSpPr>
+          <p:nvPr>
+            <p:ph type="body" idx="1"/>
+          </p:nvPr>
+        </p:nvSpPr>
+        <p:spPr/>
+        <p:txBody>
+          <a:bodyPr/>
+          <a:lstStyle/>
+          <a:p>
+            <a:endParaRPr kumimoji="1" lang="ko-KR" altLang="en-US"/>
+          </a:p>
+        </p:txBody>
+      </p:sp>
+      <p:sp>
+        <p:nvSpPr>
+          <p:cNvPr id="4" name="슬라이드 번호 개체 틀 3"/>
+          <p:cNvSpPr>
+            <a:spLocks noGrp="1"/>
+          </p:cNvSpPr>
+          <p:nvPr>
+            <p:ph type="sldNum" sz="quarter" idx="5"/>
+          </p:nvPr>
+        </p:nvSpPr>
+        <p:spPr/>
+        <p:txBody>
+          <a:bodyPr/>
+          <a:lstStyle/>
+          <a:p>
+            <a:fld id="{B1EDE771-7B49-934A-8C1C-4C3B3320E55C}" type="slidenum">
+              <a:rPr kumimoji="1" lang="ko-KR" altLang="en-US" smtClean="0"/>
+              <a:t>10</a:t>
+            </a:fld>
+            <a:endParaRPr kumimoji="1" lang="ko-KR" altLang="en-US"/>
+          </a:p>
+        </p:txBody>
+      </p:sp>
+    </p:spTree>
+    <p:extLst>
+      <p:ext uri="{BB962C8B-B14F-4D97-AF65-F5344CB8AC3E}">
+        <p14:creationId xmlns:p14="http://schemas.microsoft.com/office/powerpoint/2010/main" val="4017207851"/>
+      </p:ext>
+    </p:extLst>
+  </p:cSld>
+  <p:clrMapOvr>
+    <a:masterClrMapping/>
+  </p:clrMapOvr>
+</p:notes>
+</file>
+
+<file path=ppt/notesSlides/notesSlide5.xml><?xml version="1.0" encoding="utf-8"?>
+<p:notes xmlns:a="http://schemas.openxmlformats.org/drawingml/2006/main" xmlns:r="http://schemas.openxmlformats.org/officeDocument/2006/relationships" xmlns:p="http://schemas.openxmlformats.org/presentationml/2006/main">
+  <p:cSld>
+    <p:spTree>
+      <p:nvGrpSpPr>
+        <p:cNvPr id="1" name=""/>
+        <p:cNvGrpSpPr/>
+        <p:nvPr/>
+      </p:nvGrpSpPr>
+      <p:grpSpPr>
+        <a:xfrm>
+          <a:off x="0" y="0"/>
+          <a:ext cx="0" cy="0"/>
+          <a:chOff x="0" y="0"/>
+          <a:chExt cx="0" cy="0"/>
+        </a:xfrm>
+      </p:grpSpPr>
+      <p:sp>
+        <p:nvSpPr>
+          <p:cNvPr id="2" name="슬라이드 이미지 개체 틀 1"/>
+          <p:cNvSpPr>
+            <a:spLocks noGrp="1" noRot="1" noChangeAspect="1"/>
+          </p:cNvSpPr>
+          <p:nvPr>
+            <p:ph type="sldImg"/>
+          </p:nvPr>
+        </p:nvSpPr>
+        <p:spPr/>
+      </p:sp>
+      <p:sp>
+        <p:nvSpPr>
+          <p:cNvPr id="3" name="슬라이드 노트 개체 틀 2"/>
+          <p:cNvSpPr>
+            <a:spLocks noGrp="1"/>
+          </p:cNvSpPr>
+          <p:nvPr>
+            <p:ph type="body" idx="1"/>
+          </p:nvPr>
+        </p:nvSpPr>
+        <p:spPr/>
+        <p:txBody>
+          <a:bodyPr/>
+          <a:lstStyle/>
+          <a:p>
+            <a:endParaRPr kumimoji="1" lang="ko-KR" altLang="en-US"/>
+          </a:p>
+        </p:txBody>
+      </p:sp>
+      <p:sp>
+        <p:nvSpPr>
+          <p:cNvPr id="4" name="슬라이드 번호 개체 틀 3"/>
+          <p:cNvSpPr>
+            <a:spLocks noGrp="1"/>
+          </p:cNvSpPr>
+          <p:nvPr>
+            <p:ph type="sldNum" sz="quarter" idx="5"/>
+          </p:nvPr>
+        </p:nvSpPr>
+        <p:spPr/>
+        <p:txBody>
+          <a:bodyPr/>
+          <a:lstStyle/>
+          <a:p>
+            <a:fld id="{B1EDE771-7B49-934A-8C1C-4C3B3320E55C}" type="slidenum">
+              <a:rPr kumimoji="1" lang="ko-KR" altLang="en-US" smtClean="0"/>
+              <a:t>14</a:t>
+            </a:fld>
+            <a:endParaRPr kumimoji="1" lang="ko-KR" altLang="en-US"/>
+          </a:p>
+        </p:txBody>
+      </p:sp>
+    </p:spTree>
+    <p:extLst>
+      <p:ext uri="{BB962C8B-B14F-4D97-AF65-F5344CB8AC3E}">
+        <p14:creationId xmlns:p14="http://schemas.microsoft.com/office/powerpoint/2010/main" val="3247905900"/>
+      </p:ext>
+    </p:extLst>
+  </p:cSld>
+  <p:clrMapOvr>
+    <a:masterClrMapping/>
+  </p:clrMapOvr>
+</p:notes>
+</file>
+
 <file path=ppt/slideLayouts/slideLayout1.xml><?xml version="1.0" encoding="utf-8"?>
 <p:sldLayout xmlns:a="http://schemas.openxmlformats.org/drawingml/2006/main" xmlns:r="http://schemas.openxmlformats.org/officeDocument/2006/relationships" xmlns:p="http://schemas.openxmlformats.org/presentationml/2006/main" showMasterSp="0" type="title" preserve="1">
   <p:cSld name="제목 슬라이드">
@@ -346,7 +1125,7 @@
           <a:p>
             <a:fld id="{0660F544-F31F-477B-B3B3-D51790F8BF21}" type="datetimeFigureOut">
               <a:rPr lang="ko-KR" altLang="en-US" smtClean="0"/>
-              <a:t>2021. 8. 9.</a:t>
+              <a:t>2021. 8. 11.</a:t>
             </a:fld>
             <a:endParaRPr lang="ko-KR" altLang="en-US"/>
           </a:p>
@@ -554,7 +1333,7 @@
           <a:p>
             <a:fld id="{0660F544-F31F-477B-B3B3-D51790F8BF21}" type="datetimeFigureOut">
               <a:rPr lang="ko-KR" altLang="en-US" smtClean="0"/>
-              <a:t>2021. 8. 9.</a:t>
+              <a:t>2021. 8. 11.</a:t>
             </a:fld>
             <a:endParaRPr lang="ko-KR" altLang="en-US"/>
           </a:p>
@@ -810,7 +1589,7 @@
           <a:p>
             <a:fld id="{0660F544-F31F-477B-B3B3-D51790F8BF21}" type="datetimeFigureOut">
               <a:rPr lang="ko-KR" altLang="en-US" smtClean="0"/>
-              <a:t>2021. 8. 9.</a:t>
+              <a:t>2021. 8. 11.</a:t>
             </a:fld>
             <a:endParaRPr lang="ko-KR" altLang="en-US"/>
           </a:p>
@@ -984,7 +1763,7 @@
           <a:p>
             <a:fld id="{0660F544-F31F-477B-B3B3-D51790F8BF21}" type="datetimeFigureOut">
               <a:rPr lang="ko-KR" altLang="en-US" smtClean="0"/>
-              <a:t>2021. 8. 9.</a:t>
+              <a:t>2021. 8. 11.</a:t>
             </a:fld>
             <a:endParaRPr lang="ko-KR" altLang="en-US"/>
           </a:p>
@@ -1327,7 +2106,7 @@
           <a:p>
             <a:fld id="{0660F544-F31F-477B-B3B3-D51790F8BF21}" type="datetimeFigureOut">
               <a:rPr lang="ko-KR" altLang="en-US" smtClean="0"/>
-              <a:t>2021. 8. 9.</a:t>
+              <a:t>2021. 8. 11.</a:t>
             </a:fld>
             <a:endParaRPr lang="ko-KR" altLang="en-US"/>
           </a:p>
@@ -1602,7 +2381,7 @@
           <a:p>
             <a:fld id="{0660F544-F31F-477B-B3B3-D51790F8BF21}" type="datetimeFigureOut">
               <a:rPr lang="ko-KR" altLang="en-US" smtClean="0"/>
-              <a:t>2021. 8. 9.</a:t>
+              <a:t>2021. 8. 11.</a:t>
             </a:fld>
             <a:endParaRPr lang="ko-KR" altLang="en-US"/>
           </a:p>
@@ -1981,7 +2760,7 @@
           <a:p>
             <a:fld id="{0660F544-F31F-477B-B3B3-D51790F8BF21}" type="datetimeFigureOut">
               <a:rPr lang="ko-KR" altLang="en-US" smtClean="0"/>
-              <a:t>2021. 8. 9.</a:t>
+              <a:t>2021. 8. 11.</a:t>
             </a:fld>
             <a:endParaRPr lang="ko-KR" altLang="en-US"/>
           </a:p>
@@ -2099,7 +2878,7 @@
           <a:p>
             <a:fld id="{0660F544-F31F-477B-B3B3-D51790F8BF21}" type="datetimeFigureOut">
               <a:rPr lang="ko-KR" altLang="en-US" smtClean="0"/>
-              <a:t>2021. 8. 9.</a:t>
+              <a:t>2021. 8. 11.</a:t>
             </a:fld>
             <a:endParaRPr lang="ko-KR" altLang="en-US"/>
           </a:p>
@@ -2270,7 +3049,7 @@
           <a:p>
             <a:fld id="{0660F544-F31F-477B-B3B3-D51790F8BF21}" type="datetimeFigureOut">
               <a:rPr lang="ko-KR" altLang="en-US" smtClean="0"/>
-              <a:t>2021. 8. 9.</a:t>
+              <a:t>2021. 8. 11.</a:t>
             </a:fld>
             <a:endParaRPr lang="ko-KR" altLang="en-US"/>
           </a:p>
@@ -2624,7 +3403,7 @@
           <a:p>
             <a:fld id="{0660F544-F31F-477B-B3B3-D51790F8BF21}" type="datetimeFigureOut">
               <a:rPr lang="ko-KR" altLang="en-US" smtClean="0"/>
-              <a:t>2021. 8. 9.</a:t>
+              <a:t>2021. 8. 11.</a:t>
             </a:fld>
             <a:endParaRPr lang="ko-KR" altLang="en-US"/>
           </a:p>
@@ -3006,7 +3785,7 @@
           <a:p>
             <a:fld id="{0660F544-F31F-477B-B3B3-D51790F8BF21}" type="datetimeFigureOut">
               <a:rPr lang="ko-KR" altLang="en-US" smtClean="0"/>
-              <a:t>2021. 8. 9.</a:t>
+              <a:t>2021. 8. 11.</a:t>
             </a:fld>
             <a:endParaRPr lang="ko-KR" altLang="en-US"/>
           </a:p>
@@ -3293,7 +4072,7 @@
           <a:p>
             <a:fld id="{0660F544-F31F-477B-B3B3-D51790F8BF21}" type="datetimeFigureOut">
               <a:rPr lang="ko-KR" altLang="en-US" smtClean="0"/>
-              <a:t>2021. 8. 9.</a:t>
+              <a:t>2021. 8. 11.</a:t>
             </a:fld>
             <a:endParaRPr lang="ko-KR" altLang="en-US"/>
           </a:p>
@@ -4154,7 +4933,7 @@
           <p:nvPr/>
         </p:nvPicPr>
         <p:blipFill>
-          <a:blip r:embed="rId2">
+          <a:blip r:embed="rId3">
             <a:extLst>
               <a:ext uri="{28A0092B-C50C-407E-A947-70E740481C1C}">
                 <a14:useLocalDpi xmlns:a14="http://schemas.microsoft.com/office/drawing/2010/main" val="0"/>
@@ -4201,7 +4980,7 @@
           <p:nvPr/>
         </p:nvPicPr>
         <p:blipFill>
-          <a:blip r:embed="rId3"/>
+          <a:blip r:embed="rId4"/>
           <a:stretch>
             <a:fillRect/>
           </a:stretch>
@@ -4229,6 +5008,2133 @@
 </p:sld>
 </file>
 
+<file path=ppt/slides/slide10.xml><?xml version="1.0" encoding="utf-8"?>
+<p:sld xmlns:a="http://schemas.openxmlformats.org/drawingml/2006/main" xmlns:r="http://schemas.openxmlformats.org/officeDocument/2006/relationships" xmlns:p="http://schemas.openxmlformats.org/presentationml/2006/main">
+  <p:cSld>
+    <p:spTree>
+      <p:nvGrpSpPr>
+        <p:cNvPr id="1" name=""/>
+        <p:cNvGrpSpPr/>
+        <p:nvPr/>
+      </p:nvGrpSpPr>
+      <p:grpSpPr>
+        <a:xfrm>
+          <a:off x="0" y="0"/>
+          <a:ext cx="0" cy="0"/>
+          <a:chOff x="0" y="0"/>
+          <a:chExt cx="0" cy="0"/>
+        </a:xfrm>
+      </p:grpSpPr>
+      <p:sp>
+        <p:nvSpPr>
+          <p:cNvPr id="4" name="TextBox 3">
+            <a:extLst>
+              <a:ext uri="{FF2B5EF4-FFF2-40B4-BE49-F238E27FC236}">
+                <a16:creationId xmlns:a16="http://schemas.microsoft.com/office/drawing/2014/main" id="{C843F9AF-F496-4F52-B425-94A4B9EE37E3}"/>
+              </a:ext>
+            </a:extLst>
+          </p:cNvPr>
+          <p:cNvSpPr txBox="1"/>
+          <p:nvPr/>
+        </p:nvSpPr>
+        <p:spPr>
+          <a:xfrm>
+            <a:off x="1182314" y="723439"/>
+            <a:ext cx="10587928" cy="4198842"/>
+          </a:xfrm>
+          <a:prstGeom prst="rect">
+            <a:avLst/>
+          </a:prstGeom>
+          <a:noFill/>
+        </p:spPr>
+        <p:txBody>
+          <a:bodyPr wrap="square" rtlCol="0">
+            <a:spAutoFit/>
+          </a:bodyPr>
+          <a:lstStyle/>
+          <a:p>
+            <a:pPr>
+              <a:lnSpc>
+                <a:spcPct val="150000"/>
+              </a:lnSpc>
+            </a:pPr>
+            <a:r>
+              <a:rPr kumimoji="1" lang="en-US" altLang="ko-KR" sz="2400" dirty="0" err="1">
+                <a:latin typeface="나눔고딕" panose="020D0604000000000000" pitchFamily="50" charset="-127"/>
+                <a:ea typeface="나눔고딕" panose="020D0604000000000000" pitchFamily="50" charset="-127"/>
+              </a:rPr>
+              <a:t>StructureFlow</a:t>
+            </a:r>
+            <a:r>
+              <a:rPr kumimoji="1" lang="en-US" altLang="ko-KR" sz="2400" dirty="0">
+                <a:latin typeface="나눔고딕" panose="020D0604000000000000" pitchFamily="50" charset="-127"/>
+                <a:ea typeface="나눔고딕" panose="020D0604000000000000" pitchFamily="50" charset="-127"/>
+              </a:rPr>
+              <a:t> : image inpainting via structure-aware appearance flow</a:t>
+            </a:r>
+          </a:p>
+          <a:p>
+            <a:pPr>
+              <a:lnSpc>
+                <a:spcPct val="150000"/>
+              </a:lnSpc>
+            </a:pPr>
+            <a:endParaRPr lang="en-US" altLang="ko-KR" dirty="0">
+              <a:latin typeface="나눔고딕" panose="020D0604000000000000" pitchFamily="50" charset="-127"/>
+              <a:ea typeface="나눔고딕" panose="020D0604000000000000" pitchFamily="50" charset="-127"/>
+            </a:endParaRPr>
+          </a:p>
+          <a:p>
+            <a:pPr marL="285750" indent="-285750">
+              <a:lnSpc>
+                <a:spcPct val="200000"/>
+              </a:lnSpc>
+              <a:buFont typeface="Arial" panose="020B0604020202020204" pitchFamily="34" charset="0"/>
+              <a:buChar char="•"/>
+            </a:pPr>
+            <a:r>
+              <a:rPr lang="en-US" altLang="ko-KR" dirty="0">
+                <a:latin typeface="나눔고딕" panose="020D0604000000000000" pitchFamily="50" charset="-127"/>
+                <a:ea typeface="나눔고딕" panose="020D0604000000000000" pitchFamily="50" charset="-127"/>
+              </a:rPr>
+              <a:t>Structure reconstruction, Texture generation</a:t>
+            </a:r>
+          </a:p>
+          <a:p>
+            <a:pPr marL="285750" indent="-285750">
+              <a:lnSpc>
+                <a:spcPct val="200000"/>
+              </a:lnSpc>
+              <a:buFont typeface="Arial" panose="020B0604020202020204" pitchFamily="34" charset="0"/>
+              <a:buChar char="•"/>
+            </a:pPr>
+            <a:r>
+              <a:rPr lang="en-US" altLang="ko-KR" dirty="0">
+                <a:latin typeface="나눔고딕" panose="020D0604000000000000" pitchFamily="50" charset="-127"/>
+                <a:ea typeface="나눔고딕" panose="020D0604000000000000" pitchFamily="50" charset="-127"/>
+              </a:rPr>
+              <a:t>Bilinear sampling </a:t>
+            </a:r>
+            <a:r>
+              <a:rPr lang="ko-KR" altLang="en-US" dirty="0">
+                <a:latin typeface="나눔고딕" panose="020D0604000000000000" pitchFamily="50" charset="-127"/>
+                <a:ea typeface="나눔고딕" panose="020D0604000000000000" pitchFamily="50" charset="-127"/>
+              </a:rPr>
+              <a:t>대신 </a:t>
+            </a:r>
+            <a:r>
+              <a:rPr lang="en-US" altLang="ko-KR" dirty="0">
+                <a:latin typeface="나눔고딕" panose="020D0604000000000000" pitchFamily="50" charset="-127"/>
+                <a:ea typeface="나눔고딕" panose="020D0604000000000000" pitchFamily="50" charset="-127"/>
+              </a:rPr>
+              <a:t>Gaussian sampling</a:t>
+            </a:r>
+            <a:r>
+              <a:rPr lang="ko-KR" altLang="en-US" dirty="0">
+                <a:latin typeface="나눔고딕" panose="020D0604000000000000" pitchFamily="50" charset="-127"/>
+                <a:ea typeface="나눔고딕" panose="020D0604000000000000" pitchFamily="50" charset="-127"/>
+              </a:rPr>
+              <a:t>을 사용해 </a:t>
+            </a:r>
+            <a:r>
+              <a:rPr lang="en-US" altLang="ko-KR" dirty="0">
+                <a:latin typeface="나눔고딕" panose="020D0604000000000000" pitchFamily="50" charset="-127"/>
+                <a:ea typeface="나눔고딕" panose="020D0604000000000000" pitchFamily="50" charset="-127"/>
+              </a:rPr>
+              <a:t>sampling </a:t>
+            </a:r>
+            <a:r>
+              <a:rPr lang="ko-KR" altLang="en-US" dirty="0">
+                <a:latin typeface="나눔고딕" panose="020D0604000000000000" pitchFamily="50" charset="-127"/>
+                <a:ea typeface="나눔고딕" panose="020D0604000000000000" pitchFamily="50" charset="-127"/>
+              </a:rPr>
+              <a:t>작업의 </a:t>
+            </a:r>
+            <a:r>
+              <a:rPr lang="en-US" altLang="ko-KR" dirty="0">
+                <a:latin typeface="나눔고딕" panose="020D0604000000000000" pitchFamily="50" charset="-127"/>
+                <a:ea typeface="나눔고딕" panose="020D0604000000000000" pitchFamily="50" charset="-127"/>
+              </a:rPr>
+              <a:t>receptive field </a:t>
+            </a:r>
+            <a:r>
+              <a:rPr lang="ko-KR" altLang="en-US" dirty="0">
+                <a:latin typeface="나눔고딕" panose="020D0604000000000000" pitchFamily="50" charset="-127"/>
+                <a:ea typeface="나눔고딕" panose="020D0604000000000000" pitchFamily="50" charset="-127"/>
+              </a:rPr>
+              <a:t>확장</a:t>
+            </a:r>
+            <a:endParaRPr lang="en-US" altLang="ko-KR" dirty="0">
+              <a:latin typeface="나눔고딕" panose="020D0604000000000000" pitchFamily="50" charset="-127"/>
+              <a:ea typeface="나눔고딕" panose="020D0604000000000000" pitchFamily="50" charset="-127"/>
+            </a:endParaRPr>
+          </a:p>
+          <a:p>
+            <a:pPr marL="285750" indent="-285750">
+              <a:lnSpc>
+                <a:spcPct val="200000"/>
+              </a:lnSpc>
+              <a:buFont typeface="Arial" panose="020B0604020202020204" pitchFamily="34" charset="0"/>
+              <a:buChar char="•"/>
+            </a:pPr>
+            <a:r>
+              <a:rPr lang="ko-KR" altLang="en-US" dirty="0">
+                <a:latin typeface="나눔고딕" panose="020D0604000000000000" pitchFamily="50" charset="-127"/>
+                <a:ea typeface="나눔고딕" panose="020D0604000000000000" pitchFamily="50" charset="-127"/>
+              </a:rPr>
+              <a:t>올바른</a:t>
+            </a:r>
+            <a:r>
+              <a:rPr lang="en-US" altLang="ko-KR" dirty="0">
+                <a:latin typeface="나눔고딕" panose="020D0604000000000000" pitchFamily="50" charset="-127"/>
+                <a:ea typeface="나눔고딕" panose="020D0604000000000000" pitchFamily="50" charset="-127"/>
+              </a:rPr>
+              <a:t> </a:t>
+            </a:r>
+            <a:r>
+              <a:rPr lang="ko-KR" altLang="en-US" dirty="0">
+                <a:latin typeface="나눔고딕" panose="020D0604000000000000" pitchFamily="50" charset="-127"/>
+                <a:ea typeface="나눔고딕" panose="020D0604000000000000" pitchFamily="50" charset="-127"/>
+              </a:rPr>
+              <a:t>영역이</a:t>
+            </a:r>
+            <a:r>
+              <a:rPr lang="en-US" altLang="ko-KR" dirty="0">
+                <a:latin typeface="나눔고딕" panose="020D0604000000000000" pitchFamily="50" charset="-127"/>
+                <a:ea typeface="나눔고딕" panose="020D0604000000000000" pitchFamily="50" charset="-127"/>
+              </a:rPr>
+              <a:t> sampling</a:t>
+            </a:r>
+            <a:r>
+              <a:rPr lang="ko-KR" altLang="en-US" dirty="0">
+                <a:latin typeface="나눔고딕" panose="020D0604000000000000" pitchFamily="50" charset="-127"/>
+                <a:ea typeface="나눔고딕" panose="020D0604000000000000" pitchFamily="50" charset="-127"/>
+              </a:rPr>
+              <a:t>되었는지 확인하기 위해 </a:t>
+            </a:r>
+            <a:r>
+              <a:rPr lang="en-US" altLang="ko-KR" dirty="0">
+                <a:latin typeface="나눔고딕" panose="020D0604000000000000" pitchFamily="50" charset="-127"/>
+                <a:ea typeface="나눔고딕" panose="020D0604000000000000" pitchFamily="50" charset="-127"/>
+              </a:rPr>
+              <a:t>sampling correctness loss function </a:t>
+            </a:r>
+            <a:r>
+              <a:rPr lang="ko-KR" altLang="en-US" dirty="0">
+                <a:latin typeface="나눔고딕" panose="020D0604000000000000" pitchFamily="50" charset="-127"/>
+                <a:ea typeface="나눔고딕" panose="020D0604000000000000" pitchFamily="50" charset="-127"/>
+              </a:rPr>
+              <a:t>도입</a:t>
+            </a:r>
+            <a:endParaRPr lang="en-US" altLang="ko-KR" dirty="0">
+              <a:latin typeface="나눔고딕" panose="020D0604000000000000" pitchFamily="50" charset="-127"/>
+              <a:ea typeface="나눔고딕" panose="020D0604000000000000" pitchFamily="50" charset="-127"/>
+            </a:endParaRPr>
+          </a:p>
+          <a:p>
+            <a:pPr marL="285750" indent="-285750">
+              <a:lnSpc>
+                <a:spcPct val="200000"/>
+              </a:lnSpc>
+              <a:buFont typeface="Arial" panose="020B0604020202020204" pitchFamily="34" charset="0"/>
+              <a:buChar char="•"/>
+            </a:pPr>
+            <a:r>
+              <a:rPr lang="en-US" altLang="ko-KR" dirty="0">
+                <a:latin typeface="나눔고딕" panose="020D0604000000000000" pitchFamily="50" charset="-127"/>
+                <a:ea typeface="나눔고딕" panose="020D0604000000000000" pitchFamily="50" charset="-127"/>
+              </a:rPr>
+              <a:t>Edge-preserved smooth image</a:t>
+            </a:r>
+            <a:r>
+              <a:rPr lang="ko-KR" altLang="en-US" dirty="0" err="1">
+                <a:latin typeface="나눔고딕" panose="020D0604000000000000" pitchFamily="50" charset="-127"/>
+                <a:ea typeface="나눔고딕" panose="020D0604000000000000" pitchFamily="50" charset="-127"/>
+              </a:rPr>
+              <a:t>를</a:t>
+            </a:r>
+            <a:r>
+              <a:rPr lang="ko-KR" altLang="en-US" dirty="0">
+                <a:latin typeface="나눔고딕" panose="020D0604000000000000" pitchFamily="50" charset="-127"/>
+                <a:ea typeface="나눔고딕" panose="020D0604000000000000" pitchFamily="50" charset="-127"/>
+              </a:rPr>
+              <a:t> 사용한 </a:t>
+            </a:r>
+            <a:r>
+              <a:rPr lang="en-US" altLang="ko-KR" dirty="0">
+                <a:latin typeface="나눔고딕" panose="020D0604000000000000" pitchFamily="50" charset="-127"/>
+                <a:ea typeface="나눔고딕" panose="020D0604000000000000" pitchFamily="50" charset="-127"/>
+              </a:rPr>
+              <a:t>structure </a:t>
+            </a:r>
+            <a:r>
+              <a:rPr lang="en-US" altLang="ko-KR" dirty="0" err="1">
+                <a:latin typeface="나눔고딕" panose="020D0604000000000000" pitchFamily="50" charset="-127"/>
+                <a:ea typeface="나눔고딕" panose="020D0604000000000000" pitchFamily="50" charset="-127"/>
+              </a:rPr>
+              <a:t>reconstructor</a:t>
+            </a:r>
+            <a:r>
+              <a:rPr lang="ko-KR" altLang="en-US" dirty="0">
+                <a:latin typeface="나눔고딕" panose="020D0604000000000000" pitchFamily="50" charset="-127"/>
+                <a:ea typeface="나눔고딕" panose="020D0604000000000000" pitchFamily="50" charset="-127"/>
+              </a:rPr>
+              <a:t> 제안</a:t>
+            </a:r>
+            <a:endParaRPr lang="en-US" altLang="ko-KR" dirty="0">
+              <a:latin typeface="나눔고딕" panose="020D0604000000000000" pitchFamily="50" charset="-127"/>
+              <a:ea typeface="나눔고딕" panose="020D0604000000000000" pitchFamily="50" charset="-127"/>
+            </a:endParaRPr>
+          </a:p>
+          <a:p>
+            <a:pPr marL="285750" indent="-285750">
+              <a:lnSpc>
+                <a:spcPct val="200000"/>
+              </a:lnSpc>
+              <a:buFont typeface="Arial" panose="020B0604020202020204" pitchFamily="34" charset="0"/>
+              <a:buChar char="•"/>
+            </a:pPr>
+            <a:r>
+              <a:rPr lang="en-US" altLang="ko-KR" dirty="0">
+                <a:latin typeface="나눔고딕" panose="020D0604000000000000" pitchFamily="50" charset="-127"/>
+                <a:ea typeface="나눔고딕" panose="020D0604000000000000" pitchFamily="50" charset="-127"/>
+              </a:rPr>
+              <a:t>Appearance flow</a:t>
+            </a:r>
+          </a:p>
+          <a:p>
+            <a:pPr marL="285750" indent="-285750">
+              <a:lnSpc>
+                <a:spcPct val="150000"/>
+              </a:lnSpc>
+              <a:buFont typeface="Arial" panose="020B0604020202020204" pitchFamily="34" charset="0"/>
+              <a:buChar char="•"/>
+            </a:pPr>
+            <a:endParaRPr lang="ko-KR" altLang="en-US" dirty="0">
+              <a:latin typeface="나눔고딕" panose="020D0604000000000000" pitchFamily="50" charset="-127"/>
+              <a:ea typeface="나눔고딕" panose="020D0604000000000000" pitchFamily="50" charset="-127"/>
+            </a:endParaRPr>
+          </a:p>
+        </p:txBody>
+      </p:sp>
+    </p:spTree>
+    <p:extLst>
+      <p:ext uri="{BB962C8B-B14F-4D97-AF65-F5344CB8AC3E}">
+        <p14:creationId xmlns:p14="http://schemas.microsoft.com/office/powerpoint/2010/main" val="3272806168"/>
+      </p:ext>
+    </p:extLst>
+  </p:cSld>
+  <p:clrMapOvr>
+    <a:masterClrMapping/>
+  </p:clrMapOvr>
+</p:sld>
+</file>
+
+<file path=ppt/slides/slide11.xml><?xml version="1.0" encoding="utf-8"?>
+<p:sld xmlns:a="http://schemas.openxmlformats.org/drawingml/2006/main" xmlns:r="http://schemas.openxmlformats.org/officeDocument/2006/relationships" xmlns:p="http://schemas.openxmlformats.org/presentationml/2006/main">
+  <p:cSld>
+    <p:spTree>
+      <p:nvGrpSpPr>
+        <p:cNvPr id="1" name=""/>
+        <p:cNvGrpSpPr/>
+        <p:nvPr/>
+      </p:nvGrpSpPr>
+      <p:grpSpPr>
+        <a:xfrm>
+          <a:off x="0" y="0"/>
+          <a:ext cx="0" cy="0"/>
+          <a:chOff x="0" y="0"/>
+          <a:chExt cx="0" cy="0"/>
+        </a:xfrm>
+      </p:grpSpPr>
+      <p:sp>
+        <p:nvSpPr>
+          <p:cNvPr id="4" name="TextBox 3">
+            <a:extLst>
+              <a:ext uri="{FF2B5EF4-FFF2-40B4-BE49-F238E27FC236}">
+                <a16:creationId xmlns:a16="http://schemas.microsoft.com/office/drawing/2014/main" id="{C843F9AF-F496-4F52-B425-94A4B9EE37E3}"/>
+              </a:ext>
+            </a:extLst>
+          </p:cNvPr>
+          <p:cNvSpPr txBox="1"/>
+          <p:nvPr/>
+        </p:nvSpPr>
+        <p:spPr>
+          <a:xfrm>
+            <a:off x="1182314" y="723439"/>
+            <a:ext cx="10084775" cy="4672048"/>
+          </a:xfrm>
+          <a:prstGeom prst="rect">
+            <a:avLst/>
+          </a:prstGeom>
+          <a:noFill/>
+        </p:spPr>
+        <p:txBody>
+          <a:bodyPr wrap="square" rtlCol="0">
+            <a:spAutoFit/>
+          </a:bodyPr>
+          <a:lstStyle/>
+          <a:p>
+            <a:pPr>
+              <a:lnSpc>
+                <a:spcPct val="150000"/>
+              </a:lnSpc>
+            </a:pPr>
+            <a:r>
+              <a:rPr kumimoji="1" lang="en-US" altLang="ko-KR" sz="4000" dirty="0">
+                <a:latin typeface="나눔고딕" panose="020D0604000000000000" pitchFamily="50" charset="-127"/>
+                <a:ea typeface="나눔고딕" panose="020D0604000000000000" pitchFamily="50" charset="-127"/>
+              </a:rPr>
+              <a:t>Related Work</a:t>
+            </a:r>
+          </a:p>
+          <a:p>
+            <a:pPr>
+              <a:lnSpc>
+                <a:spcPct val="150000"/>
+              </a:lnSpc>
+            </a:pPr>
+            <a:endParaRPr lang="en-US" altLang="ko-KR" dirty="0">
+              <a:latin typeface="나눔고딕" panose="020D0604000000000000" pitchFamily="50" charset="-127"/>
+              <a:ea typeface="나눔고딕" panose="020D0604000000000000" pitchFamily="50" charset="-127"/>
+            </a:endParaRPr>
+          </a:p>
+          <a:p>
+            <a:pPr marL="285750" indent="-285750">
+              <a:lnSpc>
+                <a:spcPct val="200000"/>
+              </a:lnSpc>
+              <a:buFont typeface="Arial" panose="020B0604020202020204" pitchFamily="34" charset="0"/>
+              <a:buChar char="•"/>
+            </a:pPr>
+            <a:r>
+              <a:rPr lang="ko-KR" altLang="en-US" dirty="0">
+                <a:latin typeface="나눔고딕" panose="020D0604000000000000" pitchFamily="50" charset="-127"/>
+                <a:ea typeface="나눔고딕" panose="020D0604000000000000" pitchFamily="50" charset="-127"/>
+              </a:rPr>
+              <a:t>기존</a:t>
+            </a:r>
+            <a:r>
+              <a:rPr lang="en-US" altLang="ko-KR" dirty="0">
+                <a:latin typeface="나눔고딕" panose="020D0604000000000000" pitchFamily="50" charset="-127"/>
+                <a:ea typeface="나눔고딕" panose="020D0604000000000000" pitchFamily="50" charset="-127"/>
+              </a:rPr>
+              <a:t> image inpainting</a:t>
+            </a:r>
+            <a:r>
+              <a:rPr lang="ko-KR" altLang="en-US" dirty="0">
+                <a:latin typeface="나눔고딕" panose="020D0604000000000000" pitchFamily="50" charset="-127"/>
+                <a:ea typeface="나눔고딕" panose="020D0604000000000000" pitchFamily="50" charset="-127"/>
+              </a:rPr>
+              <a:t>은 </a:t>
+            </a:r>
+            <a:r>
+              <a:rPr lang="en-US" altLang="ko-KR" dirty="0">
+                <a:latin typeface="나눔고딕" panose="020D0604000000000000" pitchFamily="50" charset="-127"/>
+                <a:ea typeface="나눔고딕" panose="020D0604000000000000" pitchFamily="50" charset="-127"/>
+              </a:rPr>
+              <a:t>diffusion-based, patch-based</a:t>
+            </a:r>
+            <a:r>
+              <a:rPr lang="ko-KR" altLang="en-US" dirty="0">
+                <a:latin typeface="나눔고딕" panose="020D0604000000000000" pitchFamily="50" charset="-127"/>
+                <a:ea typeface="나눔고딕" panose="020D0604000000000000" pitchFamily="50" charset="-127"/>
+              </a:rPr>
+              <a:t>방식이 존재</a:t>
+            </a:r>
+            <a:endParaRPr lang="en-US" altLang="ko-KR" dirty="0">
+              <a:latin typeface="나눔고딕" panose="020D0604000000000000" pitchFamily="50" charset="-127"/>
+              <a:ea typeface="나눔고딕" panose="020D0604000000000000" pitchFamily="50" charset="-127"/>
+            </a:endParaRPr>
+          </a:p>
+          <a:p>
+            <a:pPr marL="285750" indent="-285750">
+              <a:lnSpc>
+                <a:spcPct val="200000"/>
+              </a:lnSpc>
+              <a:buFont typeface="Arial" panose="020B0604020202020204" pitchFamily="34" charset="0"/>
+              <a:buChar char="•"/>
+            </a:pPr>
+            <a:r>
+              <a:rPr lang="en-US" altLang="ko-KR" dirty="0">
+                <a:latin typeface="나눔고딕" panose="020D0604000000000000" pitchFamily="50" charset="-127"/>
+                <a:ea typeface="나눔고딕" panose="020D0604000000000000" pitchFamily="50" charset="-127"/>
+              </a:rPr>
+              <a:t>Diffusion-based</a:t>
+            </a:r>
+            <a:r>
+              <a:rPr lang="ko-KR" altLang="en-US" dirty="0">
+                <a:latin typeface="나눔고딕" panose="020D0604000000000000" pitchFamily="50" charset="-127"/>
+                <a:ea typeface="나눔고딕" panose="020D0604000000000000" pitchFamily="50" charset="-127"/>
+              </a:rPr>
+              <a:t> </a:t>
+            </a:r>
+            <a:r>
+              <a:rPr lang="en-US" altLang="ko-KR" dirty="0">
+                <a:latin typeface="나눔고딕" panose="020D0604000000000000" pitchFamily="50" charset="-127"/>
+                <a:ea typeface="나눔고딕" panose="020D0604000000000000" pitchFamily="50" charset="-127"/>
+              </a:rPr>
+              <a:t>:</a:t>
+            </a:r>
+            <a:r>
+              <a:rPr lang="ko-KR" altLang="en-US" dirty="0">
+                <a:latin typeface="나눔고딕" panose="020D0604000000000000" pitchFamily="50" charset="-127"/>
+                <a:ea typeface="나눔고딕" panose="020D0604000000000000" pitchFamily="50" charset="-127"/>
+              </a:rPr>
+              <a:t> 인접 영역 정보를 </a:t>
+            </a:r>
+            <a:r>
+              <a:rPr lang="en-US" altLang="ko-KR" dirty="0">
+                <a:latin typeface="나눔고딕" panose="020D0604000000000000" pitchFamily="50" charset="-127"/>
+                <a:ea typeface="나눔고딕" panose="020D0604000000000000" pitchFamily="50" charset="-127"/>
+              </a:rPr>
+              <a:t>hole</a:t>
+            </a:r>
+            <a:r>
+              <a:rPr lang="ko-KR" altLang="en-US" dirty="0">
+                <a:latin typeface="나눔고딕" panose="020D0604000000000000" pitchFamily="50" charset="-127"/>
+                <a:ea typeface="나눔고딕" panose="020D0604000000000000" pitchFamily="50" charset="-127"/>
+              </a:rPr>
+              <a:t>로 전파하여 </a:t>
+            </a:r>
+            <a:r>
+              <a:rPr lang="en-US" altLang="ko-KR" dirty="0">
+                <a:latin typeface="나눔고딕" panose="020D0604000000000000" pitchFamily="50" charset="-127"/>
+                <a:ea typeface="나눔고딕" panose="020D0604000000000000" pitchFamily="50" charset="-127"/>
+              </a:rPr>
+              <a:t>texture </a:t>
+            </a:r>
+            <a:r>
+              <a:rPr lang="ko-KR" altLang="en-US" dirty="0">
+                <a:latin typeface="나눔고딕" panose="020D0604000000000000" pitchFamily="50" charset="-127"/>
+                <a:ea typeface="나눔고딕" panose="020D0604000000000000" pitchFamily="50" charset="-127"/>
+              </a:rPr>
+              <a:t>생성 </a:t>
+            </a:r>
+            <a:r>
+              <a:rPr lang="en-US" altLang="ko-KR" dirty="0">
+                <a:latin typeface="나눔고딕" panose="020D0604000000000000" pitchFamily="50" charset="-127"/>
+                <a:ea typeface="나눔고딕" panose="020D0604000000000000" pitchFamily="50" charset="-127"/>
+              </a:rPr>
+              <a:t>-&gt;</a:t>
+            </a:r>
+            <a:r>
+              <a:rPr lang="ko-KR" altLang="en-US" dirty="0">
+                <a:latin typeface="나눔고딕" panose="020D0604000000000000" pitchFamily="50" charset="-127"/>
+                <a:ea typeface="나눔고딕" panose="020D0604000000000000" pitchFamily="50" charset="-127"/>
+              </a:rPr>
+              <a:t> 작은 </a:t>
+            </a:r>
+            <a:r>
+              <a:rPr lang="en-US" altLang="ko-KR" dirty="0">
+                <a:latin typeface="나눔고딕" panose="020D0604000000000000" pitchFamily="50" charset="-127"/>
+                <a:ea typeface="나눔고딕" panose="020D0604000000000000" pitchFamily="50" charset="-127"/>
+              </a:rPr>
+              <a:t>hole</a:t>
+            </a:r>
+            <a:r>
+              <a:rPr lang="ko-KR" altLang="en-US" dirty="0">
+                <a:latin typeface="나눔고딕" panose="020D0604000000000000" pitchFamily="50" charset="-127"/>
+                <a:ea typeface="나눔고딕" panose="020D0604000000000000" pitchFamily="50" charset="-127"/>
+              </a:rPr>
+              <a:t>만 처리 가능</a:t>
+            </a:r>
+            <a:endParaRPr lang="en-US" altLang="ko-KR" dirty="0">
+              <a:latin typeface="나눔고딕" panose="020D0604000000000000" pitchFamily="50" charset="-127"/>
+              <a:ea typeface="나눔고딕" panose="020D0604000000000000" pitchFamily="50" charset="-127"/>
+            </a:endParaRPr>
+          </a:p>
+          <a:p>
+            <a:pPr marL="285750" indent="-285750">
+              <a:lnSpc>
+                <a:spcPct val="200000"/>
+              </a:lnSpc>
+              <a:buFont typeface="Arial" panose="020B0604020202020204" pitchFamily="34" charset="0"/>
+              <a:buChar char="•"/>
+            </a:pPr>
+            <a:r>
+              <a:rPr lang="en-US" altLang="ko-KR" dirty="0">
+                <a:latin typeface="나눔고딕" panose="020D0604000000000000" pitchFamily="50" charset="-127"/>
+                <a:ea typeface="나눔고딕" panose="020D0604000000000000" pitchFamily="50" charset="-127"/>
+              </a:rPr>
+              <a:t>Patch-based</a:t>
+            </a:r>
+            <a:r>
+              <a:rPr lang="ko-KR" altLang="en-US" dirty="0">
+                <a:latin typeface="나눔고딕" panose="020D0604000000000000" pitchFamily="50" charset="-127"/>
+                <a:ea typeface="나눔고딕" panose="020D0604000000000000" pitchFamily="50" charset="-127"/>
+              </a:rPr>
+              <a:t> </a:t>
+            </a:r>
+            <a:r>
+              <a:rPr lang="en-US" altLang="ko-KR" dirty="0">
+                <a:latin typeface="나눔고딕" panose="020D0604000000000000" pitchFamily="50" charset="-127"/>
+                <a:ea typeface="나눔고딕" panose="020D0604000000000000" pitchFamily="50" charset="-127"/>
+              </a:rPr>
+              <a:t>:</a:t>
+            </a:r>
+            <a:r>
+              <a:rPr lang="ko-KR" altLang="en-US" dirty="0">
+                <a:latin typeface="나눔고딕" panose="020D0604000000000000" pitchFamily="50" charset="-127"/>
+                <a:ea typeface="나눔고딕" panose="020D0604000000000000" pitchFamily="50" charset="-127"/>
+              </a:rPr>
+              <a:t> 원본 </a:t>
+            </a:r>
+            <a:r>
+              <a:rPr lang="en-US" altLang="ko-KR" dirty="0">
+                <a:latin typeface="나눔고딕" panose="020D0604000000000000" pitchFamily="50" charset="-127"/>
+                <a:ea typeface="나눔고딕" panose="020D0604000000000000" pitchFamily="50" charset="-127"/>
+              </a:rPr>
+              <a:t>image</a:t>
+            </a:r>
+            <a:r>
+              <a:rPr lang="ko-KR" altLang="en-US" dirty="0">
+                <a:latin typeface="나눔고딕" panose="020D0604000000000000" pitchFamily="50" charset="-127"/>
+                <a:ea typeface="나눔고딕" panose="020D0604000000000000" pitchFamily="50" charset="-127"/>
+              </a:rPr>
+              <a:t>의 손상되지 않은 영역에서 유사한 </a:t>
+            </a:r>
+            <a:r>
+              <a:rPr lang="en-US" altLang="ko-KR" dirty="0">
+                <a:latin typeface="나눔고딕" panose="020D0604000000000000" pitchFamily="50" charset="-127"/>
+                <a:ea typeface="나눔고딕" panose="020D0604000000000000" pitchFamily="50" charset="-127"/>
+              </a:rPr>
+              <a:t>image patch</a:t>
+            </a:r>
+            <a:r>
+              <a:rPr lang="ko-KR" altLang="en-US" dirty="0" err="1">
+                <a:latin typeface="나눔고딕" panose="020D0604000000000000" pitchFamily="50" charset="-127"/>
+                <a:ea typeface="나눔고딕" panose="020D0604000000000000" pitchFamily="50" charset="-127"/>
+              </a:rPr>
+              <a:t>를</a:t>
+            </a:r>
+            <a:r>
+              <a:rPr lang="ko-KR" altLang="en-US" dirty="0">
+                <a:latin typeface="나눔고딕" panose="020D0604000000000000" pitchFamily="50" charset="-127"/>
+                <a:ea typeface="나눔고딕" panose="020D0604000000000000" pitchFamily="50" charset="-127"/>
+              </a:rPr>
+              <a:t> 검색</a:t>
+            </a:r>
+            <a:r>
+              <a:rPr lang="en-US" altLang="ko-KR" dirty="0">
+                <a:latin typeface="나눔고딕" panose="020D0604000000000000" pitchFamily="50" charset="-127"/>
+                <a:ea typeface="나눔고딕" panose="020D0604000000000000" pitchFamily="50" charset="-127"/>
+              </a:rPr>
+              <a:t>,</a:t>
+            </a:r>
+            <a:r>
+              <a:rPr lang="ko-KR" altLang="en-US" dirty="0">
+                <a:latin typeface="나눔고딕" panose="020D0604000000000000" pitchFamily="50" charset="-127"/>
+                <a:ea typeface="나눔고딕" panose="020D0604000000000000" pitchFamily="50" charset="-127"/>
+              </a:rPr>
+              <a:t> 복사하여 대상 </a:t>
+            </a:r>
+            <a:r>
+              <a:rPr lang="en-US" altLang="ko-KR" dirty="0">
+                <a:latin typeface="나눔고딕" panose="020D0604000000000000" pitchFamily="50" charset="-127"/>
+                <a:ea typeface="나눔고딕" panose="020D0604000000000000" pitchFamily="50" charset="-127"/>
+              </a:rPr>
+              <a:t>			</a:t>
+            </a:r>
+            <a:r>
+              <a:rPr lang="ko-KR" altLang="en-US" dirty="0">
+                <a:latin typeface="나눔고딕" panose="020D0604000000000000" pitchFamily="50" charset="-127"/>
+                <a:ea typeface="나눔고딕" panose="020D0604000000000000" pitchFamily="50" charset="-127"/>
+              </a:rPr>
+              <a:t>      영역을 채움 </a:t>
+            </a:r>
+            <a:r>
+              <a:rPr lang="en-US" altLang="ko-KR" dirty="0">
+                <a:latin typeface="나눔고딕" panose="020D0604000000000000" pitchFamily="50" charset="-127"/>
+                <a:ea typeface="나눔고딕" panose="020D0604000000000000" pitchFamily="50" charset="-127"/>
+              </a:rPr>
+              <a:t>-&gt;</a:t>
+            </a:r>
+            <a:r>
+              <a:rPr lang="ko-KR" altLang="en-US" dirty="0">
+                <a:latin typeface="나눔고딕" panose="020D0604000000000000" pitchFamily="50" charset="-127"/>
+                <a:ea typeface="나눔고딕" panose="020D0604000000000000" pitchFamily="50" charset="-127"/>
+              </a:rPr>
+              <a:t> 상대적으로 큰 </a:t>
+            </a:r>
+            <a:r>
+              <a:rPr lang="en-US" altLang="ko-KR" dirty="0">
+                <a:latin typeface="나눔고딕" panose="020D0604000000000000" pitchFamily="50" charset="-127"/>
+                <a:ea typeface="나눔고딕" panose="020D0604000000000000" pitchFamily="50" charset="-127"/>
+              </a:rPr>
+              <a:t>missing holed</a:t>
+            </a:r>
+            <a:r>
+              <a:rPr lang="ko-KR" altLang="en-US" dirty="0">
+                <a:latin typeface="나눔고딕" panose="020D0604000000000000" pitchFamily="50" charset="-127"/>
+                <a:ea typeface="나눔고딕" panose="020D0604000000000000" pitchFamily="50" charset="-127"/>
+              </a:rPr>
+              <a:t>에 대해 사실적인 질감 생성</a:t>
+            </a:r>
+            <a:endParaRPr lang="en-US" altLang="ko-KR" dirty="0">
+              <a:latin typeface="나눔고딕" panose="020D0604000000000000" pitchFamily="50" charset="-127"/>
+              <a:ea typeface="나눔고딕" panose="020D0604000000000000" pitchFamily="50" charset="-127"/>
+            </a:endParaRPr>
+          </a:p>
+          <a:p>
+            <a:pPr marL="285750" indent="-285750">
+              <a:lnSpc>
+                <a:spcPct val="200000"/>
+              </a:lnSpc>
+              <a:buFont typeface="Arial" panose="020B0604020202020204" pitchFamily="34" charset="0"/>
+              <a:buChar char="•"/>
+            </a:pPr>
+            <a:r>
+              <a:rPr lang="ko-KR" altLang="en-US" dirty="0">
+                <a:latin typeface="나눔고딕" panose="020D0604000000000000" pitchFamily="50" charset="-127"/>
+                <a:ea typeface="나눔고딕" panose="020D0604000000000000" pitchFamily="50" charset="-127"/>
+              </a:rPr>
+              <a:t>적합한 </a:t>
+            </a:r>
+            <a:r>
+              <a:rPr lang="en-US" altLang="ko-KR" dirty="0">
+                <a:latin typeface="나눔고딕" panose="020D0604000000000000" pitchFamily="50" charset="-127"/>
+                <a:ea typeface="나눔고딕" panose="020D0604000000000000" pitchFamily="50" charset="-127"/>
+              </a:rPr>
+              <a:t>image patch</a:t>
+            </a:r>
+            <a:r>
+              <a:rPr lang="ko-KR" altLang="en-US" dirty="0" err="1">
+                <a:latin typeface="나눔고딕" panose="020D0604000000000000" pitchFamily="50" charset="-127"/>
+                <a:ea typeface="나눔고딕" panose="020D0604000000000000" pitchFamily="50" charset="-127"/>
+              </a:rPr>
+              <a:t>를</a:t>
+            </a:r>
+            <a:r>
+              <a:rPr lang="ko-KR" altLang="en-US" dirty="0">
+                <a:latin typeface="나눔고딕" panose="020D0604000000000000" pitchFamily="50" charset="-127"/>
+                <a:ea typeface="나눔고딕" panose="020D0604000000000000" pitchFamily="50" charset="-127"/>
+              </a:rPr>
+              <a:t> 찾기 위해 </a:t>
+            </a:r>
+            <a:r>
+              <a:rPr lang="en-US" altLang="ko-KR" dirty="0">
+                <a:latin typeface="나눔고딕" panose="020D0604000000000000" pitchFamily="50" charset="-127"/>
+                <a:ea typeface="나눔고딕" panose="020D0604000000000000" pitchFamily="50" charset="-127"/>
+              </a:rPr>
+              <a:t>similarity</a:t>
+            </a:r>
+            <a:r>
+              <a:rPr lang="ko-KR" altLang="en-US" dirty="0" err="1">
+                <a:latin typeface="나눔고딕" panose="020D0604000000000000" pitchFamily="50" charset="-127"/>
+                <a:ea typeface="나눔고딕" panose="020D0604000000000000" pitchFamily="50" charset="-127"/>
+              </a:rPr>
+              <a:t>를</a:t>
+            </a:r>
+            <a:r>
+              <a:rPr lang="ko-KR" altLang="en-US" dirty="0">
+                <a:latin typeface="나눔고딕" panose="020D0604000000000000" pitchFamily="50" charset="-127"/>
+                <a:ea typeface="나눔고딕" panose="020D0604000000000000" pitchFamily="50" charset="-127"/>
+              </a:rPr>
+              <a:t> 계산할 때 더 많은 </a:t>
+            </a:r>
+            <a:r>
+              <a:rPr lang="en-US" altLang="ko-KR" dirty="0">
+                <a:latin typeface="나눔고딕" panose="020D0604000000000000" pitchFamily="50" charset="-127"/>
+                <a:ea typeface="나눔고딕" panose="020D0604000000000000" pitchFamily="50" charset="-127"/>
+              </a:rPr>
+              <a:t>Visual information</a:t>
+            </a:r>
+            <a:r>
+              <a:rPr lang="ko-KR" altLang="en-US" dirty="0">
+                <a:latin typeface="나눔고딕" panose="020D0604000000000000" pitchFamily="50" charset="-127"/>
+                <a:ea typeface="나눔고딕" panose="020D0604000000000000" pitchFamily="50" charset="-127"/>
+              </a:rPr>
+              <a:t>과 </a:t>
+            </a:r>
+            <a:r>
+              <a:rPr lang="en-US" altLang="ko-KR" dirty="0">
+                <a:latin typeface="나눔고딕" panose="020D0604000000000000" pitchFamily="50" charset="-127"/>
+                <a:ea typeface="나눔고딕" panose="020D0604000000000000" pitchFamily="50" charset="-127"/>
+              </a:rPr>
+              <a:t>Visual artifact</a:t>
+            </a:r>
+            <a:r>
+              <a:rPr lang="ko-KR" altLang="en-US" dirty="0">
+                <a:latin typeface="나눔고딕" panose="020D0604000000000000" pitchFamily="50" charset="-127"/>
+                <a:ea typeface="나눔고딕" panose="020D0604000000000000" pitchFamily="50" charset="-127"/>
+              </a:rPr>
+              <a:t>의 절감을 위해 </a:t>
+            </a:r>
+            <a:r>
+              <a:rPr lang="en-US" altLang="ko-KR" dirty="0">
+                <a:latin typeface="나눔고딕" panose="020D0604000000000000" pitchFamily="50" charset="-127"/>
+                <a:ea typeface="나눔고딕" panose="020D0604000000000000" pitchFamily="50" charset="-127"/>
+              </a:rPr>
+              <a:t>bidirectional </a:t>
+            </a:r>
+            <a:r>
+              <a:rPr lang="en-US" altLang="ko-KR" dirty="0" err="1">
+                <a:latin typeface="나눔고딕" panose="020D0604000000000000" pitchFamily="50" charset="-127"/>
+                <a:ea typeface="나눔고딕" panose="020D0604000000000000" pitchFamily="50" charset="-127"/>
+              </a:rPr>
+              <a:t>similartiy</a:t>
+            </a:r>
+            <a:r>
+              <a:rPr lang="ko-KR" altLang="en-US" dirty="0" err="1">
+                <a:latin typeface="나눔고딕" panose="020D0604000000000000" pitchFamily="50" charset="-127"/>
+                <a:ea typeface="나눔고딕" panose="020D0604000000000000" pitchFamily="50" charset="-127"/>
+              </a:rPr>
+              <a:t>를</a:t>
+            </a:r>
+            <a:r>
+              <a:rPr lang="ko-KR" altLang="en-US" dirty="0">
+                <a:latin typeface="나눔고딕" panose="020D0604000000000000" pitchFamily="50" charset="-127"/>
+                <a:ea typeface="나눔고딕" panose="020D0604000000000000" pitchFamily="50" charset="-127"/>
+              </a:rPr>
+              <a:t> 제안</a:t>
+            </a:r>
+            <a:r>
+              <a:rPr lang="en-US" altLang="ko-KR" dirty="0">
+                <a:latin typeface="나눔고딕" panose="020D0604000000000000" pitchFamily="50" charset="-127"/>
+                <a:ea typeface="나눔고딕" panose="020D0604000000000000" pitchFamily="50" charset="-127"/>
+              </a:rPr>
+              <a:t>.</a:t>
+            </a:r>
+            <a:r>
+              <a:rPr lang="ko-KR" altLang="en-US" dirty="0">
+                <a:latin typeface="나눔고딕" panose="020D0604000000000000" pitchFamily="50" charset="-127"/>
+                <a:ea typeface="나눔고딕" panose="020D0604000000000000" pitchFamily="50" charset="-127"/>
+              </a:rPr>
+              <a:t> </a:t>
+            </a:r>
+            <a:r>
+              <a:rPr lang="en-US" altLang="ko-KR" dirty="0" err="1">
+                <a:latin typeface="나눔고딕" panose="020D0604000000000000" pitchFamily="50" charset="-127"/>
+                <a:ea typeface="나눔고딕" panose="020D0604000000000000" pitchFamily="50" charset="-127"/>
+              </a:rPr>
+              <a:t>Patchmatch</a:t>
+            </a:r>
+            <a:endParaRPr lang="ko-KR" altLang="en-US" dirty="0">
+              <a:latin typeface="나눔고딕" panose="020D0604000000000000" pitchFamily="50" charset="-127"/>
+              <a:ea typeface="나눔고딕" panose="020D0604000000000000" pitchFamily="50" charset="-127"/>
+            </a:endParaRPr>
+          </a:p>
+        </p:txBody>
+      </p:sp>
+    </p:spTree>
+    <p:extLst>
+      <p:ext uri="{BB962C8B-B14F-4D97-AF65-F5344CB8AC3E}">
+        <p14:creationId xmlns:p14="http://schemas.microsoft.com/office/powerpoint/2010/main" val="1228730761"/>
+      </p:ext>
+    </p:extLst>
+  </p:cSld>
+  <p:clrMapOvr>
+    <a:masterClrMapping/>
+  </p:clrMapOvr>
+</p:sld>
+</file>
+
+<file path=ppt/slides/slide12.xml><?xml version="1.0" encoding="utf-8"?>
+<p:sld xmlns:a="http://schemas.openxmlformats.org/drawingml/2006/main" xmlns:r="http://schemas.openxmlformats.org/officeDocument/2006/relationships" xmlns:p="http://schemas.openxmlformats.org/presentationml/2006/main">
+  <p:cSld>
+    <p:spTree>
+      <p:nvGrpSpPr>
+        <p:cNvPr id="1" name=""/>
+        <p:cNvGrpSpPr/>
+        <p:nvPr/>
+      </p:nvGrpSpPr>
+      <p:grpSpPr>
+        <a:xfrm>
+          <a:off x="0" y="0"/>
+          <a:ext cx="0" cy="0"/>
+          <a:chOff x="0" y="0"/>
+          <a:chExt cx="0" cy="0"/>
+        </a:xfrm>
+      </p:grpSpPr>
+      <p:sp>
+        <p:nvSpPr>
+          <p:cNvPr id="4" name="TextBox 3">
+            <a:extLst>
+              <a:ext uri="{FF2B5EF4-FFF2-40B4-BE49-F238E27FC236}">
+                <a16:creationId xmlns:a16="http://schemas.microsoft.com/office/drawing/2014/main" id="{C843F9AF-F496-4F52-B425-94A4B9EE37E3}"/>
+              </a:ext>
+            </a:extLst>
+          </p:cNvPr>
+          <p:cNvSpPr txBox="1"/>
+          <p:nvPr/>
+        </p:nvSpPr>
+        <p:spPr>
+          <a:xfrm>
+            <a:off x="1182314" y="723439"/>
+            <a:ext cx="10389576" cy="4672048"/>
+          </a:xfrm>
+          <a:prstGeom prst="rect">
+            <a:avLst/>
+          </a:prstGeom>
+          <a:noFill/>
+        </p:spPr>
+        <p:txBody>
+          <a:bodyPr wrap="square" rtlCol="0">
+            <a:spAutoFit/>
+          </a:bodyPr>
+          <a:lstStyle/>
+          <a:p>
+            <a:pPr>
+              <a:lnSpc>
+                <a:spcPct val="150000"/>
+              </a:lnSpc>
+            </a:pPr>
+            <a:r>
+              <a:rPr kumimoji="1" lang="en-US" altLang="ko-KR" sz="4000" dirty="0">
+                <a:latin typeface="나눔고딕" panose="020D0604000000000000" pitchFamily="50" charset="-127"/>
+                <a:ea typeface="나눔고딕" panose="020D0604000000000000" pitchFamily="50" charset="-127"/>
+              </a:rPr>
+              <a:t>Related Work</a:t>
+            </a:r>
+          </a:p>
+          <a:p>
+            <a:pPr>
+              <a:lnSpc>
+                <a:spcPct val="150000"/>
+              </a:lnSpc>
+            </a:pPr>
+            <a:endParaRPr lang="en-US" altLang="ko-KR" dirty="0">
+              <a:latin typeface="나눔고딕" panose="020D0604000000000000" pitchFamily="50" charset="-127"/>
+              <a:ea typeface="나눔고딕" panose="020D0604000000000000" pitchFamily="50" charset="-127"/>
+            </a:endParaRPr>
+          </a:p>
+          <a:p>
+            <a:pPr marL="285750" indent="-285750">
+              <a:lnSpc>
+                <a:spcPct val="200000"/>
+              </a:lnSpc>
+              <a:buFont typeface="Arial" panose="020B0604020202020204" pitchFamily="34" charset="0"/>
+              <a:buChar char="•"/>
+            </a:pPr>
+            <a:r>
+              <a:rPr lang="en-US" altLang="ko-KR" dirty="0">
+                <a:latin typeface="나눔고딕" panose="020D0604000000000000" pitchFamily="50" charset="-127"/>
+                <a:ea typeface="나눔고딕" panose="020D0604000000000000" pitchFamily="50" charset="-127"/>
+              </a:rPr>
+              <a:t>Patch-based method</a:t>
+            </a:r>
+            <a:r>
+              <a:rPr lang="ko-KR" altLang="en-US" dirty="0">
+                <a:latin typeface="나눔고딕" panose="020D0604000000000000" pitchFamily="50" charset="-127"/>
+                <a:ea typeface="나눔고딕" panose="020D0604000000000000" pitchFamily="50" charset="-127"/>
+              </a:rPr>
+              <a:t>는 </a:t>
+            </a:r>
+            <a:r>
+              <a:rPr lang="en-US" altLang="ko-KR" dirty="0">
+                <a:latin typeface="나눔고딕" panose="020D0604000000000000" pitchFamily="50" charset="-127"/>
+                <a:ea typeface="나눔고딕" panose="020D0604000000000000" pitchFamily="50" charset="-127"/>
+              </a:rPr>
+              <a:t>hole</a:t>
+            </a:r>
+            <a:r>
+              <a:rPr lang="ko-KR" altLang="en-US" dirty="0">
+                <a:latin typeface="나눔고딕" panose="020D0604000000000000" pitchFamily="50" charset="-127"/>
+                <a:ea typeface="나눔고딕" panose="020D0604000000000000" pitchFamily="50" charset="-127"/>
+              </a:rPr>
+              <a:t>이 있는 부분이 없는 부분과 유사한 내용을 가진다고 가정</a:t>
+            </a:r>
+            <a:endParaRPr lang="en-US" altLang="ko-KR" dirty="0">
+              <a:latin typeface="나눔고딕" panose="020D0604000000000000" pitchFamily="50" charset="-127"/>
+              <a:ea typeface="나눔고딕" panose="020D0604000000000000" pitchFamily="50" charset="-127"/>
+            </a:endParaRPr>
+          </a:p>
+          <a:p>
+            <a:pPr marL="285750" indent="-285750">
+              <a:lnSpc>
+                <a:spcPct val="200000"/>
+              </a:lnSpc>
+              <a:buFont typeface="Arial" panose="020B0604020202020204" pitchFamily="34" charset="0"/>
+              <a:buChar char="•"/>
+            </a:pPr>
+            <a:r>
+              <a:rPr lang="en-US" altLang="ko-KR" dirty="0">
+                <a:latin typeface="나눔고딕" panose="020D0604000000000000" pitchFamily="50" charset="-127"/>
+                <a:ea typeface="나눔고딕" panose="020D0604000000000000" pitchFamily="50" charset="-127"/>
+              </a:rPr>
+              <a:t>-&gt;</a:t>
+            </a:r>
+            <a:r>
+              <a:rPr lang="ko-KR" altLang="en-US" dirty="0">
+                <a:latin typeface="나눔고딕" panose="020D0604000000000000" pitchFamily="50" charset="-127"/>
+                <a:ea typeface="나눔고딕" panose="020D0604000000000000" pitchFamily="50" charset="-127"/>
+              </a:rPr>
+              <a:t> 반복적 구조를 가지는 </a:t>
+            </a:r>
+            <a:r>
+              <a:rPr lang="en-US" altLang="ko-KR" dirty="0">
+                <a:latin typeface="나눔고딕" panose="020D0604000000000000" pitchFamily="50" charset="-127"/>
+                <a:ea typeface="나눔고딕" panose="020D0604000000000000" pitchFamily="50" charset="-127"/>
+              </a:rPr>
+              <a:t>image</a:t>
+            </a:r>
+            <a:r>
+              <a:rPr lang="ko-KR" altLang="en-US" dirty="0">
+                <a:latin typeface="나눔고딕" panose="020D0604000000000000" pitchFamily="50" charset="-127"/>
+                <a:ea typeface="나눔고딕" panose="020D0604000000000000" pitchFamily="50" charset="-127"/>
+              </a:rPr>
+              <a:t>에서는 잘 작동하지만 독특한 구조를 가진 </a:t>
+            </a:r>
+            <a:r>
+              <a:rPr lang="en-US" altLang="ko-KR" dirty="0">
+                <a:latin typeface="나눔고딕" panose="020D0604000000000000" pitchFamily="50" charset="-127"/>
+                <a:ea typeface="나눔고딕" panose="020D0604000000000000" pitchFamily="50" charset="-127"/>
+              </a:rPr>
+              <a:t>image</a:t>
+            </a:r>
+            <a:r>
+              <a:rPr lang="ko-KR" altLang="en-US" dirty="0">
+                <a:latin typeface="나눔고딕" panose="020D0604000000000000" pitchFamily="50" charset="-127"/>
+                <a:ea typeface="나눔고딕" panose="020D0604000000000000" pitchFamily="50" charset="-127"/>
+              </a:rPr>
+              <a:t>에서는 합리적 결과 </a:t>
+            </a:r>
+            <a:r>
+              <a:rPr lang="en-US" altLang="ko-KR" dirty="0">
+                <a:latin typeface="나눔고딕" panose="020D0604000000000000" pitchFamily="50" charset="-127"/>
+                <a:ea typeface="나눔고딕" panose="020D0604000000000000" pitchFamily="50" charset="-127"/>
+              </a:rPr>
+              <a:t>X</a:t>
+            </a:r>
+          </a:p>
+          <a:p>
+            <a:pPr marL="285750" indent="-285750">
+              <a:lnSpc>
+                <a:spcPct val="200000"/>
+              </a:lnSpc>
+              <a:buFont typeface="Arial" panose="020B0604020202020204" pitchFamily="34" charset="0"/>
+              <a:buChar char="•"/>
+            </a:pPr>
+            <a:r>
+              <a:rPr lang="en-US" altLang="ko-KR" dirty="0">
+                <a:latin typeface="나눔고딕" panose="020D0604000000000000" pitchFamily="50" charset="-127"/>
+                <a:ea typeface="나눔고딕" panose="020D0604000000000000" pitchFamily="50" charset="-127"/>
+              </a:rPr>
+              <a:t>Context encoder : Encoder-Decode </a:t>
+            </a:r>
+            <a:r>
+              <a:rPr lang="ko-KR" altLang="en-US" dirty="0">
+                <a:latin typeface="나눔고딕" panose="020D0604000000000000" pitchFamily="50" charset="-127"/>
+                <a:ea typeface="나눔고딕" panose="020D0604000000000000" pitchFamily="50" charset="-127"/>
+              </a:rPr>
+              <a:t>구조를 사용해 </a:t>
+            </a:r>
+            <a:r>
+              <a:rPr lang="en-US" altLang="ko-KR" dirty="0" err="1">
+                <a:latin typeface="나눔고딕" panose="020D0604000000000000" pitchFamily="50" charset="-127"/>
+                <a:ea typeface="나눔고딕" panose="020D0604000000000000" pitchFamily="50" charset="-127"/>
+              </a:rPr>
+              <a:t>featrue</a:t>
+            </a:r>
+            <a:r>
+              <a:rPr lang="ko-KR" altLang="en-US" dirty="0" err="1">
+                <a:latin typeface="나눔고딕" panose="020D0604000000000000" pitchFamily="50" charset="-127"/>
+                <a:ea typeface="나눔고딕" panose="020D0604000000000000" pitchFamily="50" charset="-127"/>
+              </a:rPr>
+              <a:t>를</a:t>
+            </a:r>
+            <a:r>
+              <a:rPr lang="ko-KR" altLang="en-US" dirty="0">
+                <a:latin typeface="나눔고딕" panose="020D0604000000000000" pitchFamily="50" charset="-127"/>
+                <a:ea typeface="나눔고딕" panose="020D0604000000000000" pitchFamily="50" charset="-127"/>
+              </a:rPr>
+              <a:t> 추출</a:t>
+            </a:r>
+            <a:r>
+              <a:rPr lang="en-US" altLang="ko-KR" dirty="0">
+                <a:latin typeface="나눔고딕" panose="020D0604000000000000" pitchFamily="50" charset="-127"/>
+                <a:ea typeface="나눔고딕" panose="020D0604000000000000" pitchFamily="50" charset="-127"/>
+              </a:rPr>
+              <a:t>,</a:t>
+            </a:r>
+            <a:r>
+              <a:rPr lang="ko-KR" altLang="en-US" dirty="0">
+                <a:latin typeface="나눔고딕" panose="020D0604000000000000" pitchFamily="50" charset="-127"/>
+                <a:ea typeface="나눔고딕" panose="020D0604000000000000" pitchFamily="50" charset="-127"/>
+              </a:rPr>
+              <a:t> </a:t>
+            </a:r>
+            <a:r>
+              <a:rPr lang="en-US" altLang="ko-KR" dirty="0">
+                <a:latin typeface="나눔고딕" panose="020D0604000000000000" pitchFamily="50" charset="-127"/>
+                <a:ea typeface="나눔고딕" panose="020D0604000000000000" pitchFamily="50" charset="-127"/>
+              </a:rPr>
+              <a:t>output </a:t>
+            </a:r>
+            <a:r>
+              <a:rPr lang="ko-KR" altLang="en-US" dirty="0">
+                <a:latin typeface="나눔고딕" panose="020D0604000000000000" pitchFamily="50" charset="-127"/>
+                <a:ea typeface="나눔고딕" panose="020D0604000000000000" pitchFamily="50" charset="-127"/>
+              </a:rPr>
+              <a:t>재구성</a:t>
+            </a:r>
+            <a:endParaRPr lang="en-US" altLang="ko-KR" dirty="0">
+              <a:latin typeface="나눔고딕" panose="020D0604000000000000" pitchFamily="50" charset="-127"/>
+              <a:ea typeface="나눔고딕" panose="020D0604000000000000" pitchFamily="50" charset="-127"/>
+            </a:endParaRPr>
+          </a:p>
+          <a:p>
+            <a:pPr marL="285750" indent="-285750">
+              <a:lnSpc>
+                <a:spcPct val="200000"/>
+              </a:lnSpc>
+              <a:buFont typeface="Arial" panose="020B0604020202020204" pitchFamily="34" charset="0"/>
+              <a:buChar char="•"/>
+            </a:pPr>
+            <a:r>
+              <a:rPr lang="en-US" altLang="ko-KR" dirty="0">
+                <a:latin typeface="나눔고딕" panose="020D0604000000000000" pitchFamily="50" charset="-127"/>
+                <a:ea typeface="나눔고딕" panose="020D0604000000000000" pitchFamily="50" charset="-127"/>
+              </a:rPr>
+              <a:t>CNN</a:t>
+            </a:r>
+            <a:r>
+              <a:rPr lang="ko-KR" altLang="en-US" dirty="0">
+                <a:latin typeface="나눔고딕" panose="020D0604000000000000" pitchFamily="50" charset="-127"/>
+                <a:ea typeface="나눔고딕" panose="020D0604000000000000" pitchFamily="50" charset="-127"/>
+              </a:rPr>
+              <a:t>은 </a:t>
+            </a:r>
+            <a:r>
+              <a:rPr lang="en-US" altLang="ko-KR" dirty="0">
+                <a:latin typeface="나눔고딕" panose="020D0604000000000000" pitchFamily="50" charset="-127"/>
+                <a:ea typeface="나눔고딕" panose="020D0604000000000000" pitchFamily="50" charset="-127"/>
+              </a:rPr>
+              <a:t>Long-term correlation</a:t>
+            </a:r>
+            <a:r>
+              <a:rPr lang="ko-KR" altLang="en-US" dirty="0">
+                <a:latin typeface="나눔고딕" panose="020D0604000000000000" pitchFamily="50" charset="-127"/>
+                <a:ea typeface="나눔고딕" panose="020D0604000000000000" pitchFamily="50" charset="-127"/>
+              </a:rPr>
+              <a:t>에 적합하지 않음 </a:t>
+            </a:r>
+            <a:r>
+              <a:rPr lang="en-US" altLang="ko-KR" dirty="0">
+                <a:latin typeface="나눔고딕" panose="020D0604000000000000" pitchFamily="50" charset="-127"/>
+                <a:ea typeface="나눔고딕" panose="020D0604000000000000" pitchFamily="50" charset="-127"/>
+              </a:rPr>
+              <a:t>-&gt;</a:t>
+            </a:r>
+            <a:r>
+              <a:rPr lang="ko-KR" altLang="en-US" dirty="0">
+                <a:latin typeface="나눔고딕" panose="020D0604000000000000" pitchFamily="50" charset="-127"/>
+                <a:ea typeface="나눔고딕" panose="020D0604000000000000" pitchFamily="50" charset="-127"/>
+              </a:rPr>
+              <a:t> </a:t>
+            </a:r>
+            <a:r>
+              <a:rPr lang="en-US" altLang="ko-KR" dirty="0">
+                <a:latin typeface="나눔고딕" panose="020D0604000000000000" pitchFamily="50" charset="-127"/>
+                <a:ea typeface="나눔고딕" panose="020D0604000000000000" pitchFamily="50" charset="-127"/>
+              </a:rPr>
+              <a:t>contextual attention </a:t>
+            </a:r>
+          </a:p>
+          <a:p>
+            <a:pPr marL="285750" indent="-285750">
+              <a:lnSpc>
+                <a:spcPct val="200000"/>
+              </a:lnSpc>
+              <a:buFont typeface="Arial" panose="020B0604020202020204" pitchFamily="34" charset="0"/>
+              <a:buChar char="•"/>
+            </a:pPr>
+            <a:r>
+              <a:rPr lang="en-US" altLang="ko-KR" dirty="0" err="1">
+                <a:latin typeface="나눔고딕" panose="020D0604000000000000" pitchFamily="50" charset="-127"/>
+                <a:ea typeface="나눔고딕" panose="020D0604000000000000" pitchFamily="50" charset="-127"/>
+              </a:rPr>
+              <a:t>EdgeConnect</a:t>
+            </a:r>
+            <a:r>
+              <a:rPr lang="en-US" altLang="ko-KR" dirty="0">
+                <a:latin typeface="나눔고딕" panose="020D0604000000000000" pitchFamily="50" charset="-127"/>
+                <a:ea typeface="나눔고딕" panose="020D0604000000000000" pitchFamily="50" charset="-127"/>
+              </a:rPr>
+              <a:t> : Edge map</a:t>
+            </a:r>
+            <a:r>
+              <a:rPr lang="ko-KR" altLang="en-US" dirty="0">
+                <a:latin typeface="나눔고딕" panose="020D0604000000000000" pitchFamily="50" charset="-127"/>
+                <a:ea typeface="나눔고딕" panose="020D0604000000000000" pitchFamily="50" charset="-127"/>
+              </a:rPr>
+              <a:t>을 복구한 후 세부적으로 채움</a:t>
+            </a:r>
+            <a:r>
+              <a:rPr lang="en-US" altLang="ko-KR" dirty="0">
+                <a:latin typeface="나눔고딕" panose="020D0604000000000000" pitchFamily="50" charset="-127"/>
+                <a:ea typeface="나눔고딕" panose="020D0604000000000000" pitchFamily="50" charset="-127"/>
+              </a:rPr>
+              <a:t>.</a:t>
+            </a:r>
+            <a:r>
+              <a:rPr lang="ko-KR" altLang="en-US" dirty="0">
+                <a:latin typeface="나눔고딕" panose="020D0604000000000000" pitchFamily="50" charset="-127"/>
+                <a:ea typeface="나눔고딕" panose="020D0604000000000000" pitchFamily="50" charset="-127"/>
+              </a:rPr>
+              <a:t> </a:t>
+            </a:r>
+            <a:r>
+              <a:rPr lang="en-US" altLang="ko-KR" dirty="0">
+                <a:latin typeface="나눔고딕" panose="020D0604000000000000" pitchFamily="50" charset="-127"/>
+                <a:ea typeface="나눔고딕" panose="020D0604000000000000" pitchFamily="50" charset="-127"/>
+              </a:rPr>
+              <a:t>Edge</a:t>
+            </a:r>
+            <a:r>
+              <a:rPr lang="ko-KR" altLang="en-US" dirty="0">
+                <a:latin typeface="나눔고딕" panose="020D0604000000000000" pitchFamily="50" charset="-127"/>
+                <a:ea typeface="나눔고딕" panose="020D0604000000000000" pitchFamily="50" charset="-127"/>
+              </a:rPr>
+              <a:t> </a:t>
+            </a:r>
+            <a:r>
+              <a:rPr lang="en-US" altLang="ko-KR" dirty="0">
+                <a:latin typeface="나눔고딕" panose="020D0604000000000000" pitchFamily="50" charset="-127"/>
+                <a:ea typeface="나눔고딕" panose="020D0604000000000000" pitchFamily="50" charset="-127"/>
+              </a:rPr>
+              <a:t>map</a:t>
+            </a:r>
+            <a:r>
+              <a:rPr lang="ko-KR" altLang="en-US" dirty="0">
+                <a:latin typeface="나눔고딕" panose="020D0604000000000000" pitchFamily="50" charset="-127"/>
+                <a:ea typeface="나눔고딕" panose="020D0604000000000000" pitchFamily="50" charset="-127"/>
+              </a:rPr>
+              <a:t>의 제한된 </a:t>
+            </a:r>
+            <a:r>
+              <a:rPr lang="en-US" altLang="ko-KR" dirty="0">
+                <a:latin typeface="나눔고딕" panose="020D0604000000000000" pitchFamily="50" charset="-127"/>
+                <a:ea typeface="나눔고딕" panose="020D0604000000000000" pitchFamily="50" charset="-127"/>
+              </a:rPr>
+              <a:t>representation </a:t>
+            </a:r>
+            <a:r>
+              <a:rPr lang="en-US" altLang="ko-KR" dirty="0" err="1">
+                <a:latin typeface="나눔고딕" panose="020D0604000000000000" pitchFamily="50" charset="-127"/>
+                <a:ea typeface="나눔고딕" panose="020D0604000000000000" pitchFamily="50" charset="-127"/>
+              </a:rPr>
+              <a:t>abilty</a:t>
+            </a:r>
+            <a:r>
+              <a:rPr lang="en-US" altLang="ko-KR" dirty="0">
+                <a:latin typeface="나눔고딕" panose="020D0604000000000000" pitchFamily="50" charset="-127"/>
+                <a:ea typeface="나눔고딕" panose="020D0604000000000000" pitchFamily="50" charset="-127"/>
+              </a:rPr>
+              <a:t> 				</a:t>
+            </a:r>
+            <a:r>
+              <a:rPr lang="ko-KR" altLang="en-US" dirty="0">
+                <a:latin typeface="나눔고딕" panose="020D0604000000000000" pitchFamily="50" charset="-127"/>
+                <a:ea typeface="나눔고딕" panose="020D0604000000000000" pitchFamily="50" charset="-127"/>
+              </a:rPr>
+              <a:t> </a:t>
+            </a:r>
+            <a:r>
+              <a:rPr lang="en-US" altLang="ko-KR" dirty="0">
+                <a:latin typeface="나눔고딕" panose="020D0604000000000000" pitchFamily="50" charset="-127"/>
+                <a:ea typeface="나눔고딕" panose="020D0604000000000000" pitchFamily="50" charset="-127"/>
+              </a:rPr>
+              <a:t>-&gt; Object</a:t>
+            </a:r>
+            <a:r>
+              <a:rPr lang="ko-KR" altLang="en-US" dirty="0">
+                <a:latin typeface="나눔고딕" panose="020D0604000000000000" pitchFamily="50" charset="-127"/>
+                <a:ea typeface="나눔고딕" panose="020D0604000000000000" pitchFamily="50" charset="-127"/>
+              </a:rPr>
+              <a:t>의 경계에서 잘못된 정보 생성 가능</a:t>
+            </a:r>
+          </a:p>
+        </p:txBody>
+      </p:sp>
+    </p:spTree>
+    <p:extLst>
+      <p:ext uri="{BB962C8B-B14F-4D97-AF65-F5344CB8AC3E}">
+        <p14:creationId xmlns:p14="http://schemas.microsoft.com/office/powerpoint/2010/main" val="3469913462"/>
+      </p:ext>
+    </p:extLst>
+  </p:cSld>
+  <p:clrMapOvr>
+    <a:masterClrMapping/>
+  </p:clrMapOvr>
+</p:sld>
+</file>
+
+<file path=ppt/slides/slide13.xml><?xml version="1.0" encoding="utf-8"?>
+<p:sld xmlns:a="http://schemas.openxmlformats.org/drawingml/2006/main" xmlns:r="http://schemas.openxmlformats.org/officeDocument/2006/relationships" xmlns:p="http://schemas.openxmlformats.org/presentationml/2006/main">
+  <p:cSld>
+    <p:spTree>
+      <p:nvGrpSpPr>
+        <p:cNvPr id="1" name=""/>
+        <p:cNvGrpSpPr/>
+        <p:nvPr/>
+      </p:nvGrpSpPr>
+      <p:grpSpPr>
+        <a:xfrm>
+          <a:off x="0" y="0"/>
+          <a:ext cx="0" cy="0"/>
+          <a:chOff x="0" y="0"/>
+          <a:chExt cx="0" cy="0"/>
+        </a:xfrm>
+      </p:grpSpPr>
+      <p:sp>
+        <p:nvSpPr>
+          <p:cNvPr id="4" name="TextBox 3">
+            <a:extLst>
+              <a:ext uri="{FF2B5EF4-FFF2-40B4-BE49-F238E27FC236}">
+                <a16:creationId xmlns:a16="http://schemas.microsoft.com/office/drawing/2014/main" id="{C843F9AF-F496-4F52-B425-94A4B9EE37E3}"/>
+              </a:ext>
+            </a:extLst>
+          </p:cNvPr>
+          <p:cNvSpPr txBox="1"/>
+          <p:nvPr/>
+        </p:nvSpPr>
+        <p:spPr>
+          <a:xfrm>
+            <a:off x="1182314" y="723439"/>
+            <a:ext cx="10389576" cy="4672048"/>
+          </a:xfrm>
+          <a:prstGeom prst="rect">
+            <a:avLst/>
+          </a:prstGeom>
+          <a:noFill/>
+        </p:spPr>
+        <p:txBody>
+          <a:bodyPr wrap="square" rtlCol="0">
+            <a:spAutoFit/>
+          </a:bodyPr>
+          <a:lstStyle/>
+          <a:p>
+            <a:pPr>
+              <a:lnSpc>
+                <a:spcPct val="150000"/>
+              </a:lnSpc>
+            </a:pPr>
+            <a:r>
+              <a:rPr kumimoji="1" lang="en-US" altLang="ko-KR" sz="4000" dirty="0">
+                <a:latin typeface="나눔고딕" panose="020D0604000000000000" pitchFamily="50" charset="-127"/>
+                <a:ea typeface="나눔고딕" panose="020D0604000000000000" pitchFamily="50" charset="-127"/>
+              </a:rPr>
+              <a:t>Related Work</a:t>
+            </a:r>
+          </a:p>
+          <a:p>
+            <a:pPr>
+              <a:lnSpc>
+                <a:spcPct val="150000"/>
+              </a:lnSpc>
+            </a:pPr>
+            <a:endParaRPr lang="en-US" altLang="ko-KR" dirty="0">
+              <a:latin typeface="나눔고딕" panose="020D0604000000000000" pitchFamily="50" charset="-127"/>
+              <a:ea typeface="나눔고딕" panose="020D0604000000000000" pitchFamily="50" charset="-127"/>
+            </a:endParaRPr>
+          </a:p>
+          <a:p>
+            <a:pPr marL="285750" indent="-285750">
+              <a:lnSpc>
+                <a:spcPct val="200000"/>
+              </a:lnSpc>
+              <a:buFont typeface="Arial" panose="020B0604020202020204" pitchFamily="34" charset="0"/>
+              <a:buChar char="•"/>
+            </a:pPr>
+            <a:r>
+              <a:rPr lang="en-US" altLang="ko-KR" dirty="0">
+                <a:latin typeface="나눔고딕" panose="020D0604000000000000" pitchFamily="50" charset="-127"/>
+                <a:ea typeface="나눔고딕" panose="020D0604000000000000" pitchFamily="50" charset="-127"/>
+              </a:rPr>
+              <a:t>Optical flow</a:t>
+            </a:r>
+            <a:r>
+              <a:rPr lang="ko-KR" altLang="en-US" dirty="0" err="1">
+                <a:latin typeface="나눔고딕" panose="020D0604000000000000" pitchFamily="50" charset="-127"/>
+                <a:ea typeface="나눔고딕" panose="020D0604000000000000" pitchFamily="50" charset="-127"/>
+              </a:rPr>
+              <a:t>를</a:t>
+            </a:r>
+            <a:r>
+              <a:rPr lang="ko-KR" altLang="en-US" dirty="0">
+                <a:latin typeface="나눔고딕" panose="020D0604000000000000" pitchFamily="50" charset="-127"/>
+                <a:ea typeface="나눔고딕" panose="020D0604000000000000" pitchFamily="50" charset="-127"/>
+              </a:rPr>
+              <a:t> 정확하게 추정하기 위해 </a:t>
+            </a:r>
+            <a:r>
+              <a:rPr lang="en-US" altLang="ko-KR" dirty="0">
+                <a:latin typeface="나눔고딕" panose="020D0604000000000000" pitchFamily="50" charset="-127"/>
+                <a:ea typeface="나눔고딕" panose="020D0604000000000000" pitchFamily="50" charset="-127"/>
+              </a:rPr>
+              <a:t>Deep NN</a:t>
+            </a:r>
+            <a:r>
+              <a:rPr lang="ko-KR" altLang="en-US" dirty="0">
+                <a:latin typeface="나눔고딕" panose="020D0604000000000000" pitchFamily="50" charset="-127"/>
+                <a:ea typeface="나눔고딕" panose="020D0604000000000000" pitchFamily="50" charset="-127"/>
+              </a:rPr>
+              <a:t>을 사용 가능하나 충분한 </a:t>
+            </a:r>
+            <a:r>
+              <a:rPr lang="en-US" altLang="ko-KR" dirty="0">
+                <a:latin typeface="나눔고딕" panose="020D0604000000000000" pitchFamily="50" charset="-127"/>
+                <a:ea typeface="나눔고딕" panose="020D0604000000000000" pitchFamily="50" charset="-127"/>
+              </a:rPr>
+              <a:t>ground truth optical flow field</a:t>
+            </a:r>
+            <a:r>
+              <a:rPr lang="ko-KR" altLang="en-US" dirty="0" err="1">
+                <a:latin typeface="나눔고딕" panose="020D0604000000000000" pitchFamily="50" charset="-127"/>
+                <a:ea typeface="나눔고딕" panose="020D0604000000000000" pitchFamily="50" charset="-127"/>
+              </a:rPr>
+              <a:t>를</a:t>
+            </a:r>
+            <a:r>
+              <a:rPr lang="ko-KR" altLang="en-US" dirty="0">
+                <a:latin typeface="나눔고딕" panose="020D0604000000000000" pitchFamily="50" charset="-127"/>
+                <a:ea typeface="나눔고딕" panose="020D0604000000000000" pitchFamily="50" charset="-127"/>
+              </a:rPr>
+              <a:t> 필요로 함</a:t>
+            </a:r>
+            <a:r>
+              <a:rPr lang="en-US" altLang="ko-KR" dirty="0">
+                <a:latin typeface="나눔고딕" panose="020D0604000000000000" pitchFamily="50" charset="-127"/>
+                <a:ea typeface="나눔고딕" panose="020D0604000000000000" pitchFamily="50" charset="-127"/>
+              </a:rPr>
+              <a:t>.</a:t>
+            </a:r>
+            <a:r>
+              <a:rPr lang="ko-KR" altLang="en-US" dirty="0">
+                <a:latin typeface="나눔고딕" panose="020D0604000000000000" pitchFamily="50" charset="-127"/>
+                <a:ea typeface="나눔고딕" panose="020D0604000000000000" pitchFamily="50" charset="-127"/>
+              </a:rPr>
+              <a:t> </a:t>
+            </a:r>
+            <a:endParaRPr lang="en-US" altLang="ko-KR" dirty="0">
+              <a:latin typeface="나눔고딕" panose="020D0604000000000000" pitchFamily="50" charset="-127"/>
+              <a:ea typeface="나눔고딕" panose="020D0604000000000000" pitchFamily="50" charset="-127"/>
+            </a:endParaRPr>
+          </a:p>
+          <a:p>
+            <a:pPr marL="285750" indent="-285750">
+              <a:lnSpc>
+                <a:spcPct val="200000"/>
+              </a:lnSpc>
+              <a:buFont typeface="Arial" panose="020B0604020202020204" pitchFamily="34" charset="0"/>
+              <a:buChar char="•"/>
+            </a:pPr>
+            <a:r>
+              <a:rPr lang="en-US" altLang="ko-KR" dirty="0">
+                <a:latin typeface="나눔고딕" panose="020D0604000000000000" pitchFamily="50" charset="-127"/>
+                <a:ea typeface="나눔고딕" panose="020D0604000000000000" pitchFamily="50" charset="-127"/>
+              </a:rPr>
+              <a:t>Unsupervised learning</a:t>
+            </a:r>
+            <a:r>
+              <a:rPr lang="ko-KR" altLang="en-US" dirty="0">
+                <a:latin typeface="나눔고딕" panose="020D0604000000000000" pitchFamily="50" charset="-127"/>
+                <a:ea typeface="나눔고딕" panose="020D0604000000000000" pitchFamily="50" charset="-127"/>
+              </a:rPr>
+              <a:t>을 사용하면 </a:t>
+            </a:r>
+            <a:r>
+              <a:rPr lang="en-US" altLang="ko-KR" dirty="0">
+                <a:latin typeface="나눔고딕" panose="020D0604000000000000" pitchFamily="50" charset="-127"/>
+                <a:ea typeface="나눔고딕" panose="020D0604000000000000" pitchFamily="50" charset="-127"/>
+              </a:rPr>
+              <a:t>large motion</a:t>
+            </a:r>
+            <a:r>
+              <a:rPr lang="ko-KR" altLang="en-US" dirty="0">
+                <a:latin typeface="나눔고딕" panose="020D0604000000000000" pitchFamily="50" charset="-127"/>
+                <a:ea typeface="나눔고딕" panose="020D0604000000000000" pitchFamily="50" charset="-127"/>
+              </a:rPr>
+              <a:t>을 포착하기 어려움</a:t>
+            </a:r>
+            <a:r>
+              <a:rPr lang="en-US" altLang="ko-KR" dirty="0">
+                <a:latin typeface="나눔고딕" panose="020D0604000000000000" pitchFamily="50" charset="-127"/>
+                <a:ea typeface="나눔고딕" panose="020D0604000000000000" pitchFamily="50" charset="-127"/>
+              </a:rPr>
+              <a:t> -&gt; </a:t>
+            </a:r>
+            <a:r>
+              <a:rPr lang="ko-KR" altLang="en-US" dirty="0">
+                <a:latin typeface="나눔고딕" panose="020D0604000000000000" pitchFamily="50" charset="-127"/>
+                <a:ea typeface="나눔고딕" panose="020D0604000000000000" pitchFamily="50" charset="-127"/>
+              </a:rPr>
+              <a:t>저자는 이것이 </a:t>
+            </a:r>
+            <a:r>
+              <a:rPr lang="en-US" altLang="ko-KR" dirty="0">
+                <a:latin typeface="나눔고딕" panose="020D0604000000000000" pitchFamily="50" charset="-127"/>
+                <a:ea typeface="나눔고딕" panose="020D0604000000000000" pitchFamily="50" charset="-127"/>
+              </a:rPr>
+              <a:t>bilinear sampling</a:t>
+            </a:r>
+            <a:r>
+              <a:rPr lang="ko-KR" altLang="en-US" dirty="0">
+                <a:latin typeface="나눔고딕" panose="020D0604000000000000" pitchFamily="50" charset="-127"/>
+                <a:ea typeface="나눔고딕" panose="020D0604000000000000" pitchFamily="50" charset="-127"/>
+              </a:rPr>
+              <a:t>의 </a:t>
+            </a:r>
+            <a:r>
+              <a:rPr lang="en-US" altLang="ko-KR" dirty="0">
+                <a:latin typeface="나눔고딕" panose="020D0604000000000000" pitchFamily="50" charset="-127"/>
+                <a:ea typeface="나눔고딕" panose="020D0604000000000000" pitchFamily="50" charset="-127"/>
+              </a:rPr>
+              <a:t>limited receptive field</a:t>
+            </a:r>
+            <a:r>
+              <a:rPr lang="ko-KR" altLang="en-US" dirty="0">
+                <a:latin typeface="나눔고딕" panose="020D0604000000000000" pitchFamily="50" charset="-127"/>
+                <a:ea typeface="나눔고딕" panose="020D0604000000000000" pitchFamily="50" charset="-127"/>
+              </a:rPr>
+              <a:t> 때문이라고 생각해 </a:t>
+            </a:r>
+            <a:r>
+              <a:rPr lang="en-US" altLang="ko-KR" dirty="0">
+                <a:latin typeface="나눔고딕" panose="020D0604000000000000" pitchFamily="50" charset="-127"/>
+                <a:ea typeface="나눔고딕" panose="020D0604000000000000" pitchFamily="50" charset="-127"/>
+              </a:rPr>
+              <a:t>gaussian sampling </a:t>
+            </a:r>
+            <a:r>
+              <a:rPr lang="ko-KR" altLang="en-US" dirty="0">
+                <a:latin typeface="나눔고딕" panose="020D0604000000000000" pitchFamily="50" charset="-127"/>
+                <a:ea typeface="나눔고딕" panose="020D0604000000000000" pitchFamily="50" charset="-127"/>
+              </a:rPr>
+              <a:t>사용</a:t>
+            </a:r>
+            <a:endParaRPr lang="en-US" altLang="ko-KR" dirty="0">
+              <a:latin typeface="나눔고딕" panose="020D0604000000000000" pitchFamily="50" charset="-127"/>
+              <a:ea typeface="나눔고딕" panose="020D0604000000000000" pitchFamily="50" charset="-127"/>
+            </a:endParaRPr>
+          </a:p>
+          <a:p>
+            <a:pPr marL="285750" indent="-285750">
+              <a:lnSpc>
+                <a:spcPct val="200000"/>
+              </a:lnSpc>
+              <a:buFont typeface="Arial" panose="020B0604020202020204" pitchFamily="34" charset="0"/>
+              <a:buChar char="•"/>
+            </a:pPr>
+            <a:r>
+              <a:rPr lang="en-US" altLang="ko-KR" dirty="0">
+                <a:latin typeface="나눔고딕" panose="020D0604000000000000" pitchFamily="50" charset="-127"/>
+                <a:ea typeface="나눔고딕" panose="020D0604000000000000" pitchFamily="50" charset="-127"/>
+              </a:rPr>
+              <a:t>Appearance flow : source, target correlation</a:t>
+            </a:r>
+            <a:r>
+              <a:rPr lang="ko-KR" altLang="en-US" dirty="0">
+                <a:latin typeface="나눔고딕" panose="020D0604000000000000" pitchFamily="50" charset="-127"/>
+                <a:ea typeface="나눔고딕" panose="020D0604000000000000" pitchFamily="50" charset="-127"/>
+              </a:rPr>
+              <a:t>을 계산해 </a:t>
+            </a:r>
+            <a:r>
+              <a:rPr lang="en-US" altLang="ko-KR" dirty="0">
+                <a:latin typeface="나눔고딕" panose="020D0604000000000000" pitchFamily="50" charset="-127"/>
+                <a:ea typeface="나눔고딕" panose="020D0604000000000000" pitchFamily="50" charset="-127"/>
+              </a:rPr>
+              <a:t>2D coordinate vector(appearance flow field)</a:t>
+            </a:r>
+            <a:r>
+              <a:rPr lang="ko-KR" altLang="en-US" dirty="0" err="1">
+                <a:latin typeface="나눔고딕" panose="020D0604000000000000" pitchFamily="50" charset="-127"/>
+                <a:ea typeface="나눔고딕" panose="020D0604000000000000" pitchFamily="50" charset="-127"/>
+              </a:rPr>
+              <a:t>를</a:t>
+            </a:r>
+            <a:r>
+              <a:rPr lang="ko-KR" altLang="en-US" dirty="0">
+                <a:latin typeface="나눔고딕" panose="020D0604000000000000" pitchFamily="50" charset="-127"/>
+                <a:ea typeface="나눔고딕" panose="020D0604000000000000" pitchFamily="50" charset="-127"/>
+              </a:rPr>
+              <a:t> 예측 </a:t>
+            </a:r>
+            <a:r>
+              <a:rPr lang="en-US" altLang="ko-KR" dirty="0">
+                <a:latin typeface="나눔고딕" panose="020D0604000000000000" pitchFamily="50" charset="-127"/>
+                <a:ea typeface="나눔고딕" panose="020D0604000000000000" pitchFamily="50" charset="-127"/>
+              </a:rPr>
+              <a:t>-&gt;</a:t>
+            </a:r>
+            <a:r>
+              <a:rPr lang="ko-KR" altLang="en-US" dirty="0">
+                <a:latin typeface="나눔고딕" panose="020D0604000000000000" pitchFamily="50" charset="-127"/>
+                <a:ea typeface="나눔고딕" panose="020D0604000000000000" pitchFamily="50" charset="-127"/>
+              </a:rPr>
+              <a:t> </a:t>
+            </a:r>
+            <a:r>
+              <a:rPr lang="en-US" altLang="ko-KR" dirty="0">
+                <a:latin typeface="나눔고딕" panose="020D0604000000000000" pitchFamily="50" charset="-127"/>
+                <a:ea typeface="나눔고딕" panose="020D0604000000000000" pitchFamily="50" charset="-127"/>
+              </a:rPr>
+              <a:t>image inpainting</a:t>
+            </a:r>
+            <a:r>
+              <a:rPr lang="ko-KR" altLang="en-US" dirty="0">
+                <a:latin typeface="나눔고딕" panose="020D0604000000000000" pitchFamily="50" charset="-127"/>
+                <a:ea typeface="나눔고딕" panose="020D0604000000000000" pitchFamily="50" charset="-127"/>
+              </a:rPr>
+              <a:t>에 대해 적용</a:t>
+            </a:r>
+            <a:r>
+              <a:rPr lang="en-US" altLang="ko-KR" dirty="0">
+                <a:latin typeface="나눔고딕" panose="020D0604000000000000" pitchFamily="50" charset="-127"/>
+                <a:ea typeface="나눔고딕" panose="020D0604000000000000" pitchFamily="50" charset="-127"/>
+              </a:rPr>
+              <a:t>.</a:t>
+            </a:r>
+            <a:r>
+              <a:rPr lang="ko-KR" altLang="en-US" dirty="0">
+                <a:latin typeface="나눔고딕" panose="020D0604000000000000" pitchFamily="50" charset="-127"/>
+                <a:ea typeface="나눔고딕" panose="020D0604000000000000" pitchFamily="50" charset="-127"/>
+              </a:rPr>
+              <a:t> </a:t>
+            </a:r>
+            <a:r>
+              <a:rPr lang="en-US" altLang="ko-KR" dirty="0">
+                <a:latin typeface="나눔고딕" panose="020D0604000000000000" pitchFamily="50" charset="-127"/>
+                <a:ea typeface="나눔고딕" panose="020D0604000000000000" pitchFamily="50" charset="-127"/>
+              </a:rPr>
+              <a:t>Source -&gt;</a:t>
+            </a:r>
+            <a:r>
+              <a:rPr lang="ko-KR" altLang="en-US" dirty="0">
+                <a:latin typeface="나눔고딕" panose="020D0604000000000000" pitchFamily="50" charset="-127"/>
+                <a:ea typeface="나눔고딕" panose="020D0604000000000000" pitchFamily="50" charset="-127"/>
+              </a:rPr>
+              <a:t> </a:t>
+            </a:r>
+            <a:r>
+              <a:rPr lang="en-US" altLang="ko-KR" dirty="0">
+                <a:latin typeface="나눔고딕" panose="020D0604000000000000" pitchFamily="50" charset="-127"/>
+                <a:ea typeface="나눔고딕" panose="020D0604000000000000" pitchFamily="50" charset="-127"/>
+              </a:rPr>
+              <a:t>Hole</a:t>
+            </a:r>
+            <a:r>
+              <a:rPr lang="ko-KR" altLang="en-US" dirty="0">
+                <a:latin typeface="나눔고딕" panose="020D0604000000000000" pitchFamily="50" charset="-127"/>
+                <a:ea typeface="나눔고딕" panose="020D0604000000000000" pitchFamily="50" charset="-127"/>
+              </a:rPr>
+              <a:t>에 대한 </a:t>
+            </a:r>
+            <a:r>
+              <a:rPr lang="en-US" altLang="ko-KR" dirty="0">
+                <a:latin typeface="나눔고딕" panose="020D0604000000000000" pitchFamily="50" charset="-127"/>
+                <a:ea typeface="나눔고딕" panose="020D0604000000000000" pitchFamily="50" charset="-127"/>
+              </a:rPr>
+              <a:t>appearance flow </a:t>
+            </a:r>
+            <a:r>
+              <a:rPr lang="ko-KR" altLang="en-US" dirty="0">
+                <a:latin typeface="나눔고딕" panose="020D0604000000000000" pitchFamily="50" charset="-127"/>
+                <a:ea typeface="나눔고딕" panose="020D0604000000000000" pitchFamily="50" charset="-127"/>
+              </a:rPr>
+              <a:t>적용</a:t>
+            </a:r>
+          </a:p>
+        </p:txBody>
+      </p:sp>
+    </p:spTree>
+    <p:extLst>
+      <p:ext uri="{BB962C8B-B14F-4D97-AF65-F5344CB8AC3E}">
+        <p14:creationId xmlns:p14="http://schemas.microsoft.com/office/powerpoint/2010/main" val="1451523682"/>
+      </p:ext>
+    </p:extLst>
+  </p:cSld>
+  <p:clrMapOvr>
+    <a:masterClrMapping/>
+  </p:clrMapOvr>
+</p:sld>
+</file>
+
+<file path=ppt/slides/slide14.xml><?xml version="1.0" encoding="utf-8"?>
+<p:sld xmlns:a="http://schemas.openxmlformats.org/drawingml/2006/main" xmlns:r="http://schemas.openxmlformats.org/officeDocument/2006/relationships" xmlns:p="http://schemas.openxmlformats.org/presentationml/2006/main">
+  <p:cSld>
+    <p:spTree>
+      <p:nvGrpSpPr>
+        <p:cNvPr id="1" name=""/>
+        <p:cNvGrpSpPr/>
+        <p:nvPr/>
+      </p:nvGrpSpPr>
+      <p:grpSpPr>
+        <a:xfrm>
+          <a:off x="0" y="0"/>
+          <a:ext cx="0" cy="0"/>
+          <a:chOff x="0" y="0"/>
+          <a:chExt cx="0" cy="0"/>
+        </a:xfrm>
+      </p:grpSpPr>
+      <p:pic>
+        <p:nvPicPr>
+          <p:cNvPr id="4" name="그림 3">
+            <a:extLst>
+              <a:ext uri="{FF2B5EF4-FFF2-40B4-BE49-F238E27FC236}">
+                <a16:creationId xmlns:a16="http://schemas.microsoft.com/office/drawing/2014/main" id="{C2A6B100-2A8D-014B-80BA-A3BF76C05A8F}"/>
+              </a:ext>
+            </a:extLst>
+          </p:cNvPr>
+          <p:cNvPicPr>
+            <a:picLocks noChangeAspect="1"/>
+          </p:cNvPicPr>
+          <p:nvPr/>
+        </p:nvPicPr>
+        <p:blipFill>
+          <a:blip r:embed="rId3"/>
+          <a:stretch>
+            <a:fillRect/>
+          </a:stretch>
+        </p:blipFill>
+        <p:spPr>
+          <a:xfrm>
+            <a:off x="635000" y="1422400"/>
+            <a:ext cx="10922000" cy="4013200"/>
+          </a:xfrm>
+          <a:prstGeom prst="rect">
+            <a:avLst/>
+          </a:prstGeom>
+        </p:spPr>
+      </p:pic>
+    </p:spTree>
+    <p:extLst>
+      <p:ext uri="{BB962C8B-B14F-4D97-AF65-F5344CB8AC3E}">
+        <p14:creationId xmlns:p14="http://schemas.microsoft.com/office/powerpoint/2010/main" val="464631774"/>
+      </p:ext>
+    </p:extLst>
+  </p:cSld>
+  <p:clrMapOvr>
+    <a:masterClrMapping/>
+  </p:clrMapOvr>
+</p:sld>
+</file>
+
+<file path=ppt/slides/slide15.xml><?xml version="1.0" encoding="utf-8"?>
+<p:sld xmlns:a="http://schemas.openxmlformats.org/drawingml/2006/main" xmlns:r="http://schemas.openxmlformats.org/officeDocument/2006/relationships" xmlns:p="http://schemas.openxmlformats.org/presentationml/2006/main">
+  <p:cSld>
+    <p:spTree>
+      <p:nvGrpSpPr>
+        <p:cNvPr id="1" name=""/>
+        <p:cNvGrpSpPr/>
+        <p:nvPr/>
+      </p:nvGrpSpPr>
+      <p:grpSpPr>
+        <a:xfrm>
+          <a:off x="0" y="0"/>
+          <a:ext cx="0" cy="0"/>
+          <a:chOff x="0" y="0"/>
+          <a:chExt cx="0" cy="0"/>
+        </a:xfrm>
+      </p:grpSpPr>
+      <p:sp>
+        <p:nvSpPr>
+          <p:cNvPr id="4" name="TextBox 3">
+            <a:extLst>
+              <a:ext uri="{FF2B5EF4-FFF2-40B4-BE49-F238E27FC236}">
+                <a16:creationId xmlns:a16="http://schemas.microsoft.com/office/drawing/2014/main" id="{C843F9AF-F496-4F52-B425-94A4B9EE37E3}"/>
+              </a:ext>
+            </a:extLst>
+          </p:cNvPr>
+          <p:cNvSpPr txBox="1"/>
+          <p:nvPr/>
+        </p:nvSpPr>
+        <p:spPr>
+          <a:xfrm>
+            <a:off x="1182314" y="723439"/>
+            <a:ext cx="10389576" cy="5226046"/>
+          </a:xfrm>
+          <a:prstGeom prst="rect">
+            <a:avLst/>
+          </a:prstGeom>
+          <a:noFill/>
+        </p:spPr>
+        <p:txBody>
+          <a:bodyPr wrap="square" rtlCol="0">
+            <a:spAutoFit/>
+          </a:bodyPr>
+          <a:lstStyle/>
+          <a:p>
+            <a:pPr>
+              <a:lnSpc>
+                <a:spcPct val="150000"/>
+              </a:lnSpc>
+            </a:pPr>
+            <a:r>
+              <a:rPr kumimoji="1" lang="en-US" altLang="ko-KR" sz="4000" dirty="0">
+                <a:latin typeface="나눔고딕" panose="020D0604000000000000" pitchFamily="50" charset="-127"/>
+                <a:ea typeface="나눔고딕" panose="020D0604000000000000" pitchFamily="50" charset="-127"/>
+              </a:rPr>
+              <a:t>Structure </a:t>
+            </a:r>
+            <a:r>
+              <a:rPr kumimoji="1" lang="en-US" altLang="ko-KR" sz="4000" dirty="0" err="1">
+                <a:latin typeface="나눔고딕" panose="020D0604000000000000" pitchFamily="50" charset="-127"/>
+                <a:ea typeface="나눔고딕" panose="020D0604000000000000" pitchFamily="50" charset="-127"/>
+              </a:rPr>
+              <a:t>reconstructor</a:t>
+            </a:r>
+            <a:endParaRPr kumimoji="1" lang="en-US" altLang="ko-KR" sz="4000" dirty="0">
+              <a:latin typeface="나눔고딕" panose="020D0604000000000000" pitchFamily="50" charset="-127"/>
+              <a:ea typeface="나눔고딕" panose="020D0604000000000000" pitchFamily="50" charset="-127"/>
+            </a:endParaRPr>
+          </a:p>
+          <a:p>
+            <a:pPr>
+              <a:lnSpc>
+                <a:spcPct val="150000"/>
+              </a:lnSpc>
+            </a:pPr>
+            <a:endParaRPr lang="en-US" altLang="ko-KR" dirty="0">
+              <a:latin typeface="나눔고딕" panose="020D0604000000000000" pitchFamily="50" charset="-127"/>
+              <a:ea typeface="나눔고딕" panose="020D0604000000000000" pitchFamily="50" charset="-127"/>
+            </a:endParaRPr>
+          </a:p>
+          <a:p>
+            <a:pPr marL="285750" indent="-285750">
+              <a:lnSpc>
+                <a:spcPct val="200000"/>
+              </a:lnSpc>
+              <a:buFont typeface="Arial" panose="020B0604020202020204" pitchFamily="34" charset="0"/>
+              <a:buChar char="•"/>
+            </a:pPr>
+            <a:r>
+              <a:rPr lang="en-US" altLang="ko-KR" dirty="0">
+                <a:latin typeface="나눔고딕" panose="020D0604000000000000" pitchFamily="50" charset="-127"/>
+                <a:ea typeface="나눔고딕" panose="020D0604000000000000" pitchFamily="50" charset="-127"/>
+              </a:rPr>
+              <a:t>Predict missing structure -&gt; global structure image</a:t>
+            </a:r>
+          </a:p>
+          <a:p>
+            <a:pPr marL="285750" indent="-285750">
+              <a:lnSpc>
+                <a:spcPct val="200000"/>
+              </a:lnSpc>
+              <a:buFont typeface="Arial" panose="020B0604020202020204" pitchFamily="34" charset="0"/>
+              <a:buChar char="•"/>
+            </a:pPr>
+            <a:r>
+              <a:rPr lang="en-US" altLang="ko-KR" dirty="0">
+                <a:latin typeface="나눔고딕" panose="020D0604000000000000" pitchFamily="50" charset="-127"/>
+                <a:ea typeface="나눔고딕" panose="020D0604000000000000" pitchFamily="50" charset="-127"/>
+              </a:rPr>
+              <a:t>Generative adversarial framework</a:t>
+            </a:r>
+          </a:p>
+          <a:p>
+            <a:pPr marL="285750" indent="-285750">
+              <a:lnSpc>
+                <a:spcPct val="200000"/>
+              </a:lnSpc>
+              <a:buFont typeface="Arial" panose="020B0604020202020204" pitchFamily="34" charset="0"/>
+              <a:buChar char="•"/>
+            </a:pPr>
+            <a:r>
+              <a:rPr lang="en-US" altLang="ko-KR" dirty="0">
+                <a:latin typeface="나눔고딕" panose="020D0604000000000000" pitchFamily="50" charset="-127"/>
+                <a:ea typeface="나눔고딕" panose="020D0604000000000000" pitchFamily="50" charset="-127"/>
+              </a:rPr>
+              <a:t>Reconstruction loss : </a:t>
+            </a:r>
+            <a:r>
+              <a:rPr lang="ko-KR" altLang="en-US" dirty="0">
+                <a:latin typeface="나눔고딕" panose="020D0604000000000000" pitchFamily="50" charset="-127"/>
+                <a:ea typeface="나눔고딕" panose="020D0604000000000000" pitchFamily="50" charset="-127"/>
+              </a:rPr>
+              <a:t>예측한 </a:t>
+            </a:r>
+            <a:r>
+              <a:rPr lang="en-US" altLang="ko-KR" dirty="0">
+                <a:latin typeface="나눔고딕" panose="020D0604000000000000" pitchFamily="50" charset="-127"/>
+                <a:ea typeface="나눔고딕" panose="020D0604000000000000" pitchFamily="50" charset="-127"/>
+              </a:rPr>
+              <a:t>structure</a:t>
+            </a:r>
+            <a:r>
+              <a:rPr lang="ko-KR" altLang="en-US" dirty="0">
+                <a:latin typeface="나눔고딕" panose="020D0604000000000000" pitchFamily="50" charset="-127"/>
+                <a:ea typeface="나눔고딕" panose="020D0604000000000000" pitchFamily="50" charset="-127"/>
+              </a:rPr>
+              <a:t>와 </a:t>
+            </a:r>
+            <a:r>
+              <a:rPr lang="en-US" altLang="ko-KR" dirty="0">
+                <a:latin typeface="나눔고딕" panose="020D0604000000000000" pitchFamily="50" charset="-127"/>
+                <a:ea typeface="나눔고딕" panose="020D0604000000000000" pitchFamily="50" charset="-127"/>
+              </a:rPr>
+              <a:t>ground-</a:t>
+            </a:r>
+            <a:r>
+              <a:rPr lang="en-US" altLang="ko-KR" dirty="0" err="1">
+                <a:latin typeface="나눔고딕" panose="020D0604000000000000" pitchFamily="50" charset="-127"/>
+                <a:ea typeface="나눔고딕" panose="020D0604000000000000" pitchFamily="50" charset="-127"/>
+              </a:rPr>
+              <a:t>truch</a:t>
+            </a:r>
+            <a:r>
+              <a:rPr lang="en-US" altLang="ko-KR" dirty="0">
+                <a:latin typeface="나눔고딕" panose="020D0604000000000000" pitchFamily="50" charset="-127"/>
+                <a:ea typeface="나눔고딕" panose="020D0604000000000000" pitchFamily="50" charset="-127"/>
+              </a:rPr>
+              <a:t> structure</a:t>
+            </a:r>
+            <a:r>
+              <a:rPr lang="ko-KR" altLang="en-US" dirty="0">
+                <a:latin typeface="나눔고딕" panose="020D0604000000000000" pitchFamily="50" charset="-127"/>
+                <a:ea typeface="나눔고딕" panose="020D0604000000000000" pitchFamily="50" charset="-127"/>
+              </a:rPr>
+              <a:t>간의 </a:t>
+            </a:r>
+            <a:r>
+              <a:rPr lang="en-US" altLang="ko-KR" dirty="0">
+                <a:latin typeface="나눔고딕" panose="020D0604000000000000" pitchFamily="50" charset="-127"/>
+                <a:ea typeface="나눔고딕" panose="020D0604000000000000" pitchFamily="50" charset="-127"/>
+              </a:rPr>
+              <a:t>L1-distance</a:t>
+            </a:r>
+          </a:p>
+          <a:p>
+            <a:pPr marL="285750" indent="-285750">
+              <a:lnSpc>
+                <a:spcPct val="200000"/>
+              </a:lnSpc>
+              <a:buFont typeface="Arial" panose="020B0604020202020204" pitchFamily="34" charset="0"/>
+              <a:buChar char="•"/>
+            </a:pPr>
+            <a:r>
+              <a:rPr lang="en-US" altLang="ko-KR" dirty="0">
+                <a:latin typeface="나눔고딕" panose="020D0604000000000000" pitchFamily="50" charset="-127"/>
+                <a:ea typeface="나눔고딕" panose="020D0604000000000000" pitchFamily="50" charset="-127"/>
+              </a:rPr>
+              <a:t>Adversarial loss : Generative adversarial framework</a:t>
+            </a:r>
+          </a:p>
+          <a:p>
+            <a:pPr marL="285750" indent="-285750">
+              <a:lnSpc>
+                <a:spcPct val="200000"/>
+              </a:lnSpc>
+              <a:buFont typeface="Arial" panose="020B0604020202020204" pitchFamily="34" charset="0"/>
+              <a:buChar char="•"/>
+            </a:pPr>
+            <a:endParaRPr lang="en-US" altLang="ko-KR" dirty="0">
+              <a:latin typeface="나눔고딕" panose="020D0604000000000000" pitchFamily="50" charset="-127"/>
+              <a:ea typeface="나눔고딕" panose="020D0604000000000000" pitchFamily="50" charset="-127"/>
+            </a:endParaRPr>
+          </a:p>
+          <a:p>
+            <a:pPr marL="285750" indent="-285750">
+              <a:lnSpc>
+                <a:spcPct val="200000"/>
+              </a:lnSpc>
+              <a:buFont typeface="Arial" panose="020B0604020202020204" pitchFamily="34" charset="0"/>
+              <a:buChar char="•"/>
+            </a:pPr>
+            <a:endParaRPr lang="en-US" altLang="ko-KR" dirty="0">
+              <a:latin typeface="나눔고딕" panose="020D0604000000000000" pitchFamily="50" charset="-127"/>
+              <a:ea typeface="나눔고딕" panose="020D0604000000000000" pitchFamily="50" charset="-127"/>
+            </a:endParaRPr>
+          </a:p>
+          <a:p>
+            <a:pPr marL="285750" indent="-285750">
+              <a:lnSpc>
+                <a:spcPct val="200000"/>
+              </a:lnSpc>
+              <a:buFont typeface="Arial" panose="020B0604020202020204" pitchFamily="34" charset="0"/>
+              <a:buChar char="•"/>
+            </a:pPr>
+            <a:endParaRPr lang="ko-KR" altLang="en-US" dirty="0">
+              <a:latin typeface="나눔고딕" panose="020D0604000000000000" pitchFamily="50" charset="-127"/>
+              <a:ea typeface="나눔고딕" panose="020D0604000000000000" pitchFamily="50" charset="-127"/>
+            </a:endParaRPr>
+          </a:p>
+        </p:txBody>
+      </p:sp>
+    </p:spTree>
+    <p:extLst>
+      <p:ext uri="{BB962C8B-B14F-4D97-AF65-F5344CB8AC3E}">
+        <p14:creationId xmlns:p14="http://schemas.microsoft.com/office/powerpoint/2010/main" val="2084738566"/>
+      </p:ext>
+    </p:extLst>
+  </p:cSld>
+  <p:clrMapOvr>
+    <a:masterClrMapping/>
+  </p:clrMapOvr>
+</p:sld>
+</file>
+
+<file path=ppt/slides/slide16.xml><?xml version="1.0" encoding="utf-8"?>
+<p:sld xmlns:a="http://schemas.openxmlformats.org/drawingml/2006/main" xmlns:r="http://schemas.openxmlformats.org/officeDocument/2006/relationships" xmlns:p="http://schemas.openxmlformats.org/presentationml/2006/main">
+  <p:cSld>
+    <p:spTree>
+      <p:nvGrpSpPr>
+        <p:cNvPr id="1" name=""/>
+        <p:cNvGrpSpPr/>
+        <p:nvPr/>
+      </p:nvGrpSpPr>
+      <p:grpSpPr>
+        <a:xfrm>
+          <a:off x="0" y="0"/>
+          <a:ext cx="0" cy="0"/>
+          <a:chOff x="0" y="0"/>
+          <a:chExt cx="0" cy="0"/>
+        </a:xfrm>
+      </p:grpSpPr>
+      <p:sp>
+        <p:nvSpPr>
+          <p:cNvPr id="4" name="TextBox 3">
+            <a:extLst>
+              <a:ext uri="{FF2B5EF4-FFF2-40B4-BE49-F238E27FC236}">
+                <a16:creationId xmlns:a16="http://schemas.microsoft.com/office/drawing/2014/main" id="{C843F9AF-F496-4F52-B425-94A4B9EE37E3}"/>
+              </a:ext>
+            </a:extLst>
+          </p:cNvPr>
+          <p:cNvSpPr txBox="1"/>
+          <p:nvPr/>
+        </p:nvSpPr>
+        <p:spPr>
+          <a:xfrm>
+            <a:off x="1182314" y="723439"/>
+            <a:ext cx="10389576" cy="4118050"/>
+          </a:xfrm>
+          <a:prstGeom prst="rect">
+            <a:avLst/>
+          </a:prstGeom>
+          <a:noFill/>
+        </p:spPr>
+        <p:txBody>
+          <a:bodyPr wrap="square" rtlCol="0">
+            <a:spAutoFit/>
+          </a:bodyPr>
+          <a:lstStyle/>
+          <a:p>
+            <a:pPr>
+              <a:lnSpc>
+                <a:spcPct val="150000"/>
+              </a:lnSpc>
+            </a:pPr>
+            <a:r>
+              <a:rPr kumimoji="1" lang="en-US" altLang="ko-KR" sz="4000" dirty="0">
+                <a:latin typeface="나눔고딕" panose="020D0604000000000000" pitchFamily="50" charset="-127"/>
+                <a:ea typeface="나눔고딕" panose="020D0604000000000000" pitchFamily="50" charset="-127"/>
+              </a:rPr>
+              <a:t>Texture generator</a:t>
+            </a:r>
+          </a:p>
+          <a:p>
+            <a:pPr>
+              <a:lnSpc>
+                <a:spcPct val="150000"/>
+              </a:lnSpc>
+            </a:pPr>
+            <a:endParaRPr lang="en-US" altLang="ko-KR" dirty="0">
+              <a:latin typeface="나눔고딕" panose="020D0604000000000000" pitchFamily="50" charset="-127"/>
+              <a:ea typeface="나눔고딕" panose="020D0604000000000000" pitchFamily="50" charset="-127"/>
+            </a:endParaRPr>
+          </a:p>
+          <a:p>
+            <a:pPr marL="285750" indent="-285750">
+              <a:lnSpc>
+                <a:spcPct val="200000"/>
+              </a:lnSpc>
+              <a:buFont typeface="Arial" panose="020B0604020202020204" pitchFamily="34" charset="0"/>
+              <a:buChar char="•"/>
+            </a:pPr>
+            <a:r>
+              <a:rPr lang="en-US" altLang="ko-KR" dirty="0">
+                <a:latin typeface="나눔고딕" panose="020D0604000000000000" pitchFamily="50" charset="-127"/>
+                <a:ea typeface="나눔고딕" panose="020D0604000000000000" pitchFamily="50" charset="-127"/>
+              </a:rPr>
+              <a:t>Draw details according to reconstructed structure -&gt; output image</a:t>
+            </a:r>
+          </a:p>
+          <a:p>
+            <a:pPr marL="285750" indent="-285750">
+              <a:lnSpc>
+                <a:spcPct val="200000"/>
+              </a:lnSpc>
+              <a:buFont typeface="Arial" panose="020B0604020202020204" pitchFamily="34" charset="0"/>
+              <a:buChar char="•"/>
+            </a:pPr>
+            <a:r>
+              <a:rPr lang="en-US" altLang="ko-KR" dirty="0">
+                <a:latin typeface="나눔고딕" panose="020D0604000000000000" pitchFamily="50" charset="-127"/>
+                <a:ea typeface="나눔고딕" panose="020D0604000000000000" pitchFamily="50" charset="-127"/>
+              </a:rPr>
+              <a:t>Yield vivid texture</a:t>
+            </a:r>
+          </a:p>
+          <a:p>
+            <a:pPr marL="285750" indent="-285750">
+              <a:lnSpc>
+                <a:spcPct val="200000"/>
+              </a:lnSpc>
+              <a:buFont typeface="Arial" panose="020B0604020202020204" pitchFamily="34" charset="0"/>
+              <a:buChar char="•"/>
+            </a:pPr>
+            <a:r>
+              <a:rPr lang="en-US" altLang="ko-KR" dirty="0">
+                <a:latin typeface="나눔고딕" panose="020D0604000000000000" pitchFamily="50" charset="-127"/>
+                <a:ea typeface="나눔고딕" panose="020D0604000000000000" pitchFamily="50" charset="-127"/>
+              </a:rPr>
+              <a:t>Appearance flow in Unsupervised manner</a:t>
+            </a:r>
+          </a:p>
+          <a:p>
+            <a:pPr marL="285750" indent="-285750">
+              <a:lnSpc>
+                <a:spcPct val="200000"/>
+              </a:lnSpc>
+              <a:buFont typeface="Arial" panose="020B0604020202020204" pitchFamily="34" charset="0"/>
+              <a:buChar char="•"/>
+            </a:pPr>
+            <a:r>
+              <a:rPr lang="en-US" altLang="ko-KR" dirty="0">
+                <a:latin typeface="나눔고딕" panose="020D0604000000000000" pitchFamily="50" charset="-127"/>
+                <a:ea typeface="나눔고딕" panose="020D0604000000000000" pitchFamily="50" charset="-127"/>
+              </a:rPr>
+              <a:t>Gaussian sampling</a:t>
+            </a:r>
+          </a:p>
+          <a:p>
+            <a:pPr marL="285750" indent="-285750">
+              <a:lnSpc>
+                <a:spcPct val="200000"/>
+              </a:lnSpc>
+              <a:buFont typeface="Arial" panose="020B0604020202020204" pitchFamily="34" charset="0"/>
+              <a:buChar char="•"/>
+            </a:pPr>
+            <a:r>
+              <a:rPr lang="en-US" altLang="ko-KR" dirty="0">
+                <a:latin typeface="나눔고딕" panose="020D0604000000000000" pitchFamily="50" charset="-127"/>
+                <a:ea typeface="나눔고딕" panose="020D0604000000000000" pitchFamily="50" charset="-127"/>
+              </a:rPr>
+              <a:t>Sampling correctness loss (calculate by pre-trained VGG19)</a:t>
+            </a:r>
+            <a:endParaRPr lang="ko-KR" altLang="en-US" dirty="0">
+              <a:latin typeface="나눔고딕" panose="020D0604000000000000" pitchFamily="50" charset="-127"/>
+              <a:ea typeface="나눔고딕" panose="020D0604000000000000" pitchFamily="50" charset="-127"/>
+            </a:endParaRPr>
+          </a:p>
+        </p:txBody>
+      </p:sp>
+    </p:spTree>
+    <p:extLst>
+      <p:ext uri="{BB962C8B-B14F-4D97-AF65-F5344CB8AC3E}">
+        <p14:creationId xmlns:p14="http://schemas.microsoft.com/office/powerpoint/2010/main" val="1061127226"/>
+      </p:ext>
+    </p:extLst>
+  </p:cSld>
+  <p:clrMapOvr>
+    <a:masterClrMapping/>
+  </p:clrMapOvr>
+</p:sld>
+</file>
+
 <file path=ppt/slides/slide2.xml><?xml version="1.0" encoding="utf-8"?>
 <p:sld xmlns:a="http://schemas.openxmlformats.org/drawingml/2006/main" xmlns:r="http://schemas.openxmlformats.org/officeDocument/2006/relationships" xmlns:p="http://schemas.openxmlformats.org/presentationml/2006/main">
   <p:cSld>
@@ -4532,7 +7438,7 @@
           <p:nvPr/>
         </p:nvPicPr>
         <p:blipFill>
-          <a:blip r:embed="rId2"/>
+          <a:blip r:embed="rId3"/>
           <a:stretch>
             <a:fillRect/>
           </a:stretch>
@@ -4562,7 +7468,7 @@
           <p:nvPr/>
         </p:nvPicPr>
         <p:blipFill>
-          <a:blip r:embed="rId3"/>
+          <a:blip r:embed="rId4"/>
           <a:stretch>
             <a:fillRect/>
           </a:stretch>
@@ -4592,7 +7498,7 @@
           <p:nvPr/>
         </p:nvPicPr>
         <p:blipFill>
-          <a:blip r:embed="rId4"/>
+          <a:blip r:embed="rId5"/>
           <a:stretch>
             <a:fillRect/>
           </a:stretch>
@@ -4622,7 +7528,7 @@
           <p:nvPr/>
         </p:nvPicPr>
         <p:blipFill>
-          <a:blip r:embed="rId5"/>
+          <a:blip r:embed="rId6"/>
           <a:stretch>
             <a:fillRect/>
           </a:stretch>
@@ -6774,4 +9680,299 @@
     </a:ext>
   </a:extLst>
 </a:theme>
+</file>
+
+<file path=ppt/theme/theme2.xml><?xml version="1.0" encoding="utf-8"?>
+<a:theme xmlns:a="http://schemas.openxmlformats.org/drawingml/2006/main" name="Office 테마">
+  <a:themeElements>
+    <a:clrScheme name="Office">
+      <a:dk1>
+        <a:sysClr val="windowText" lastClr="000000"/>
+      </a:dk1>
+      <a:lt1>
+        <a:sysClr val="window" lastClr="FFFFFF"/>
+      </a:lt1>
+      <a:dk2>
+        <a:srgbClr val="44546A"/>
+      </a:dk2>
+      <a:lt2>
+        <a:srgbClr val="E7E6E6"/>
+      </a:lt2>
+      <a:accent1>
+        <a:srgbClr val="4472C4"/>
+      </a:accent1>
+      <a:accent2>
+        <a:srgbClr val="ED7D31"/>
+      </a:accent2>
+      <a:accent3>
+        <a:srgbClr val="A5A5A5"/>
+      </a:accent3>
+      <a:accent4>
+        <a:srgbClr val="FFC000"/>
+      </a:accent4>
+      <a:accent5>
+        <a:srgbClr val="5B9BD5"/>
+      </a:accent5>
+      <a:accent6>
+        <a:srgbClr val="70AD47"/>
+      </a:accent6>
+      <a:hlink>
+        <a:srgbClr val="0563C1"/>
+      </a:hlink>
+      <a:folHlink>
+        <a:srgbClr val="954F72"/>
+      </a:folHlink>
+    </a:clrScheme>
+    <a:fontScheme name="Office">
+      <a:majorFont>
+        <a:latin typeface="맑은 고딕" panose="020F0302020204030204"/>
+        <a:ea typeface=""/>
+        <a:cs typeface=""/>
+        <a:font script="Jpan" typeface="游ゴシック Light"/>
+        <a:font script="Hang" typeface="맑은 고딕"/>
+        <a:font script="Hans" typeface="等线 Light"/>
+        <a:font script="Hant" typeface="新細明體"/>
+        <a:font script="Arab" typeface="Times New Roman"/>
+        <a:font script="Hebr" typeface="Times New Roman"/>
+        <a:font script="Thai" typeface="Angsana New"/>
+        <a:font script="Ethi" typeface="Nyala"/>
+        <a:font script="Beng" typeface="Vrinda"/>
+        <a:font script="Gujr" typeface="Shruti"/>
+        <a:font script="Khmr" typeface="MoolBoran"/>
+        <a:font script="Knda" typeface="Tunga"/>
+        <a:font script="Guru" typeface="Raavi"/>
+        <a:font script="Cans" typeface="Euphemia"/>
+        <a:font script="Cher" typeface="Plantagenet Cherokee"/>
+        <a:font script="Yiii" typeface="Microsoft Yi Baiti"/>
+        <a:font script="Tibt" typeface="Microsoft Himalaya"/>
+        <a:font script="Thaa" typeface="MV Boli"/>
+        <a:font script="Deva" typeface="Mangal"/>
+        <a:font script="Telu" typeface="Gautami"/>
+        <a:font script="Taml" typeface="Latha"/>
+        <a:font script="Syrc" typeface="Estrangelo Edessa"/>
+        <a:font script="Orya" typeface="Kalinga"/>
+        <a:font script="Mlym" typeface="Kartika"/>
+        <a:font script="Laoo" typeface="DokChampa"/>
+        <a:font script="Sinh" typeface="Iskoola Pota"/>
+        <a:font script="Mong" typeface="Mongolian Baiti"/>
+        <a:font script="Viet" typeface="Times New Roman"/>
+        <a:font script="Uigh" typeface="Microsoft Uighur"/>
+        <a:font script="Geor" typeface="Sylfaen"/>
+        <a:font script="Armn" typeface="Arial"/>
+        <a:font script="Bugi" typeface="Leelawadee UI"/>
+        <a:font script="Bopo" typeface="Microsoft JhengHei"/>
+        <a:font script="Java" typeface="Javanese Text"/>
+        <a:font script="Lisu" typeface="Segoe UI"/>
+        <a:font script="Mymr" typeface="Myanmar Text"/>
+        <a:font script="Nkoo" typeface="Ebrima"/>
+        <a:font script="Olck" typeface="Nirmala UI"/>
+        <a:font script="Osma" typeface="Ebrima"/>
+        <a:font script="Phag" typeface="Phagspa"/>
+        <a:font script="Syrn" typeface="Estrangelo Edessa"/>
+        <a:font script="Syrj" typeface="Estrangelo Edessa"/>
+        <a:font script="Syre" typeface="Estrangelo Edessa"/>
+        <a:font script="Sora" typeface="Nirmala UI"/>
+        <a:font script="Tale" typeface="Microsoft Tai Le"/>
+        <a:font script="Talu" typeface="Microsoft New Tai Lue"/>
+        <a:font script="Tfng" typeface="Ebrima"/>
+      </a:majorFont>
+      <a:minorFont>
+        <a:latin typeface="맑은 고딕" panose="020F0502020204030204"/>
+        <a:ea typeface=""/>
+        <a:cs typeface=""/>
+        <a:font script="Jpan" typeface="游ゴシック"/>
+        <a:font script="Hang" typeface="맑은 고딕"/>
+        <a:font script="Hans" typeface="等线"/>
+        <a:font script="Hant" typeface="新細明體"/>
+        <a:font script="Arab" typeface="Arial"/>
+        <a:font script="Hebr" typeface="Arial"/>
+        <a:font script="Thai" typeface="Cordia New"/>
+        <a:font script="Ethi" typeface="Nyala"/>
+        <a:font script="Beng" typeface="Vrinda"/>
+        <a:font script="Gujr" typeface="Shruti"/>
+        <a:font script="Khmr" typeface="DaunPenh"/>
+        <a:font script="Knda" typeface="Tunga"/>
+        <a:font script="Guru" typeface="Raavi"/>
+        <a:font script="Cans" typeface="Euphemia"/>
+        <a:font script="Cher" typeface="Plantagenet Cherokee"/>
+        <a:font script="Yiii" typeface="Microsoft Yi Baiti"/>
+        <a:font script="Tibt" typeface="Microsoft Himalaya"/>
+        <a:font script="Thaa" typeface="MV Boli"/>
+        <a:font script="Deva" typeface="Mangal"/>
+        <a:font script="Telu" typeface="Gautami"/>
+        <a:font script="Taml" typeface="Latha"/>
+        <a:font script="Syrc" typeface="Estrangelo Edessa"/>
+        <a:font script="Orya" typeface="Kalinga"/>
+        <a:font script="Mlym" typeface="Kartika"/>
+        <a:font script="Laoo" typeface="DokChampa"/>
+        <a:font script="Sinh" typeface="Iskoola Pota"/>
+        <a:font script="Mong" typeface="Mongolian Baiti"/>
+        <a:font script="Viet" typeface="Arial"/>
+        <a:font script="Uigh" typeface="Microsoft Uighur"/>
+        <a:font script="Geor" typeface="Sylfaen"/>
+        <a:font script="Armn" typeface="Arial"/>
+        <a:font script="Bugi" typeface="Leelawadee UI"/>
+        <a:font script="Bopo" typeface="Microsoft JhengHei"/>
+        <a:font script="Java" typeface="Javanese Text"/>
+        <a:font script="Lisu" typeface="Segoe UI"/>
+        <a:font script="Mymr" typeface="Myanmar Text"/>
+        <a:font script="Nkoo" typeface="Ebrima"/>
+        <a:font script="Olck" typeface="Nirmala UI"/>
+        <a:font script="Osma" typeface="Ebrima"/>
+        <a:font script="Phag" typeface="Phagspa"/>
+        <a:font script="Syrn" typeface="Estrangelo Edessa"/>
+        <a:font script="Syrj" typeface="Estrangelo Edessa"/>
+        <a:font script="Syre" typeface="Estrangelo Edessa"/>
+        <a:font script="Sora" typeface="Nirmala UI"/>
+        <a:font script="Tale" typeface="Microsoft Tai Le"/>
+        <a:font script="Talu" typeface="Microsoft New Tai Lue"/>
+        <a:font script="Tfng" typeface="Ebrima"/>
+      </a:minorFont>
+    </a:fontScheme>
+    <a:fmtScheme name="Office">
+      <a:fillStyleLst>
+        <a:solidFill>
+          <a:schemeClr val="phClr"/>
+        </a:solidFill>
+        <a:gradFill rotWithShape="1">
+          <a:gsLst>
+            <a:gs pos="0">
+              <a:schemeClr val="phClr">
+                <a:lumMod val="110000"/>
+                <a:satMod val="105000"/>
+                <a:tint val="67000"/>
+              </a:schemeClr>
+            </a:gs>
+            <a:gs pos="50000">
+              <a:schemeClr val="phClr">
+                <a:lumMod val="105000"/>
+                <a:satMod val="103000"/>
+                <a:tint val="73000"/>
+              </a:schemeClr>
+            </a:gs>
+            <a:gs pos="100000">
+              <a:schemeClr val="phClr">
+                <a:lumMod val="105000"/>
+                <a:satMod val="109000"/>
+                <a:tint val="81000"/>
+              </a:schemeClr>
+            </a:gs>
+          </a:gsLst>
+          <a:lin ang="5400000" scaled="0"/>
+        </a:gradFill>
+        <a:gradFill rotWithShape="1">
+          <a:gsLst>
+            <a:gs pos="0">
+              <a:schemeClr val="phClr">
+                <a:satMod val="103000"/>
+                <a:lumMod val="102000"/>
+                <a:tint val="94000"/>
+              </a:schemeClr>
+            </a:gs>
+            <a:gs pos="50000">
+              <a:schemeClr val="phClr">
+                <a:satMod val="110000"/>
+                <a:lumMod val="100000"/>
+                <a:shade val="100000"/>
+              </a:schemeClr>
+            </a:gs>
+            <a:gs pos="100000">
+              <a:schemeClr val="phClr">
+                <a:lumMod val="99000"/>
+                <a:satMod val="120000"/>
+                <a:shade val="78000"/>
+              </a:schemeClr>
+            </a:gs>
+          </a:gsLst>
+          <a:lin ang="5400000" scaled="0"/>
+        </a:gradFill>
+      </a:fillStyleLst>
+      <a:lnStyleLst>
+        <a:ln w="6350" cap="flat" cmpd="sng" algn="ctr">
+          <a:solidFill>
+            <a:schemeClr val="phClr"/>
+          </a:solidFill>
+          <a:prstDash val="solid"/>
+          <a:miter lim="800000"/>
+        </a:ln>
+        <a:ln w="12700" cap="flat" cmpd="sng" algn="ctr">
+          <a:solidFill>
+            <a:schemeClr val="phClr"/>
+          </a:solidFill>
+          <a:prstDash val="solid"/>
+          <a:miter lim="800000"/>
+        </a:ln>
+        <a:ln w="19050" cap="flat" cmpd="sng" algn="ctr">
+          <a:solidFill>
+            <a:schemeClr val="phClr"/>
+          </a:solidFill>
+          <a:prstDash val="solid"/>
+          <a:miter lim="800000"/>
+        </a:ln>
+      </a:lnStyleLst>
+      <a:effectStyleLst>
+        <a:effectStyle>
+          <a:effectLst/>
+        </a:effectStyle>
+        <a:effectStyle>
+          <a:effectLst/>
+        </a:effectStyle>
+        <a:effectStyle>
+          <a:effectLst>
+            <a:outerShdw blurRad="57150" dist="19050" dir="5400000" algn="ctr" rotWithShape="0">
+              <a:srgbClr val="000000">
+                <a:alpha val="63000"/>
+              </a:srgbClr>
+            </a:outerShdw>
+          </a:effectLst>
+        </a:effectStyle>
+      </a:effectStyleLst>
+      <a:bgFillStyleLst>
+        <a:solidFill>
+          <a:schemeClr val="phClr"/>
+        </a:solidFill>
+        <a:solidFill>
+          <a:schemeClr val="phClr">
+            <a:tint val="95000"/>
+            <a:satMod val="170000"/>
+          </a:schemeClr>
+        </a:solidFill>
+        <a:gradFill rotWithShape="1">
+          <a:gsLst>
+            <a:gs pos="0">
+              <a:schemeClr val="phClr">
+                <a:tint val="93000"/>
+                <a:satMod val="150000"/>
+                <a:shade val="98000"/>
+                <a:lumMod val="102000"/>
+              </a:schemeClr>
+            </a:gs>
+            <a:gs pos="50000">
+              <a:schemeClr val="phClr">
+                <a:tint val="98000"/>
+                <a:satMod val="130000"/>
+                <a:shade val="90000"/>
+                <a:lumMod val="103000"/>
+              </a:schemeClr>
+            </a:gs>
+            <a:gs pos="100000">
+              <a:schemeClr val="phClr">
+                <a:shade val="63000"/>
+                <a:satMod val="120000"/>
+              </a:schemeClr>
+            </a:gs>
+          </a:gsLst>
+          <a:lin ang="5400000" scaled="0"/>
+        </a:gradFill>
+      </a:bgFillStyleLst>
+    </a:fmtScheme>
+  </a:themeElements>
+  <a:objectDefaults/>
+  <a:extraClrSchemeLst/>
+  <a:extLst>
+    <a:ext uri="{05A4C25C-085E-4340-85A3-A5531E510DB2}">
+      <thm15:themeFamily xmlns:thm15="http://schemas.microsoft.com/office/thememl/2012/main" name="Office Theme" id="{62F939B6-93AF-4DB8-9C6B-D6C7DFDC589F}" vid="{4A3C46E8-61CC-4603-A589-7422A47A8E4A}"/>
+    </a:ext>
+  </a:extLst>
+</a:theme>
 </file>
</xml_diff>